<commit_message>
commit 8 base maquina de estados generalizada
</commit_message>
<xml_diff>
--- a/Maquina_De_Estados/MDE_ONION.pptx
+++ b/Maquina_De_Estados/MDE_ONION.pptx
@@ -5,14 +5,13 @@
     <p:sldMasterId id="2147483648" r:id="rId1"/>
   </p:sldMasterIdLst>
   <p:notesMasterIdLst>
-    <p:notesMasterId r:id="rId5"/>
+    <p:notesMasterId r:id="rId4"/>
   </p:notesMasterIdLst>
   <p:handoutMasterIdLst>
-    <p:handoutMasterId r:id="rId6"/>
+    <p:handoutMasterId r:id="rId5"/>
   </p:handoutMasterIdLst>
   <p:sldIdLst>
-    <p:sldId id="257" r:id="rId3"/>
-    <p:sldId id="258" r:id="rId4"/>
+    <p:sldId id="258" r:id="rId3"/>
   </p:sldIdLst>
   <p:sldSz cx="12192000" cy="6858000"/>
   <p:notesSz cx="7103745" cy="10234295"/>
@@ -3938,7 +3937,7 @@
         </p:nvSpPr>
         <p:spPr>
           <a:xfrm>
-            <a:off x="1786890" y="2322195"/>
+            <a:off x="1014095" y="1134745"/>
             <a:ext cx="667385" cy="699135"/>
           </a:xfrm>
           <a:prstGeom prst="ellipse">
@@ -3979,7 +3978,7 @@
               <a:buNone/>
             </a:pPr>
             <a:r>
-              <a:rPr kumimoji="0" lang="es-HN" altLang="zh-CN" sz="1400" b="0" i="0" u="none" strike="noStrike" cap="none" normalizeH="0" baseline="0" smtClean="0">
+              <a:rPr kumimoji="0" lang="es-HN" altLang="zh-CN" sz="1200" b="0" i="0" u="none" strike="noStrike" cap="none" normalizeH="0" baseline="0" smtClean="0">
                 <a:ln>
                   <a:noFill/>
                 </a:ln>
@@ -3992,7 +3991,7 @@
               </a:rPr>
               <a:t>q0</a:t>
             </a:r>
-            <a:endParaRPr kumimoji="0" lang="es-HN" altLang="zh-CN" sz="1400" b="0" i="0" u="none" strike="noStrike" cap="none" normalizeH="0" baseline="0" smtClean="0">
+            <a:endParaRPr kumimoji="0" lang="es-HN" altLang="zh-CN" sz="1200" b="0" i="0" u="none" strike="noStrike" cap="none" normalizeH="0" baseline="0" smtClean="0">
               <a:ln>
                 <a:noFill/>
               </a:ln>
@@ -4014,7 +4013,7 @@
         </p:nvCxnSpPr>
         <p:spPr>
           <a:xfrm flipV="1">
-            <a:off x="1026160" y="2671445"/>
+            <a:off x="253365" y="1483995"/>
             <a:ext cx="760730" cy="8255"/>
           </a:xfrm>
           <a:prstGeom prst="straightConnector1">
@@ -4047,7 +4046,7 @@
         </p:nvSpPr>
         <p:spPr>
           <a:xfrm>
-            <a:off x="3245485" y="2326005"/>
+            <a:off x="2472690" y="1138555"/>
             <a:ext cx="667385" cy="699135"/>
           </a:xfrm>
           <a:prstGeom prst="ellipse">
@@ -4088,7 +4087,7 @@
               <a:buNone/>
             </a:pPr>
             <a:r>
-              <a:rPr kumimoji="0" lang="es-HN" altLang="zh-CN" sz="1400" b="0" i="0" u="none" strike="noStrike" cap="none" normalizeH="0" baseline="0" smtClean="0">
+              <a:rPr kumimoji="0" lang="es-HN" altLang="zh-CN" sz="1200" b="0" i="0" u="none" strike="noStrike" cap="none" normalizeH="0" baseline="0" smtClean="0">
                 <a:ln>
                   <a:noFill/>
                 </a:ln>
@@ -4101,7 +4100,7 @@
               </a:rPr>
               <a:t>q1</a:t>
             </a:r>
-            <a:endParaRPr kumimoji="0" lang="es-HN" altLang="zh-CN" sz="1400" b="0" i="0" u="none" strike="noStrike" cap="none" normalizeH="0" baseline="0" smtClean="0">
+            <a:endParaRPr kumimoji="0" lang="es-HN" altLang="zh-CN" sz="1200" b="0" i="0" u="none" strike="noStrike" cap="none" normalizeH="0" baseline="0" smtClean="0">
               <a:ln>
                 <a:noFill/>
               </a:ln>
@@ -4123,7 +4122,7 @@
         </p:nvCxnSpPr>
         <p:spPr>
           <a:xfrm flipV="1">
-            <a:off x="2484755" y="2675255"/>
+            <a:off x="1711960" y="1487805"/>
             <a:ext cx="760730" cy="8255"/>
           </a:xfrm>
           <a:prstGeom prst="straightConnector1">
@@ -4156,8 +4155,8 @@
         </p:nvSpPr>
         <p:spPr>
           <a:xfrm>
-            <a:off x="2446020" y="2338705"/>
-            <a:ext cx="1096645" cy="229870"/>
+            <a:off x="1681480" y="1101090"/>
+            <a:ext cx="1096645" cy="213995"/>
           </a:xfrm>
           <a:prstGeom prst="rect">
             <a:avLst/>
@@ -4170,10 +4169,10 @@
           </a:bodyPr>
           <a:p>
             <a:r>
-              <a:rPr lang="es-HN" altLang="es-MX" sz="900"/>
+              <a:rPr lang="es-HN" altLang="es-MX" sz="800"/>
               <a:t>[ONION core]</a:t>
             </a:r>
-            <a:endParaRPr lang="es-HN" altLang="es-MX" sz="900"/>
+            <a:endParaRPr lang="es-HN" altLang="es-MX" sz="800"/>
           </a:p>
         </p:txBody>
       </p:sp>
@@ -4185,7 +4184,7 @@
         </p:nvSpPr>
         <p:spPr>
           <a:xfrm>
-            <a:off x="4697095" y="2312035"/>
+            <a:off x="3924300" y="1124585"/>
             <a:ext cx="667385" cy="699135"/>
           </a:xfrm>
           <a:prstGeom prst="ellipse">
@@ -4226,7 +4225,7 @@
               <a:buNone/>
             </a:pPr>
             <a:r>
-              <a:rPr kumimoji="0" lang="es-HN" altLang="zh-CN" sz="1400" b="0" i="0" u="none" strike="noStrike" cap="none" normalizeH="0" baseline="0" smtClean="0">
+              <a:rPr kumimoji="0" lang="es-HN" altLang="zh-CN" sz="1200" b="0" i="0" u="none" strike="noStrike" cap="none" normalizeH="0" baseline="0" smtClean="0">
                 <a:ln>
                   <a:noFill/>
                 </a:ln>
@@ -4239,7 +4238,7 @@
               </a:rPr>
               <a:t>q2</a:t>
             </a:r>
-            <a:endParaRPr kumimoji="0" lang="es-HN" altLang="zh-CN" sz="1400" b="0" i="0" u="none" strike="noStrike" cap="none" normalizeH="0" baseline="0" smtClean="0">
+            <a:endParaRPr kumimoji="0" lang="es-HN" altLang="zh-CN" sz="1200" b="0" i="0" u="none" strike="noStrike" cap="none" normalizeH="0" baseline="0" smtClean="0">
               <a:ln>
                 <a:noFill/>
               </a:ln>
@@ -4261,7 +4260,7 @@
         </p:nvCxnSpPr>
         <p:spPr>
           <a:xfrm flipV="1">
-            <a:off x="3936365" y="2661285"/>
+            <a:off x="3163570" y="1473835"/>
             <a:ext cx="760730" cy="8255"/>
           </a:xfrm>
           <a:prstGeom prst="straightConnector1">
@@ -4294,8 +4293,8 @@
         </p:nvSpPr>
         <p:spPr>
           <a:xfrm>
-            <a:off x="4096385" y="2338705"/>
-            <a:ext cx="1096645" cy="229870"/>
+            <a:off x="4715510" y="1167765"/>
+            <a:ext cx="559435" cy="213995"/>
           </a:xfrm>
           <a:prstGeom prst="rect">
             <a:avLst/>
@@ -4308,165 +4307,13 @@
           </a:bodyPr>
           <a:p>
             <a:r>
-              <a:rPr lang="es-HN" altLang="es-MX" sz="900"/>
-              <a:t>[func]</a:t>
-            </a:r>
-            <a:endParaRPr lang="es-HN" altLang="es-MX" sz="900"/>
-          </a:p>
-        </p:txBody>
-      </p:sp>
-      <p:cxnSp>
-        <p:nvCxnSpPr>
-          <p:cNvPr id="17" name="Conector curvado 16"/>
-          <p:cNvCxnSpPr/>
-          <p:nvPr/>
-        </p:nvCxnSpPr>
-        <p:spPr>
-          <a:xfrm rot="16200000">
-            <a:off x="3577590" y="2169795"/>
-            <a:ext cx="3175" cy="567690"/>
-          </a:xfrm>
-          <a:prstGeom prst="curvedConnector3">
-            <a:avLst>
-              <a:gd name="adj1" fmla="val 11290000"/>
-            </a:avLst>
-          </a:prstGeom>
-          <a:ln>
-            <a:tailEnd type="arrow"/>
-          </a:ln>
-        </p:spPr>
-        <p:style>
-          <a:lnRef idx="1">
-            <a:schemeClr val="accent1"/>
-          </a:lnRef>
-          <a:fillRef idx="0">
-            <a:schemeClr val="accent1"/>
-          </a:fillRef>
-          <a:effectRef idx="0">
-            <a:schemeClr val="accent1"/>
-          </a:effectRef>
-          <a:fontRef idx="minor">
-            <a:schemeClr val="tx1"/>
-          </a:fontRef>
-        </p:style>
-      </p:cxnSp>
-      <p:sp>
-        <p:nvSpPr>
-          <p:cNvPr id="18" name="Cuadro de texto 17"/>
-          <p:cNvSpPr txBox="1"/>
-          <p:nvPr/>
-        </p:nvSpPr>
-        <p:spPr>
-          <a:xfrm>
-            <a:off x="3221355" y="1823720"/>
-            <a:ext cx="1096645" cy="229870"/>
-          </a:xfrm>
-          <a:prstGeom prst="rect">
-            <a:avLst/>
-          </a:prstGeom>
-          <a:noFill/>
-        </p:spPr>
-        <p:txBody>
-          <a:bodyPr wrap="square" rtlCol="0">
-            <a:spAutoFit/>
-          </a:bodyPr>
-          <a:p>
-            <a:r>
-              <a:rPr lang="es-HN" altLang="es-MX" sz="900"/>
-              <a:t>[ cadena,</a:t>
-            </a:r>
-            <a:r>
-              <a:rPr lang="es-HN" altLang="es-MX" sz="900" b="1"/>
-              <a:t>{</a:t>
-            </a:r>
-            <a:r>
-              <a:rPr lang="es-HN" altLang="es-MX" sz="900"/>
-              <a:t> ]</a:t>
-            </a:r>
-            <a:endParaRPr lang="es-HN" altLang="es-MX" sz="900"/>
-          </a:p>
-        </p:txBody>
-      </p:sp>
-      <p:sp>
-        <p:nvSpPr>
-          <p:cNvPr id="19" name="Cuadro de texto 18"/>
-          <p:cNvSpPr txBox="1"/>
-          <p:nvPr/>
-        </p:nvSpPr>
-        <p:spPr>
-          <a:xfrm>
-            <a:off x="4465955" y="1831975"/>
-            <a:ext cx="1330325" cy="229870"/>
-          </a:xfrm>
-          <a:prstGeom prst="rect">
-            <a:avLst/>
-          </a:prstGeom>
-          <a:noFill/>
-        </p:spPr>
-        <p:txBody>
-          <a:bodyPr wrap="square" rtlCol="0">
-            <a:spAutoFit/>
-          </a:bodyPr>
-          <a:p>
-            <a:r>
-              <a:rPr lang="es-HN" altLang="es-MX" sz="900"/>
-              <a:t>[ cadena,(, main,),</a:t>
-            </a:r>
-            <a:r>
-              <a:rPr lang="es-HN" altLang="es-MX" sz="900" b="1"/>
-              <a:t>: </a:t>
-            </a:r>
-            <a:r>
-              <a:rPr lang="es-HN" altLang="es-MX" sz="900"/>
-              <a:t>, </a:t>
-            </a:r>
-            <a:r>
-              <a:rPr lang="es-HN" altLang="es-MX" sz="900" b="1"/>
-              <a:t>; </a:t>
-            </a:r>
-            <a:r>
-              <a:rPr lang="es-HN" altLang="es-MX" sz="900"/>
-              <a:t>]</a:t>
-            </a:r>
-            <a:endParaRPr lang="es-HN" altLang="es-MX" sz="900"/>
-          </a:p>
-        </p:txBody>
-      </p:sp>
-      <p:cxnSp>
-        <p:nvCxnSpPr>
-          <p:cNvPr id="21" name="Conector curvado 20"/>
-          <p:cNvCxnSpPr/>
-          <p:nvPr/>
-        </p:nvCxnSpPr>
-        <p:spPr>
-          <a:xfrm rot="16200000">
-            <a:off x="5029200" y="2166620"/>
-            <a:ext cx="3175" cy="567690"/>
-          </a:xfrm>
-          <a:prstGeom prst="curvedConnector3">
-            <a:avLst>
-              <a:gd name="adj1" fmla="val 11290000"/>
-            </a:avLst>
-          </a:prstGeom>
-          <a:ln>
-            <a:tailEnd type="arrow"/>
-          </a:ln>
-        </p:spPr>
-        <p:style>
-          <a:lnRef idx="1">
-            <a:schemeClr val="accent1"/>
-          </a:lnRef>
-          <a:fillRef idx="0">
-            <a:schemeClr val="accent1"/>
-          </a:fillRef>
-          <a:effectRef idx="0">
-            <a:schemeClr val="accent1"/>
-          </a:effectRef>
-          <a:fontRef idx="minor">
-            <a:schemeClr val="tx1"/>
-          </a:fontRef>
-        </p:style>
-      </p:cxnSp>
+              <a:rPr lang="es-HN" altLang="es-MX" sz="800"/>
+              <a:t>[import]</a:t>
+            </a:r>
+            <a:endParaRPr lang="es-HN" altLang="es-MX" sz="800"/>
+          </a:p>
+        </p:txBody>
+      </p:sp>
       <p:sp>
         <p:nvSpPr>
           <p:cNvPr id="22" name="Óvalo 21"/>
@@ -4475,7 +4322,7 @@
         </p:nvSpPr>
         <p:spPr>
           <a:xfrm>
-            <a:off x="6163945" y="2312035"/>
+            <a:off x="9721850" y="1167765"/>
             <a:ext cx="667385" cy="699135"/>
           </a:xfrm>
           <a:prstGeom prst="ellipse">
@@ -4515,7 +4362,21 @@
               <a:buFontTx/>
               <a:buNone/>
             </a:pPr>
-            <a:endParaRPr kumimoji="0" lang="es-HN" altLang="zh-CN" sz="1400" b="0" i="0" u="none" strike="noStrike" cap="none" normalizeH="0" baseline="0" smtClean="0">
+            <a:r>
+              <a:rPr kumimoji="0" lang="es-HN" altLang="zh-CN" sz="1200" b="0" i="0" u="none" strike="noStrike" cap="none" normalizeH="0" baseline="0" smtClean="0">
+                <a:ln>
+                  <a:noFill/>
+                </a:ln>
+                <a:solidFill>
+                  <a:schemeClr val="tx1"/>
+                </a:solidFill>
+                <a:effectLst/>
+                <a:latin typeface="Arial" panose="020B0604020202020204" pitchFamily="34" charset="0"/>
+                <a:ea typeface="SimSun" panose="02010600030101010101" pitchFamily="2" charset="-122"/>
+              </a:rPr>
+              <a:t>q6</a:t>
+            </a:r>
+            <a:endParaRPr kumimoji="0" lang="es-HN" altLang="zh-CN" sz="1200" b="0" i="0" u="none" strike="noStrike" cap="none" normalizeH="0" baseline="0" smtClean="0">
               <a:ln>
                 <a:noFill/>
               </a:ln>
@@ -4537,7 +4398,7 @@
         </p:nvCxnSpPr>
         <p:spPr>
           <a:xfrm flipV="1">
-            <a:off x="5403215" y="2663190"/>
+            <a:off x="8961120" y="1518920"/>
             <a:ext cx="760730" cy="8255"/>
           </a:xfrm>
           <a:prstGeom prst="straightConnector1">
@@ -4564,51 +4425,14 @@
       </p:cxnSp>
       <p:sp>
         <p:nvSpPr>
-          <p:cNvPr id="24" name="Cuadro de texto 23"/>
-          <p:cNvSpPr txBox="1"/>
-          <p:nvPr/>
-        </p:nvSpPr>
-        <p:spPr>
-          <a:xfrm>
-            <a:off x="5563235" y="2340610"/>
-            <a:ext cx="1096645" cy="229870"/>
-          </a:xfrm>
-          <a:prstGeom prst="rect">
-            <a:avLst/>
-          </a:prstGeom>
-          <a:noFill/>
-        </p:spPr>
-        <p:txBody>
-          <a:bodyPr wrap="square" rtlCol="0">
-            <a:spAutoFit/>
-          </a:bodyPr>
-          <a:p>
-            <a:r>
-              <a:rPr lang="es-HN" altLang="es-MX" sz="900"/>
-              <a:t>[ </a:t>
-            </a:r>
-            <a:r>
-              <a:rPr lang="es-HN" altLang="es-MX" sz="900" b="1"/>
-              <a:t>}</a:t>
-            </a:r>
-            <a:r>
-              <a:rPr lang="es-HN" altLang="es-MX" sz="900"/>
-              <a:t> ]</a:t>
-            </a:r>
-            <a:endParaRPr lang="es-HN" altLang="es-MX" sz="900"/>
-          </a:p>
-        </p:txBody>
-      </p:sp>
-      <p:sp>
-        <p:nvSpPr>
-          <p:cNvPr id="26" name="Óvalo 25"/>
+          <p:cNvPr id="2" name="Óvalo 1"/>
           <p:cNvSpPr/>
           <p:nvPr/>
         </p:nvSpPr>
         <p:spPr>
           <a:xfrm>
-            <a:off x="6227445" y="2378075"/>
-            <a:ext cx="541020" cy="567055"/>
+            <a:off x="5375910" y="1125220"/>
+            <a:ext cx="667385" cy="699135"/>
           </a:xfrm>
           <a:prstGeom prst="ellipse">
             <a:avLst/>
@@ -4648,7 +4472,7 @@
               <a:buNone/>
             </a:pPr>
             <a:r>
-              <a:rPr kumimoji="0" lang="es-HN" altLang="zh-CN" sz="1400" b="0" i="0" u="none" strike="noStrike" cap="none" normalizeH="0" baseline="0" smtClean="0">
+              <a:rPr kumimoji="0" lang="es-HN" altLang="zh-CN" sz="1200" b="0" i="0" u="none" strike="noStrike" cap="none" normalizeH="0" baseline="0" smtClean="0">
                 <a:ln>
                   <a:noFill/>
                 </a:ln>
@@ -4661,7 +4485,7 @@
               </a:rPr>
               <a:t>q3</a:t>
             </a:r>
-            <a:endParaRPr kumimoji="0" lang="es-HN" altLang="zh-CN" sz="1400" b="0" i="0" u="none" strike="noStrike" cap="none" normalizeH="0" baseline="0" smtClean="0">
+            <a:endParaRPr kumimoji="0" lang="es-HN" altLang="zh-CN" sz="1200" b="0" i="0" u="none" strike="noStrike" cap="none" normalizeH="0" baseline="0" smtClean="0">
               <a:ln>
                 <a:noFill/>
               </a:ln>
@@ -4677,37 +4501,31 @@
       </p:sp>
       <p:cxnSp>
         <p:nvCxnSpPr>
-          <p:cNvPr id="27" name="Conector curvado 26"/>
-          <p:cNvCxnSpPr>
-            <a:stCxn id="22" idx="4"/>
-            <a:endCxn id="7" idx="4"/>
-          </p:cNvCxnSpPr>
+          <p:cNvPr id="3" name="Conector recto de flecha 2"/>
+          <p:cNvCxnSpPr/>
           <p:nvPr/>
         </p:nvCxnSpPr>
         <p:spPr>
-          <a:xfrm rot="5400000">
-            <a:off x="5031740" y="1558925"/>
-            <a:ext cx="13970" cy="2918460"/>
-          </a:xfrm>
-          <a:prstGeom prst="curvedConnector3">
-            <a:avLst>
-              <a:gd name="adj1" fmla="val 1804545"/>
-            </a:avLst>
+          <a:xfrm flipV="1">
+            <a:off x="4615180" y="1474470"/>
+            <a:ext cx="760730" cy="8255"/>
+          </a:xfrm>
+          <a:prstGeom prst="straightConnector1">
+            <a:avLst/>
           </a:prstGeom>
           <a:ln>
-            <a:headEnd type="none" w="med" len="med"/>
             <a:tailEnd type="arrow" w="med" len="med"/>
           </a:ln>
         </p:spPr>
         <p:style>
-          <a:lnRef idx="1">
-            <a:schemeClr val="accent1"/>
+          <a:lnRef idx="3">
+            <a:schemeClr val="accent6"/>
           </a:lnRef>
           <a:fillRef idx="0">
-            <a:schemeClr val="accent1"/>
+            <a:schemeClr val="accent6"/>
           </a:fillRef>
-          <a:effectRef idx="0">
-            <a:schemeClr val="accent1"/>
+          <a:effectRef idx="2">
+            <a:schemeClr val="accent6"/>
           </a:effectRef>
           <a:fontRef idx="minor">
             <a:schemeClr val="tx1"/>
@@ -4716,254 +4534,13 @@
       </p:cxnSp>
       <p:sp>
         <p:nvSpPr>
-          <p:cNvPr id="28" name="Cuadro de texto 27"/>
-          <p:cNvSpPr txBox="1"/>
-          <p:nvPr/>
-        </p:nvSpPr>
-        <p:spPr>
-          <a:xfrm>
-            <a:off x="4581525" y="3307080"/>
-            <a:ext cx="932180" cy="229870"/>
-          </a:xfrm>
-          <a:prstGeom prst="rect">
-            <a:avLst/>
-          </a:prstGeom>
-          <a:noFill/>
-        </p:spPr>
-        <p:txBody>
-          <a:bodyPr wrap="none" rtlCol="0" anchor="t">
-            <a:spAutoFit/>
-          </a:bodyPr>
-          <a:p>
-            <a:r>
-              <a:rPr lang="es-HN" altLang="es-MX" sz="900">
-                <a:sym typeface="+mn-ea"/>
-              </a:rPr>
-              <a:t>[</a:t>
-            </a:r>
-            <a:r>
-              <a:rPr lang="es-HN" altLang="es-MX" sz="900">
-                <a:sym typeface="+mn-ea"/>
-              </a:rPr>
-              <a:t>ONION layer ]</a:t>
-            </a:r>
-            <a:endParaRPr lang="es-MX" altLang="en-US" sz="900"/>
-          </a:p>
-        </p:txBody>
-      </p:sp>
-      <p:sp>
-        <p:nvSpPr>
-          <p:cNvPr id="31" name="Cuadro de texto 30"/>
-          <p:cNvSpPr txBox="1"/>
-          <p:nvPr/>
-        </p:nvSpPr>
-        <p:spPr>
-          <a:xfrm>
-            <a:off x="7143750" y="1437640"/>
-            <a:ext cx="4513580" cy="2861310"/>
-          </a:xfrm>
-          <a:prstGeom prst="rect">
-            <a:avLst/>
-          </a:prstGeom>
-          <a:noFill/>
-        </p:spPr>
-        <p:txBody>
-          <a:bodyPr wrap="none" rtlCol="0">
-            <a:spAutoFit/>
-          </a:bodyPr>
-          <a:p>
-            <a:pPr algn="l"/>
-            <a:r>
-              <a:rPr lang="es-HN" altLang="es-MX">
-                <a:solidFill>
-                  <a:srgbClr val="00B0F0"/>
-                </a:solidFill>
-              </a:rPr>
-              <a:t>ONION core</a:t>
-            </a:r>
-            <a:r>
-              <a:rPr lang="es-HN" altLang="es-MX"/>
-              <a:t>  q0&gt;q1</a:t>
-            </a:r>
-            <a:endParaRPr lang="es-HN" altLang="es-MX"/>
-          </a:p>
-          <a:p>
-            <a:pPr algn="l"/>
-            <a:r>
-              <a:rPr lang="es-HN" altLang="es-MX">
-                <a:solidFill>
-                  <a:srgbClr val="00B050"/>
-                </a:solidFill>
-              </a:rPr>
-              <a:t>nombre{  </a:t>
-            </a:r>
-            <a:r>
-              <a:rPr lang="es-HN" altLang="es-MX">
-                <a:solidFill>
-                  <a:schemeClr val="tx1"/>
-                </a:solidFill>
-              </a:rPr>
-              <a:t>q1&gt; q2</a:t>
-            </a:r>
-            <a:endParaRPr lang="es-HN" altLang="es-MX">
-              <a:solidFill>
-                <a:schemeClr val="tx1"/>
-              </a:solidFill>
-            </a:endParaRPr>
-          </a:p>
-          <a:p>
-            <a:pPr algn="l"/>
-            <a:endParaRPr lang="es-HN" altLang="es-MX">
-              <a:solidFill>
-                <a:srgbClr val="00B050"/>
-              </a:solidFill>
-            </a:endParaRPr>
-          </a:p>
-          <a:p>
-            <a:pPr algn="l"/>
-            <a:r>
-              <a:rPr lang="es-HN" altLang="es-MX">
-                <a:solidFill>
-                  <a:srgbClr val="0070C0"/>
-                </a:solidFill>
-              </a:rPr>
-              <a:t>func nombre ( “main” ): </a:t>
-            </a:r>
-            <a:endParaRPr lang="es-HN" altLang="es-MX">
-              <a:solidFill>
-                <a:srgbClr val="0070C0"/>
-              </a:solidFill>
-            </a:endParaRPr>
-          </a:p>
-          <a:p>
-            <a:pPr algn="l"/>
-            <a:r>
-              <a:rPr lang="es-HN" altLang="es-MX">
-                <a:solidFill>
-                  <a:srgbClr val="0070C0"/>
-                </a:solidFill>
-              </a:rPr>
-              <a:t>;</a:t>
-            </a:r>
-            <a:r>
-              <a:rPr lang="es-HN" altLang="es-MX"/>
-              <a:t>	</a:t>
-            </a:r>
-            <a:r>
-              <a:rPr lang="es-HN" altLang="es-MX">
-                <a:sym typeface="+mn-ea"/>
-              </a:rPr>
-              <a:t>q2 elementos basicos (en blanco</a:t>
-            </a:r>
-            <a:r>
-              <a:rPr lang="es-HN" altLang="es-MX" b="1">
-                <a:sym typeface="+mn-ea"/>
-              </a:rPr>
-              <a:t>)</a:t>
-            </a:r>
-            <a:endParaRPr lang="es-HN" altLang="es-MX" b="1">
-              <a:sym typeface="+mn-ea"/>
-            </a:endParaRPr>
-          </a:p>
-          <a:p>
-            <a:pPr algn="l"/>
-            <a:r>
-              <a:rPr lang="es-HN" altLang="es-MX"/>
-              <a:t>	</a:t>
-            </a:r>
-            <a:endParaRPr lang="es-HN" altLang="es-MX"/>
-          </a:p>
-          <a:p>
-            <a:pPr algn="l"/>
-            <a:r>
-              <a:rPr lang="es-HN" altLang="es-MX">
-                <a:solidFill>
-                  <a:schemeClr val="accent1">
-                    <a:lumMod val="60000"/>
-                    <a:lumOff val="40000"/>
-                  </a:schemeClr>
-                </a:solidFill>
-              </a:rPr>
-              <a:t>}  </a:t>
-            </a:r>
-            <a:r>
-              <a:rPr lang="es-HN" altLang="es-MX">
-                <a:solidFill>
-                  <a:schemeClr val="tx1"/>
-                </a:solidFill>
-              </a:rPr>
-              <a:t>q2&gt;q3 programa “completo” ,”fin” o</a:t>
-            </a:r>
-            <a:endParaRPr lang="es-HN" altLang="es-MX">
-              <a:solidFill>
-                <a:schemeClr val="tx1"/>
-              </a:solidFill>
-            </a:endParaRPr>
-          </a:p>
-          <a:p>
-            <a:pPr algn="l"/>
-            <a:endParaRPr lang="es-HN" altLang="es-MX">
-              <a:solidFill>
-                <a:schemeClr val="tx1"/>
-              </a:solidFill>
-            </a:endParaRPr>
-          </a:p>
-          <a:p>
-            <a:pPr algn="l"/>
-            <a:r>
-              <a:rPr lang="es-HN" altLang="es-MX">
-                <a:solidFill>
-                  <a:srgbClr val="FF0000"/>
-                </a:solidFill>
-                <a:sym typeface="+mn-ea"/>
-              </a:rPr>
-              <a:t>ONION layer</a:t>
-            </a:r>
-            <a:r>
-              <a:rPr lang="es-HN" altLang="es-MX">
-                <a:sym typeface="+mn-ea"/>
-              </a:rPr>
-              <a:t>  q3&gt;q2 “vuelve a comenzar”</a:t>
-            </a:r>
-            <a:endParaRPr lang="es-HN" altLang="es-MX"/>
-          </a:p>
-          <a:p>
-            <a:pPr algn="l"/>
-            <a:endParaRPr lang="es-HN" altLang="es-MX">
-              <a:solidFill>
-                <a:schemeClr val="tx1"/>
-              </a:solidFill>
-            </a:endParaRPr>
-          </a:p>
-        </p:txBody>
-      </p:sp>
-    </p:spTree>
-  </p:cSld>
-  <p:clrMapOvr>
-    <a:masterClrMapping/>
-  </p:clrMapOvr>
-</p:sld>
-</file>
-
-<file path=ppt/slides/slide2.xml><?xml version="1.0" encoding="utf-8"?>
-<p:sld xmlns:a="http://schemas.openxmlformats.org/drawingml/2006/main" xmlns:r="http://schemas.openxmlformats.org/officeDocument/2006/relationships" xmlns:p="http://schemas.openxmlformats.org/presentationml/2006/main">
-  <p:cSld>
-    <p:spTree>
-      <p:nvGrpSpPr>
-        <p:cNvPr id="1" name=""/>
-        <p:cNvGrpSpPr/>
-        <p:nvPr/>
-      </p:nvGrpSpPr>
-      <p:grpSpPr/>
-      <p:sp>
-        <p:nvSpPr>
-          <p:cNvPr id="6" name="Óvalo 5"/>
+          <p:cNvPr id="20" name="Óvalo 19"/>
           <p:cNvSpPr/>
           <p:nvPr/>
         </p:nvSpPr>
         <p:spPr>
           <a:xfrm>
-            <a:off x="1291590" y="2322195"/>
+            <a:off x="6822440" y="1190625"/>
             <a:ext cx="667385" cy="699135"/>
           </a:xfrm>
           <a:prstGeom prst="ellipse">
@@ -5004,7 +4581,7 @@
               <a:buNone/>
             </a:pPr>
             <a:r>
-              <a:rPr kumimoji="0" lang="es-HN" altLang="zh-CN" sz="1400" b="0" i="0" u="none" strike="noStrike" cap="none" normalizeH="0" baseline="0" smtClean="0">
+              <a:rPr kumimoji="0" lang="es-HN" altLang="zh-CN" sz="1200" b="0" i="0" u="none" strike="noStrike" cap="none" normalizeH="0" baseline="0" smtClean="0">
                 <a:ln>
                   <a:noFill/>
                 </a:ln>
@@ -5015,9 +4592,9 @@
                 <a:latin typeface="Arial" panose="020B0604020202020204" pitchFamily="34" charset="0"/>
                 <a:ea typeface="SimSun" panose="02010600030101010101" pitchFamily="2" charset="-122"/>
               </a:rPr>
-              <a:t>q0</a:t>
-            </a:r>
-            <a:endParaRPr kumimoji="0" lang="es-HN" altLang="zh-CN" sz="1400" b="0" i="0" u="none" strike="noStrike" cap="none" normalizeH="0" baseline="0" smtClean="0">
+              <a:t>q4</a:t>
+            </a:r>
+            <a:endParaRPr kumimoji="0" lang="es-HN" altLang="zh-CN" sz="1200" b="0" i="0" u="none" strike="noStrike" cap="none" normalizeH="0" baseline="0" smtClean="0">
               <a:ln>
                 <a:noFill/>
               </a:ln>
@@ -5033,13 +4610,13 @@
       </p:sp>
       <p:cxnSp>
         <p:nvCxnSpPr>
-          <p:cNvPr id="9" name="Conector recto de flecha 8"/>
+          <p:cNvPr id="25" name="Conector recto de flecha 24"/>
           <p:cNvCxnSpPr/>
           <p:nvPr/>
         </p:nvCxnSpPr>
         <p:spPr>
           <a:xfrm flipV="1">
-            <a:off x="530860" y="2671445"/>
+            <a:off x="6061710" y="1539875"/>
             <a:ext cx="760730" cy="8255"/>
           </a:xfrm>
           <a:prstGeom prst="straightConnector1">
@@ -5066,13 +4643,13 @@
       </p:cxnSp>
       <p:sp>
         <p:nvSpPr>
-          <p:cNvPr id="7" name="Óvalo 6"/>
+          <p:cNvPr id="32" name="Óvalo 31"/>
           <p:cNvSpPr/>
           <p:nvPr/>
         </p:nvSpPr>
         <p:spPr>
           <a:xfrm>
-            <a:off x="2750185" y="2326005"/>
+            <a:off x="8267700" y="1167765"/>
             <a:ext cx="667385" cy="699135"/>
           </a:xfrm>
           <a:prstGeom prst="ellipse">
@@ -5113,7 +4690,7 @@
               <a:buNone/>
             </a:pPr>
             <a:r>
-              <a:rPr kumimoji="0" lang="es-HN" altLang="zh-CN" sz="1400" b="0" i="0" u="none" strike="noStrike" cap="none" normalizeH="0" baseline="0" smtClean="0">
+              <a:rPr kumimoji="0" lang="es-HN" altLang="zh-CN" sz="1200" b="0" i="0" u="none" strike="noStrike" cap="none" normalizeH="0" baseline="0" smtClean="0">
                 <a:ln>
                   <a:noFill/>
                 </a:ln>
@@ -5124,9 +4701,9 @@
                 <a:latin typeface="Arial" panose="020B0604020202020204" pitchFamily="34" charset="0"/>
                 <a:ea typeface="SimSun" panose="02010600030101010101" pitchFamily="2" charset="-122"/>
               </a:rPr>
-              <a:t>q1</a:t>
-            </a:r>
-            <a:endParaRPr kumimoji="0" lang="es-HN" altLang="zh-CN" sz="1400" b="0" i="0" u="none" strike="noStrike" cap="none" normalizeH="0" baseline="0" smtClean="0">
+              <a:t>q5</a:t>
+            </a:r>
+            <a:endParaRPr kumimoji="0" lang="es-HN" altLang="zh-CN" sz="1200" b="0" i="0" u="none" strike="noStrike" cap="none" normalizeH="0" baseline="0" smtClean="0">
               <a:ln>
                 <a:noFill/>
               </a:ln>
@@ -5142,13 +4719,13 @@
       </p:sp>
       <p:cxnSp>
         <p:nvCxnSpPr>
-          <p:cNvPr id="8" name="Conector recto de flecha 7"/>
+          <p:cNvPr id="33" name="Conector recto de flecha 32"/>
           <p:cNvCxnSpPr/>
           <p:nvPr/>
         </p:nvCxnSpPr>
         <p:spPr>
           <a:xfrm flipV="1">
-            <a:off x="1989455" y="2675255"/>
+            <a:off x="7506970" y="1513205"/>
             <a:ext cx="760730" cy="8255"/>
           </a:xfrm>
           <a:prstGeom prst="straightConnector1">
@@ -5175,14 +4752,14 @@
       </p:cxnSp>
       <p:sp>
         <p:nvSpPr>
-          <p:cNvPr id="12" name="Cuadro de texto 11"/>
+          <p:cNvPr id="40" name="Cuadro de texto 39"/>
           <p:cNvSpPr txBox="1"/>
           <p:nvPr/>
         </p:nvSpPr>
         <p:spPr>
           <a:xfrm>
-            <a:off x="1950720" y="2338705"/>
-            <a:ext cx="1096645" cy="229870"/>
+            <a:off x="3364865" y="1196340"/>
+            <a:ext cx="411480" cy="213995"/>
           </a:xfrm>
           <a:prstGeom prst="rect">
             <a:avLst/>
@@ -5195,22 +4772,109 @@
           </a:bodyPr>
           <a:p>
             <a:r>
-              <a:rPr lang="es-HN" altLang="es-MX" sz="900"/>
-              <a:t>[ONION core]</a:t>
-            </a:r>
-            <a:endParaRPr lang="es-HN" altLang="es-MX" sz="900"/>
-          </a:p>
-        </p:txBody>
-      </p:sp>
-      <p:sp>
-        <p:nvSpPr>
-          <p:cNvPr id="10" name="Óvalo 9"/>
+              <a:rPr lang="es-HN" altLang="es-MX" sz="800"/>
+              <a:t>[{]</a:t>
+            </a:r>
+            <a:endParaRPr lang="es-HN" altLang="es-MX" sz="800"/>
+          </a:p>
+        </p:txBody>
+      </p:sp>
+      <p:sp>
+        <p:nvSpPr>
+          <p:cNvPr id="47" name="Cuadro de texto 46"/>
+          <p:cNvSpPr txBox="1"/>
+          <p:nvPr/>
+        </p:nvSpPr>
+        <p:spPr>
+          <a:xfrm>
+            <a:off x="2472690" y="859790"/>
+            <a:ext cx="988695" cy="213995"/>
+          </a:xfrm>
+          <a:prstGeom prst="rect">
+            <a:avLst/>
+          </a:prstGeom>
+          <a:noFill/>
+        </p:spPr>
+        <p:txBody>
+          <a:bodyPr wrap="square" rtlCol="0">
+            <a:spAutoFit/>
+          </a:bodyPr>
+          <a:p>
+            <a:r>
+              <a:rPr lang="es-HN" altLang="es-MX" sz="800"/>
+              <a:t>[nombre]</a:t>
+            </a:r>
+            <a:endParaRPr lang="es-HN" altLang="es-MX" sz="800"/>
+          </a:p>
+        </p:txBody>
+      </p:sp>
+      <p:sp>
+        <p:nvSpPr>
+          <p:cNvPr id="52" name="Cuadro de texto 51"/>
+          <p:cNvSpPr txBox="1"/>
+          <p:nvPr/>
+        </p:nvSpPr>
+        <p:spPr>
+          <a:xfrm>
+            <a:off x="6263005" y="1259840"/>
+            <a:ext cx="559435" cy="213995"/>
+          </a:xfrm>
+          <a:prstGeom prst="rect">
+            <a:avLst/>
+          </a:prstGeom>
+          <a:noFill/>
+        </p:spPr>
+        <p:txBody>
+          <a:bodyPr wrap="square" rtlCol="0">
+            <a:spAutoFit/>
+          </a:bodyPr>
+          <a:p>
+            <a:r>
+              <a:rPr lang="es-HN" altLang="es-MX" sz="800"/>
+              <a:t>[var]</a:t>
+            </a:r>
+            <a:endParaRPr lang="es-HN" altLang="es-MX" sz="800"/>
+          </a:p>
+        </p:txBody>
+      </p:sp>
+      <p:sp>
+        <p:nvSpPr>
+          <p:cNvPr id="54" name="Cuadro de texto 53"/>
+          <p:cNvSpPr txBox="1"/>
+          <p:nvPr/>
+        </p:nvSpPr>
+        <p:spPr>
+          <a:xfrm>
+            <a:off x="7607935" y="1259840"/>
+            <a:ext cx="559435" cy="213995"/>
+          </a:xfrm>
+          <a:prstGeom prst="rect">
+            <a:avLst/>
+          </a:prstGeom>
+          <a:noFill/>
+        </p:spPr>
+        <p:txBody>
+          <a:bodyPr wrap="square" rtlCol="0">
+            <a:spAutoFit/>
+          </a:bodyPr>
+          <a:p>
+            <a:r>
+              <a:rPr lang="es-HN" altLang="es-MX" sz="800"/>
+              <a:t>[func]</a:t>
+            </a:r>
+            <a:endParaRPr lang="es-HN" altLang="es-MX" sz="800"/>
+          </a:p>
+        </p:txBody>
+      </p:sp>
+      <p:sp>
+        <p:nvSpPr>
+          <p:cNvPr id="60" name="Óvalo 59"/>
           <p:cNvSpPr/>
           <p:nvPr/>
         </p:nvSpPr>
         <p:spPr>
           <a:xfrm>
-            <a:off x="4201795" y="2312035"/>
+            <a:off x="9721850" y="2331085"/>
             <a:ext cx="667385" cy="699135"/>
           </a:xfrm>
           <a:prstGeom prst="ellipse">
@@ -5251,7 +4915,7 @@
               <a:buNone/>
             </a:pPr>
             <a:r>
-              <a:rPr kumimoji="0" lang="es-HN" altLang="zh-CN" sz="1400" b="0" i="0" u="none" strike="noStrike" cap="none" normalizeH="0" baseline="0" smtClean="0">
+              <a:rPr kumimoji="0" lang="es-HN" altLang="zh-CN" sz="1200" b="0" i="0" u="none" strike="noStrike" cap="none" normalizeH="0" baseline="0" smtClean="0">
                 <a:ln>
                   <a:noFill/>
                 </a:ln>
@@ -5262,9 +4926,9 @@
                 <a:latin typeface="Arial" panose="020B0604020202020204" pitchFamily="34" charset="0"/>
                 <a:ea typeface="SimSun" panose="02010600030101010101" pitchFamily="2" charset="-122"/>
               </a:rPr>
-              <a:t>q2</a:t>
-            </a:r>
-            <a:endParaRPr kumimoji="0" lang="es-HN" altLang="zh-CN" sz="1400" b="0" i="0" u="none" strike="noStrike" cap="none" normalizeH="0" baseline="0" smtClean="0">
+              <a:t>q7</a:t>
+            </a:r>
+            <a:endParaRPr kumimoji="0" lang="es-HN" altLang="zh-CN" sz="1200" b="0" i="0" u="none" strike="noStrike" cap="none" normalizeH="0" baseline="0" smtClean="0">
               <a:ln>
                 <a:noFill/>
               </a:ln>
@@ -5280,19 +4944,23 @@
       </p:sp>
       <p:cxnSp>
         <p:nvCxnSpPr>
-          <p:cNvPr id="11" name="Conector recto de flecha 10"/>
-          <p:cNvCxnSpPr/>
+          <p:cNvPr id="62" name="Conector recto de flecha 61"/>
+          <p:cNvCxnSpPr>
+            <a:stCxn id="22" idx="4"/>
+            <a:endCxn id="60" idx="0"/>
+          </p:cNvCxnSpPr>
           <p:nvPr/>
         </p:nvCxnSpPr>
         <p:spPr>
-          <a:xfrm flipV="1">
-            <a:off x="3441065" y="2661285"/>
-            <a:ext cx="760730" cy="8255"/>
+          <a:xfrm>
+            <a:off x="10055860" y="1866900"/>
+            <a:ext cx="0" cy="464185"/>
           </a:xfrm>
           <a:prstGeom prst="straightConnector1">
             <a:avLst/>
           </a:prstGeom>
           <a:ln>
+            <a:headEnd type="none" w="med" len="med"/>
             <a:tailEnd type="arrow" w="med" len="med"/>
           </a:ln>
         </p:spPr>
@@ -5313,14 +4981,14 @@
       </p:cxnSp>
       <p:sp>
         <p:nvSpPr>
-          <p:cNvPr id="13" name="Cuadro de texto 12"/>
+          <p:cNvPr id="63" name="Cuadro de texto 62"/>
           <p:cNvSpPr txBox="1"/>
           <p:nvPr/>
         </p:nvSpPr>
         <p:spPr>
           <a:xfrm>
-            <a:off x="3450590" y="2355215"/>
-            <a:ext cx="1096645" cy="229870"/>
+            <a:off x="9189720" y="1259840"/>
+            <a:ext cx="303530" cy="213995"/>
           </a:xfrm>
           <a:prstGeom prst="rect">
             <a:avLst/>
@@ -5333,58 +5001,23 @@
           </a:bodyPr>
           <a:p>
             <a:r>
-              <a:rPr lang="es-HN" altLang="es-MX" sz="900"/>
-              <a:t>[import ,func]</a:t>
-            </a:r>
-            <a:endParaRPr lang="es-HN" altLang="es-MX" sz="900"/>
-          </a:p>
-        </p:txBody>
-      </p:sp>
-      <p:cxnSp>
-        <p:nvCxnSpPr>
-          <p:cNvPr id="17" name="Conector curvado 16"/>
-          <p:cNvCxnSpPr/>
-          <p:nvPr/>
-        </p:nvCxnSpPr>
-        <p:spPr>
-          <a:xfrm rot="16200000">
-            <a:off x="3082290" y="2169795"/>
-            <a:ext cx="3175" cy="567690"/>
-          </a:xfrm>
-          <a:prstGeom prst="curvedConnector3">
-            <a:avLst>
-              <a:gd name="adj1" fmla="val 11290000"/>
-            </a:avLst>
-          </a:prstGeom>
-          <a:ln>
-            <a:tailEnd type="arrow"/>
-          </a:ln>
-        </p:spPr>
-        <p:style>
-          <a:lnRef idx="1">
-            <a:schemeClr val="accent1"/>
-          </a:lnRef>
-          <a:fillRef idx="0">
-            <a:schemeClr val="accent1"/>
-          </a:fillRef>
-          <a:effectRef idx="0">
-            <a:schemeClr val="accent1"/>
-          </a:effectRef>
-          <a:fontRef idx="minor">
-            <a:schemeClr val="tx1"/>
-          </a:fontRef>
-        </p:style>
-      </p:cxnSp>
-      <p:sp>
-        <p:nvSpPr>
-          <p:cNvPr id="18" name="Cuadro de texto 17"/>
+              <a:rPr lang="es-HN" altLang="es-MX" sz="800"/>
+              <a:t>[if]</a:t>
+            </a:r>
+            <a:endParaRPr lang="es-HN" altLang="es-MX" sz="800"/>
+          </a:p>
+        </p:txBody>
+      </p:sp>
+      <p:sp>
+        <p:nvSpPr>
+          <p:cNvPr id="64" name="Cuadro de texto 63"/>
           <p:cNvSpPr txBox="1"/>
           <p:nvPr/>
         </p:nvSpPr>
         <p:spPr>
           <a:xfrm>
-            <a:off x="2726055" y="1823720"/>
-            <a:ext cx="1096645" cy="229870"/>
+            <a:off x="10238740" y="1889760"/>
+            <a:ext cx="455930" cy="213995"/>
           </a:xfrm>
           <a:prstGeom prst="rect">
             <a:avLst/>
@@ -5397,110 +5030,22 @@
           </a:bodyPr>
           <a:p>
             <a:r>
-              <a:rPr lang="es-HN" altLang="es-MX" sz="900"/>
-              <a:t>[ cadena,</a:t>
-            </a:r>
-            <a:r>
-              <a:rPr lang="es-HN" altLang="es-MX" sz="900" b="1"/>
-              <a:t>{</a:t>
-            </a:r>
-            <a:r>
-              <a:rPr lang="es-HN" altLang="es-MX" sz="900"/>
-              <a:t> ]</a:t>
-            </a:r>
-            <a:endParaRPr lang="es-HN" altLang="es-MX" sz="900"/>
-          </a:p>
-        </p:txBody>
-      </p:sp>
-      <p:sp>
-        <p:nvSpPr>
-          <p:cNvPr id="19" name="Cuadro de texto 18"/>
-          <p:cNvSpPr txBox="1"/>
-          <p:nvPr/>
-        </p:nvSpPr>
-        <p:spPr>
-          <a:xfrm>
-            <a:off x="3822700" y="1739265"/>
-            <a:ext cx="1478280" cy="368300"/>
-          </a:xfrm>
-          <a:prstGeom prst="rect">
-            <a:avLst/>
-          </a:prstGeom>
-          <a:noFill/>
-        </p:spPr>
-        <p:txBody>
-          <a:bodyPr wrap="square" rtlCol="0">
-            <a:spAutoFit/>
-          </a:bodyPr>
-          <a:p>
-            <a:r>
-              <a:rPr lang="es-HN" altLang="es-MX" sz="900"/>
-              <a:t>[import,func, cadena,(, main,),</a:t>
-            </a:r>
-            <a:r>
-              <a:rPr lang="es-HN" altLang="es-MX" sz="900" b="1"/>
-              <a:t>: </a:t>
-            </a:r>
-            <a:r>
-              <a:rPr lang="es-HN" altLang="es-MX" sz="900"/>
-              <a:t>, </a:t>
-            </a:r>
-            <a:r>
-              <a:rPr lang="es-HN" altLang="es-MX" sz="900" b="1"/>
-              <a:t>; </a:t>
-            </a:r>
-            <a:r>
-              <a:rPr lang="es-HN" altLang="es-MX" sz="900"/>
-              <a:t>]</a:t>
-            </a:r>
-            <a:endParaRPr lang="es-HN" altLang="es-MX" sz="900"/>
-          </a:p>
-        </p:txBody>
-      </p:sp>
-      <p:cxnSp>
-        <p:nvCxnSpPr>
-          <p:cNvPr id="21" name="Conector curvado 20"/>
-          <p:cNvCxnSpPr/>
-          <p:nvPr/>
-        </p:nvCxnSpPr>
-        <p:spPr>
-          <a:xfrm rot="16200000">
-            <a:off x="4533900" y="2166620"/>
-            <a:ext cx="3175" cy="567690"/>
-          </a:xfrm>
-          <a:prstGeom prst="curvedConnector3">
-            <a:avLst>
-              <a:gd name="adj1" fmla="val 11290000"/>
-            </a:avLst>
-          </a:prstGeom>
-          <a:ln>
-            <a:tailEnd type="arrow"/>
-          </a:ln>
-        </p:spPr>
-        <p:style>
-          <a:lnRef idx="1">
-            <a:schemeClr val="accent1"/>
-          </a:lnRef>
-          <a:fillRef idx="0">
-            <a:schemeClr val="accent1"/>
-          </a:fillRef>
-          <a:effectRef idx="0">
-            <a:schemeClr val="accent1"/>
-          </a:effectRef>
-          <a:fontRef idx="minor">
-            <a:schemeClr val="tx1"/>
-          </a:fontRef>
-        </p:style>
-      </p:cxnSp>
-      <p:sp>
-        <p:nvSpPr>
-          <p:cNvPr id="22" name="Óvalo 21"/>
+              <a:rPr lang="es-HN" altLang="es-MX" sz="800"/>
+              <a:t>[while]</a:t>
+            </a:r>
+            <a:endParaRPr lang="es-HN" altLang="es-MX" sz="800"/>
+          </a:p>
+        </p:txBody>
+      </p:sp>
+      <p:sp>
+        <p:nvSpPr>
+          <p:cNvPr id="68" name="Óvalo 67"/>
           <p:cNvSpPr/>
           <p:nvPr/>
         </p:nvSpPr>
         <p:spPr>
           <a:xfrm>
-            <a:off x="9999345" y="2355215"/>
+            <a:off x="9723755" y="3522980"/>
             <a:ext cx="667385" cy="699135"/>
           </a:xfrm>
           <a:prstGeom prst="ellipse">
@@ -5540,7 +5085,21 @@
               <a:buFontTx/>
               <a:buNone/>
             </a:pPr>
-            <a:endParaRPr kumimoji="0" lang="es-HN" altLang="zh-CN" sz="1400" b="0" i="0" u="none" strike="noStrike" cap="none" normalizeH="0" baseline="0" smtClean="0">
+            <a:r>
+              <a:rPr kumimoji="0" lang="es-HN" altLang="zh-CN" sz="1200" b="0" i="0" u="none" strike="noStrike" cap="none" normalizeH="0" baseline="0" smtClean="0">
+                <a:ln>
+                  <a:noFill/>
+                </a:ln>
+                <a:solidFill>
+                  <a:schemeClr val="tx1"/>
+                </a:solidFill>
+                <a:effectLst/>
+                <a:latin typeface="Arial" panose="020B0604020202020204" pitchFamily="34" charset="0"/>
+                <a:ea typeface="SimSun" panose="02010600030101010101" pitchFamily="2" charset="-122"/>
+              </a:rPr>
+              <a:t>q8</a:t>
+            </a:r>
+            <a:endParaRPr kumimoji="0" lang="es-HN" altLang="zh-CN" sz="1200" b="0" i="0" u="none" strike="noStrike" cap="none" normalizeH="0" baseline="0" smtClean="0">
               <a:ln>
                 <a:noFill/>
               </a:ln>
@@ -5556,19 +5115,23 @@
       </p:sp>
       <p:cxnSp>
         <p:nvCxnSpPr>
-          <p:cNvPr id="23" name="Conector recto de flecha 22"/>
-          <p:cNvCxnSpPr/>
+          <p:cNvPr id="69" name="Conector recto de flecha 68"/>
+          <p:cNvCxnSpPr>
+            <a:stCxn id="60" idx="4"/>
+            <a:endCxn id="68" idx="0"/>
+          </p:cNvCxnSpPr>
           <p:nvPr/>
         </p:nvCxnSpPr>
         <p:spPr>
-          <a:xfrm flipV="1">
-            <a:off x="9238615" y="2706370"/>
-            <a:ext cx="760730" cy="8255"/>
+          <a:xfrm>
+            <a:off x="10055860" y="3030220"/>
+            <a:ext cx="1905" cy="492760"/>
           </a:xfrm>
           <a:prstGeom prst="straightConnector1">
             <a:avLst/>
           </a:prstGeom>
           <a:ln>
+            <a:headEnd type="none" w="med" len="med"/>
             <a:tailEnd type="arrow" w="med" len="med"/>
           </a:ln>
         </p:spPr>
@@ -5589,14 +5152,14 @@
       </p:cxnSp>
       <p:sp>
         <p:nvSpPr>
-          <p:cNvPr id="24" name="Cuadro de texto 23"/>
+          <p:cNvPr id="70" name="Cuadro de texto 69"/>
           <p:cNvSpPr txBox="1"/>
           <p:nvPr/>
         </p:nvSpPr>
         <p:spPr>
           <a:xfrm>
-            <a:off x="9398635" y="2383790"/>
-            <a:ext cx="429895" cy="229870"/>
+            <a:off x="10292715" y="3169920"/>
+            <a:ext cx="683895" cy="213995"/>
           </a:xfrm>
           <a:prstGeom prst="rect">
             <a:avLst/>
@@ -5609,31 +5172,23 @@
           </a:bodyPr>
           <a:p>
             <a:r>
-              <a:rPr lang="es-HN" altLang="es-MX" sz="900"/>
-              <a:t>[ </a:t>
-            </a:r>
-            <a:r>
-              <a:rPr lang="es-HN" altLang="es-MX" sz="900" b="1"/>
-              <a:t>}</a:t>
-            </a:r>
-            <a:r>
-              <a:rPr lang="es-HN" altLang="es-MX" sz="900"/>
-              <a:t> ]</a:t>
-            </a:r>
-            <a:endParaRPr lang="es-HN" altLang="es-MX" sz="900"/>
-          </a:p>
-        </p:txBody>
-      </p:sp>
-      <p:sp>
-        <p:nvSpPr>
-          <p:cNvPr id="26" name="Óvalo 25"/>
+              <a:rPr lang="es-HN" altLang="es-MX" sz="800"/>
+              <a:t>[switch]</a:t>
+            </a:r>
+            <a:endParaRPr lang="es-HN" altLang="es-MX" sz="800"/>
+          </a:p>
+        </p:txBody>
+      </p:sp>
+      <p:sp>
+        <p:nvSpPr>
+          <p:cNvPr id="71" name="Óvalo 70"/>
           <p:cNvSpPr/>
           <p:nvPr/>
         </p:nvSpPr>
         <p:spPr>
           <a:xfrm>
-            <a:off x="10062845" y="2421255"/>
-            <a:ext cx="541020" cy="567055"/>
+            <a:off x="8267700" y="3522980"/>
+            <a:ext cx="667385" cy="699135"/>
           </a:xfrm>
           <a:prstGeom prst="ellipse">
             <a:avLst/>
@@ -5673,7 +5228,7 @@
               <a:buNone/>
             </a:pPr>
             <a:r>
-              <a:rPr kumimoji="0" lang="es-HN" altLang="zh-CN" sz="1400" b="0" i="0" u="none" strike="noStrike" cap="none" normalizeH="0" baseline="0" smtClean="0">
+              <a:rPr kumimoji="0" lang="es-HN" altLang="zh-CN" sz="1200" b="0" i="0" u="none" strike="noStrike" cap="none" normalizeH="0" baseline="0" smtClean="0">
                 <a:ln>
                   <a:noFill/>
                 </a:ln>
@@ -5684,9 +5239,9 @@
                 <a:latin typeface="Arial" panose="020B0604020202020204" pitchFamily="34" charset="0"/>
                 <a:ea typeface="SimSun" panose="02010600030101010101" pitchFamily="2" charset="-122"/>
               </a:rPr>
-              <a:t>q6</a:t>
-            </a:r>
-            <a:endParaRPr kumimoji="0" lang="es-HN" altLang="zh-CN" sz="1400" b="0" i="0" u="none" strike="noStrike" cap="none" normalizeH="0" baseline="0" smtClean="0">
+              <a:t>q9</a:t>
+            </a:r>
+            <a:endParaRPr kumimoji="0" lang="es-HN" altLang="zh-CN" sz="1200" b="0" i="0" u="none" strike="noStrike" cap="none" normalizeH="0" baseline="0" smtClean="0">
               <a:ln>
                 <a:noFill/>
               </a:ln>
@@ -5700,24 +5255,51 @@
           </a:p>
         </p:txBody>
       </p:sp>
+      <p:sp>
+        <p:nvSpPr>
+          <p:cNvPr id="72" name="Cuadro de texto 71"/>
+          <p:cNvSpPr txBox="1"/>
+          <p:nvPr/>
+        </p:nvSpPr>
+        <p:spPr>
+          <a:xfrm>
+            <a:off x="9189720" y="3523615"/>
+            <a:ext cx="455930" cy="213995"/>
+          </a:xfrm>
+          <a:prstGeom prst="rect">
+            <a:avLst/>
+          </a:prstGeom>
+          <a:noFill/>
+        </p:spPr>
+        <p:txBody>
+          <a:bodyPr wrap="square" rtlCol="0">
+            <a:spAutoFit/>
+          </a:bodyPr>
+          <a:p>
+            <a:r>
+              <a:rPr lang="es-HN" altLang="es-MX" sz="800"/>
+              <a:t>[print]</a:t>
+            </a:r>
+            <a:endParaRPr lang="es-HN" altLang="es-MX" sz="800"/>
+          </a:p>
+        </p:txBody>
+      </p:sp>
       <p:cxnSp>
         <p:nvCxnSpPr>
-          <p:cNvPr id="27" name="Conector curvado 26"/>
+          <p:cNvPr id="73" name="Conector recto de flecha 72"/>
           <p:cNvCxnSpPr>
-            <a:stCxn id="22" idx="4"/>
-            <a:endCxn id="7" idx="4"/>
+            <a:stCxn id="68" idx="2"/>
+            <a:endCxn id="71" idx="6"/>
           </p:cNvCxnSpPr>
           <p:nvPr/>
         </p:nvCxnSpPr>
         <p:spPr>
-          <a:xfrm rot="5400000" flipH="1">
-            <a:off x="6685915" y="-584835"/>
-            <a:ext cx="29210" cy="7249160"/>
-          </a:xfrm>
-          <a:prstGeom prst="curvedConnector3">
-            <a:avLst>
-              <a:gd name="adj1" fmla="val -2563043"/>
-            </a:avLst>
+          <a:xfrm flipH="1">
+            <a:off x="8935085" y="3872865"/>
+            <a:ext cx="788670" cy="0"/>
+          </a:xfrm>
+          <a:prstGeom prst="straightConnector1">
+            <a:avLst/>
           </a:prstGeom>
           <a:ln>
             <a:headEnd type="none" w="med" len="med"/>
@@ -5726,13 +5308,13 @@
         </p:spPr>
         <p:style>
           <a:lnRef idx="3">
-            <a:schemeClr val="accent2"/>
+            <a:schemeClr val="accent6"/>
           </a:lnRef>
           <a:fillRef idx="0">
-            <a:schemeClr val="accent2"/>
+            <a:schemeClr val="accent6"/>
           </a:fillRef>
           <a:effectRef idx="2">
-            <a:schemeClr val="accent2"/>
+            <a:schemeClr val="accent6"/>
           </a:effectRef>
           <a:fontRef idx="minor">
             <a:schemeClr val="tx1"/>
@@ -5741,50 +5323,13 @@
       </p:cxnSp>
       <p:sp>
         <p:nvSpPr>
-          <p:cNvPr id="28" name="Cuadro de texto 27"/>
-          <p:cNvSpPr txBox="1"/>
-          <p:nvPr/>
-        </p:nvSpPr>
-        <p:spPr>
-          <a:xfrm>
-            <a:off x="8545195" y="3743960"/>
-            <a:ext cx="932180" cy="229870"/>
-          </a:xfrm>
-          <a:prstGeom prst="rect">
-            <a:avLst/>
-          </a:prstGeom>
-          <a:noFill/>
-        </p:spPr>
-        <p:txBody>
-          <a:bodyPr wrap="none" rtlCol="0" anchor="t">
-            <a:spAutoFit/>
-          </a:bodyPr>
-          <a:p>
-            <a:r>
-              <a:rPr lang="es-HN" altLang="es-MX" sz="900">
-                <a:sym typeface="+mn-ea"/>
-              </a:rPr>
-              <a:t>[</a:t>
-            </a:r>
-            <a:r>
-              <a:rPr lang="es-HN" altLang="es-MX" sz="900">
-                <a:sym typeface="+mn-ea"/>
-              </a:rPr>
-              <a:t>ONION layer ]</a:t>
-            </a:r>
-            <a:endParaRPr lang="es-MX" altLang="en-US" sz="900"/>
-          </a:p>
-        </p:txBody>
-      </p:sp>
-      <p:sp>
-        <p:nvSpPr>
-          <p:cNvPr id="2" name="Óvalo 1"/>
+          <p:cNvPr id="74" name="Óvalo 73"/>
           <p:cNvSpPr/>
           <p:nvPr/>
         </p:nvSpPr>
         <p:spPr>
           <a:xfrm>
-            <a:off x="5653405" y="2312670"/>
+            <a:off x="7006590" y="3523615"/>
             <a:ext cx="667385" cy="699135"/>
           </a:xfrm>
           <a:prstGeom prst="ellipse">
@@ -5825,7 +5370,7 @@
               <a:buNone/>
             </a:pPr>
             <a:r>
-              <a:rPr kumimoji="0" lang="es-HN" altLang="zh-CN" sz="1400" b="0" i="0" u="none" strike="noStrike" cap="none" normalizeH="0" baseline="0" smtClean="0">
+              <a:rPr kumimoji="0" lang="es-HN" altLang="zh-CN" sz="1200" b="0" i="0" u="none" strike="noStrike" cap="none" normalizeH="0" baseline="0" smtClean="0">
                 <a:ln>
                   <a:noFill/>
                 </a:ln>
@@ -5836,9 +5381,9 @@
                 <a:latin typeface="Arial" panose="020B0604020202020204" pitchFamily="34" charset="0"/>
                 <a:ea typeface="SimSun" panose="02010600030101010101" pitchFamily="2" charset="-122"/>
               </a:rPr>
-              <a:t>q3</a:t>
-            </a:r>
-            <a:endParaRPr kumimoji="0" lang="es-HN" altLang="zh-CN" sz="1400" b="0" i="0" u="none" strike="noStrike" cap="none" normalizeH="0" baseline="0" smtClean="0">
+              <a:t>q10</a:t>
+            </a:r>
+            <a:endParaRPr kumimoji="0" lang="es-HN" altLang="zh-CN" sz="1200" b="0" i="0" u="none" strike="noStrike" cap="none" normalizeH="0" baseline="0" smtClean="0">
               <a:ln>
                 <a:noFill/>
               </a:ln>
@@ -5854,19 +5399,23 @@
       </p:sp>
       <p:cxnSp>
         <p:nvCxnSpPr>
-          <p:cNvPr id="3" name="Conector recto de flecha 2"/>
-          <p:cNvCxnSpPr/>
+          <p:cNvPr id="75" name="Conector recto de flecha 74"/>
+          <p:cNvCxnSpPr>
+            <a:stCxn id="71" idx="2"/>
+            <a:endCxn id="74" idx="6"/>
+          </p:cNvCxnSpPr>
           <p:nvPr/>
         </p:nvCxnSpPr>
         <p:spPr>
-          <a:xfrm flipV="1">
-            <a:off x="4892675" y="2661920"/>
-            <a:ext cx="760730" cy="8255"/>
+          <a:xfrm flipH="1">
+            <a:off x="7673975" y="3872865"/>
+            <a:ext cx="593725" cy="635"/>
           </a:xfrm>
           <a:prstGeom prst="straightConnector1">
             <a:avLst/>
           </a:prstGeom>
           <a:ln>
+            <a:headEnd type="none" w="med" len="med"/>
             <a:tailEnd type="arrow" w="med" len="med"/>
           </a:ln>
         </p:spPr>
@@ -5887,14 +5436,14 @@
       </p:cxnSp>
       <p:sp>
         <p:nvSpPr>
-          <p:cNvPr id="4" name="Cuadro de texto 3"/>
+          <p:cNvPr id="76" name="Cuadro de texto 75"/>
           <p:cNvSpPr txBox="1"/>
           <p:nvPr/>
         </p:nvSpPr>
         <p:spPr>
           <a:xfrm>
-            <a:off x="5052695" y="2339340"/>
-            <a:ext cx="525780" cy="229870"/>
+            <a:off x="7743190" y="3522980"/>
+            <a:ext cx="455930" cy="275590"/>
           </a:xfrm>
           <a:prstGeom prst="rect">
             <a:avLst/>
@@ -5907,23 +5456,64 @@
           </a:bodyPr>
           <a:p>
             <a:r>
-              <a:rPr lang="es-HN" altLang="es-MX" sz="900"/>
-              <a:t>[var]</a:t>
-            </a:r>
-            <a:endParaRPr lang="es-HN" altLang="es-MX" sz="900"/>
-          </a:p>
-        </p:txBody>
-      </p:sp>
-      <p:sp>
-        <p:nvSpPr>
-          <p:cNvPr id="5" name="Cuadro de texto 4"/>
+              <a:rPr lang="es-HN" altLang="es-MX" sz="1200"/>
+              <a:t>[;]</a:t>
+            </a:r>
+            <a:endParaRPr lang="es-HN" altLang="es-MX" sz="1200"/>
+          </a:p>
+        </p:txBody>
+      </p:sp>
+      <p:cxnSp>
+        <p:nvCxnSpPr>
+          <p:cNvPr id="77" name="Conector curvado 76"/>
+          <p:cNvCxnSpPr>
+            <a:stCxn id="74" idx="1"/>
+            <a:endCxn id="74" idx="7"/>
+          </p:cNvCxnSpPr>
+          <p:nvPr/>
+        </p:nvCxnSpPr>
+        <p:spPr>
+          <a:xfrm rot="16200000">
+            <a:off x="7339965" y="3390265"/>
+            <a:ext cx="3175" cy="471805"/>
+          </a:xfrm>
+          <a:prstGeom prst="curvedConnector3">
+            <a:avLst>
+              <a:gd name="adj1" fmla="val 10780000"/>
+            </a:avLst>
+          </a:prstGeom>
+          <a:gradFill rotWithShape="0">
+            <a:gsLst>
+              <a:gs pos="0">
+                <a:schemeClr val="accent1"/>
+              </a:gs>
+              <a:gs pos="100000">
+                <a:schemeClr val="accent2"/>
+              </a:gs>
+            </a:gsLst>
+            <a:lin ang="5400000" scaled="1"/>
+          </a:gradFill>
+          <a:ln w="9525" cap="flat" cmpd="sng" algn="ctr">
+            <a:solidFill>
+              <a:schemeClr val="accent1"/>
+            </a:solidFill>
+            <a:prstDash val="solid"/>
+            <a:round/>
+            <a:headEnd type="none" w="med" len="med"/>
+            <a:tailEnd type="arrow" w="med" len="med"/>
+          </a:ln>
+        </p:spPr>
+      </p:cxnSp>
+      <p:sp>
+        <p:nvSpPr>
+          <p:cNvPr id="78" name="Cuadro de texto 77"/>
           <p:cNvSpPr txBox="1"/>
           <p:nvPr/>
         </p:nvSpPr>
         <p:spPr>
           <a:xfrm>
-            <a:off x="5526405" y="1831975"/>
-            <a:ext cx="1330325" cy="229870"/>
+            <a:off x="7152005" y="3030220"/>
+            <a:ext cx="455930" cy="275590"/>
           </a:xfrm>
           <a:prstGeom prst="rect">
             <a:avLst/>
@@ -5936,130 +5526,30 @@
           </a:bodyPr>
           <a:p>
             <a:r>
-              <a:rPr lang="es-HN" altLang="es-MX" sz="900"/>
-              <a:t>[ var,cadena,=, </a:t>
-            </a:r>
-            <a:r>
-              <a:rPr lang="es-HN" altLang="es-MX" sz="900" b="1"/>
-              <a:t>; </a:t>
-            </a:r>
-            <a:r>
-              <a:rPr lang="es-HN" altLang="es-MX" sz="900"/>
-              <a:t>]</a:t>
-            </a:r>
-            <a:endParaRPr lang="es-HN" altLang="es-MX" sz="900"/>
-          </a:p>
-        </p:txBody>
-      </p:sp>
-      <p:cxnSp>
-        <p:nvCxnSpPr>
-          <p:cNvPr id="14" name="Conector curvado 13"/>
-          <p:cNvCxnSpPr/>
-          <p:nvPr/>
-        </p:nvCxnSpPr>
-        <p:spPr>
-          <a:xfrm rot="16200000">
-            <a:off x="5985510" y="2167255"/>
-            <a:ext cx="3175" cy="567690"/>
-          </a:xfrm>
-          <a:prstGeom prst="curvedConnector3">
-            <a:avLst>
-              <a:gd name="adj1" fmla="val 11290000"/>
-            </a:avLst>
-          </a:prstGeom>
-          <a:ln>
-            <a:tailEnd type="arrow"/>
-          </a:ln>
-        </p:spPr>
-        <p:style>
-          <a:lnRef idx="1">
-            <a:schemeClr val="accent1"/>
-          </a:lnRef>
-          <a:fillRef idx="0">
-            <a:schemeClr val="accent1"/>
-          </a:fillRef>
-          <a:effectRef idx="0">
-            <a:schemeClr val="accent1"/>
-          </a:effectRef>
-          <a:fontRef idx="minor">
-            <a:schemeClr val="tx1"/>
-          </a:fontRef>
-        </p:style>
-      </p:cxnSp>
-      <p:cxnSp>
-        <p:nvCxnSpPr>
-          <p:cNvPr id="15" name="Conector curvado 14"/>
-          <p:cNvCxnSpPr/>
-          <p:nvPr/>
-        </p:nvCxnSpPr>
-        <p:spPr>
-          <a:xfrm rot="5400000" flipH="1">
-            <a:off x="5271135" y="2283460"/>
-            <a:ext cx="3175" cy="1451610"/>
-          </a:xfrm>
-          <a:prstGeom prst="curvedConnector3">
-            <a:avLst>
-              <a:gd name="adj1" fmla="val -37450000"/>
-            </a:avLst>
-          </a:prstGeom>
-          <a:ln>
-            <a:headEnd type="none" w="med" len="med"/>
-            <a:tailEnd type="arrow" w="med" len="med"/>
-          </a:ln>
-        </p:spPr>
-        <p:style>
-          <a:lnRef idx="2">
-            <a:schemeClr val="accent6"/>
-          </a:lnRef>
-          <a:fillRef idx="0">
-            <a:schemeClr val="accent6"/>
-          </a:fillRef>
-          <a:effectRef idx="1">
-            <a:schemeClr val="accent6"/>
-          </a:effectRef>
-          <a:fontRef idx="minor">
-            <a:schemeClr val="tx1"/>
-          </a:fontRef>
-        </p:style>
-      </p:cxnSp>
-      <p:sp>
-        <p:nvSpPr>
-          <p:cNvPr id="16" name="Cuadro de texto 15"/>
-          <p:cNvSpPr txBox="1"/>
-          <p:nvPr/>
-        </p:nvSpPr>
-        <p:spPr>
-          <a:xfrm>
-            <a:off x="5402580" y="4274820"/>
-            <a:ext cx="1096645" cy="229870"/>
-          </a:xfrm>
-          <a:prstGeom prst="rect">
-            <a:avLst/>
-          </a:prstGeom>
-          <a:noFill/>
-        </p:spPr>
-        <p:txBody>
-          <a:bodyPr wrap="square" rtlCol="0">
-            <a:spAutoFit/>
-          </a:bodyPr>
-          <a:p>
-            <a:r>
-              <a:rPr lang="es-HN" altLang="es-MX" sz="900"/>
-              <a:t>[func]</a:t>
-            </a:r>
-            <a:endParaRPr lang="es-HN" altLang="es-MX" sz="900"/>
-          </a:p>
-        </p:txBody>
-      </p:sp>
-      <p:sp>
-        <p:nvSpPr>
-          <p:cNvPr id="20" name="Óvalo 19"/>
+              <a:rPr lang="es-HN" altLang="es-MX" sz="1200">
+                <a:solidFill>
+                  <a:schemeClr val="accent1"/>
+                </a:solidFill>
+              </a:rPr>
+              <a:t>[;]</a:t>
+            </a:r>
+            <a:endParaRPr lang="es-HN" altLang="es-MX" sz="1200">
+              <a:solidFill>
+                <a:schemeClr val="accent1"/>
+              </a:solidFill>
+            </a:endParaRPr>
+          </a:p>
+        </p:txBody>
+      </p:sp>
+      <p:sp>
+        <p:nvSpPr>
+          <p:cNvPr id="79" name="Óvalo 78"/>
           <p:cNvSpPr/>
           <p:nvPr/>
         </p:nvSpPr>
         <p:spPr>
           <a:xfrm>
-            <a:off x="7099935" y="2378075"/>
+            <a:off x="5762625" y="3523615"/>
             <a:ext cx="667385" cy="699135"/>
           </a:xfrm>
           <a:prstGeom prst="ellipse">
@@ -6100,7 +5590,7 @@
               <a:buNone/>
             </a:pPr>
             <a:r>
-              <a:rPr kumimoji="0" lang="es-HN" altLang="zh-CN" sz="1400" b="0" i="0" u="none" strike="noStrike" cap="none" normalizeH="0" baseline="0" smtClean="0">
+              <a:rPr kumimoji="0" lang="es-HN" altLang="zh-CN" sz="1200" b="0" i="0" u="none" strike="noStrike" cap="none" normalizeH="0" baseline="0" smtClean="0">
                 <a:ln>
                   <a:noFill/>
                 </a:ln>
@@ -6111,9 +5601,9 @@
                 <a:latin typeface="Arial" panose="020B0604020202020204" pitchFamily="34" charset="0"/>
                 <a:ea typeface="SimSun" panose="02010600030101010101" pitchFamily="2" charset="-122"/>
               </a:rPr>
-              <a:t>q4</a:t>
-            </a:r>
-            <a:endParaRPr kumimoji="0" lang="es-HN" altLang="zh-CN" sz="1400" b="0" i="0" u="none" strike="noStrike" cap="none" normalizeH="0" baseline="0" smtClean="0">
+              <a:t>q11</a:t>
+            </a:r>
+            <a:endParaRPr kumimoji="0" lang="es-HN" altLang="zh-CN" sz="1200" b="0" i="0" u="none" strike="noStrike" cap="none" normalizeH="0" baseline="0" smtClean="0">
               <a:ln>
                 <a:noFill/>
               </a:ln>
@@ -6129,19 +5619,23 @@
       </p:sp>
       <p:cxnSp>
         <p:nvCxnSpPr>
-          <p:cNvPr id="25" name="Conector recto de flecha 24"/>
-          <p:cNvCxnSpPr/>
+          <p:cNvPr id="80" name="Conector recto de flecha 79"/>
+          <p:cNvCxnSpPr>
+            <a:stCxn id="74" idx="2"/>
+            <a:endCxn id="79" idx="6"/>
+          </p:cNvCxnSpPr>
           <p:nvPr/>
         </p:nvCxnSpPr>
         <p:spPr>
-          <a:xfrm flipV="1">
-            <a:off x="6339205" y="2727325"/>
-            <a:ext cx="760730" cy="8255"/>
+          <a:xfrm flipH="1">
+            <a:off x="6430010" y="3873500"/>
+            <a:ext cx="576580" cy="0"/>
           </a:xfrm>
           <a:prstGeom prst="straightConnector1">
             <a:avLst/>
           </a:prstGeom>
           <a:ln>
+            <a:headEnd type="none" w="med" len="med"/>
             <a:tailEnd type="arrow" w="med" len="med"/>
           </a:ln>
         </p:spPr>
@@ -6162,14 +5656,14 @@
       </p:cxnSp>
       <p:sp>
         <p:nvSpPr>
-          <p:cNvPr id="29" name="Cuadro de texto 28"/>
+          <p:cNvPr id="81" name="Cuadro de texto 80"/>
           <p:cNvSpPr txBox="1"/>
           <p:nvPr/>
         </p:nvSpPr>
         <p:spPr>
           <a:xfrm>
-            <a:off x="6499225" y="2404745"/>
-            <a:ext cx="424180" cy="229870"/>
+            <a:off x="6490335" y="3522980"/>
+            <a:ext cx="455930" cy="275590"/>
           </a:xfrm>
           <a:prstGeom prst="rect">
             <a:avLst/>
@@ -6182,103 +5676,23 @@
           </a:bodyPr>
           <a:p>
             <a:r>
-              <a:rPr lang="es-HN" altLang="es-MX" sz="900"/>
-              <a:t>[if]</a:t>
-            </a:r>
-            <a:endParaRPr lang="es-HN" altLang="es-MX" sz="900"/>
-          </a:p>
-        </p:txBody>
-      </p:sp>
-      <p:sp>
-        <p:nvSpPr>
-          <p:cNvPr id="30" name="Cuadro de texto 29"/>
-          <p:cNvSpPr txBox="1"/>
-          <p:nvPr/>
-        </p:nvSpPr>
-        <p:spPr>
-          <a:xfrm>
-            <a:off x="6695440" y="1802130"/>
-            <a:ext cx="1477645" cy="368300"/>
-          </a:xfrm>
-          <a:prstGeom prst="rect">
-            <a:avLst/>
-          </a:prstGeom>
-          <a:noFill/>
-        </p:spPr>
-        <p:txBody>
-          <a:bodyPr wrap="square" rtlCol="0">
-            <a:spAutoFit/>
-          </a:bodyPr>
-          <a:p>
-            <a:r>
-              <a:rPr lang="es-HN" altLang="es-MX" sz="900"/>
-              <a:t>[ if,elif,else(, condicion,),</a:t>
-            </a:r>
-            <a:r>
-              <a:rPr lang="es-HN" altLang="es-MX" sz="900" b="1"/>
-              <a:t>:</a:t>
-            </a:r>
-            <a:r>
-              <a:rPr lang="es-HN" altLang="es-MX" sz="900"/>
-              <a:t>,cadena , </a:t>
-            </a:r>
-            <a:r>
-              <a:rPr lang="es-HN" altLang="es-MX" sz="900" b="1"/>
-              <a:t>; </a:t>
-            </a:r>
-            <a:r>
-              <a:rPr lang="es-HN" altLang="es-MX" sz="900"/>
-              <a:t>]</a:t>
-            </a:r>
-            <a:endParaRPr lang="es-HN" altLang="es-MX" sz="900"/>
-          </a:p>
-        </p:txBody>
-      </p:sp>
-      <p:cxnSp>
-        <p:nvCxnSpPr>
-          <p:cNvPr id="31" name="Conector curvado 30"/>
-          <p:cNvCxnSpPr/>
-          <p:nvPr/>
-        </p:nvCxnSpPr>
-        <p:spPr>
-          <a:xfrm rot="16200000">
-            <a:off x="7432040" y="2232660"/>
-            <a:ext cx="3175" cy="567690"/>
-          </a:xfrm>
-          <a:prstGeom prst="curvedConnector3">
-            <a:avLst>
-              <a:gd name="adj1" fmla="val 11290000"/>
-            </a:avLst>
-          </a:prstGeom>
-          <a:ln>
-            <a:tailEnd type="arrow"/>
-          </a:ln>
-        </p:spPr>
-        <p:style>
-          <a:lnRef idx="1">
-            <a:schemeClr val="accent1"/>
-          </a:lnRef>
-          <a:fillRef idx="0">
-            <a:schemeClr val="accent1"/>
-          </a:fillRef>
-          <a:effectRef idx="0">
-            <a:schemeClr val="accent1"/>
-          </a:effectRef>
-          <a:fontRef idx="minor">
-            <a:schemeClr val="tx1"/>
-          </a:fontRef>
-        </p:style>
-      </p:cxnSp>
-      <p:sp>
-        <p:nvSpPr>
-          <p:cNvPr id="32" name="Óvalo 31"/>
+              <a:rPr lang="es-HN" altLang="es-MX" sz="1200"/>
+              <a:t>[{]</a:t>
+            </a:r>
+            <a:endParaRPr lang="es-HN" altLang="es-MX" sz="1200"/>
+          </a:p>
+        </p:txBody>
+      </p:sp>
+      <p:sp>
+        <p:nvSpPr>
+          <p:cNvPr id="82" name="Óvalo 81"/>
           <p:cNvSpPr/>
           <p:nvPr/>
         </p:nvSpPr>
         <p:spPr>
           <a:xfrm>
-            <a:off x="8545195" y="2355215"/>
-            <a:ext cx="667385" cy="699135"/>
+            <a:off x="5834380" y="3589020"/>
+            <a:ext cx="541020" cy="570865"/>
           </a:xfrm>
           <a:prstGeom prst="ellipse">
             <a:avLst/>
@@ -6318,7 +5732,7 @@
               <a:buNone/>
             </a:pPr>
             <a:r>
-              <a:rPr kumimoji="0" lang="es-HN" altLang="zh-CN" sz="1400" b="0" i="0" u="none" strike="noStrike" cap="none" normalizeH="0" baseline="0" smtClean="0">
+              <a:rPr kumimoji="0" lang="es-HN" altLang="zh-CN" sz="1200" b="0" i="0" u="none" strike="noStrike" cap="none" normalizeH="0" baseline="0" smtClean="0">
                 <a:ln>
                   <a:noFill/>
                 </a:ln>
@@ -6329,9 +5743,9 @@
                 <a:latin typeface="Arial" panose="020B0604020202020204" pitchFamily="34" charset="0"/>
                 <a:ea typeface="SimSun" panose="02010600030101010101" pitchFamily="2" charset="-122"/>
               </a:rPr>
-              <a:t>q5</a:t>
-            </a:r>
-            <a:endParaRPr kumimoji="0" lang="es-HN" altLang="zh-CN" sz="1400" b="0" i="0" u="none" strike="noStrike" cap="none" normalizeH="0" baseline="0" smtClean="0">
+              <a:t>q11</a:t>
+            </a:r>
+            <a:endParaRPr kumimoji="0" lang="es-HN" altLang="zh-CN" sz="1200" b="0" i="0" u="none" strike="noStrike" cap="none" normalizeH="0" baseline="0" smtClean="0">
               <a:ln>
                 <a:noFill/>
               </a:ln>
@@ -6347,292 +5761,34 @@
       </p:sp>
       <p:cxnSp>
         <p:nvCxnSpPr>
-          <p:cNvPr id="33" name="Conector recto de flecha 32"/>
+          <p:cNvPr id="83" name="Conector recto de flecha 82"/>
           <p:cNvCxnSpPr/>
           <p:nvPr/>
         </p:nvCxnSpPr>
         <p:spPr>
-          <a:xfrm flipV="1">
-            <a:off x="7784465" y="2700655"/>
-            <a:ext cx="760730" cy="8255"/>
+          <a:xfrm flipH="1" flipV="1">
+            <a:off x="2806700" y="1837690"/>
+            <a:ext cx="2955925" cy="2035810"/>
           </a:xfrm>
           <a:prstGeom prst="straightConnector1">
             <a:avLst/>
           </a:prstGeom>
           <a:ln>
-            <a:tailEnd type="arrow" w="med" len="med"/>
-          </a:ln>
-        </p:spPr>
-        <p:style>
-          <a:lnRef idx="3">
-            <a:schemeClr val="accent6"/>
-          </a:lnRef>
-          <a:fillRef idx="0">
-            <a:schemeClr val="accent6"/>
-          </a:fillRef>
-          <a:effectRef idx="2">
-            <a:schemeClr val="accent6"/>
-          </a:effectRef>
-          <a:fontRef idx="minor">
-            <a:schemeClr val="tx1"/>
-          </a:fontRef>
-        </p:style>
-      </p:cxnSp>
-      <p:sp>
-        <p:nvSpPr>
-          <p:cNvPr id="34" name="Cuadro de texto 33"/>
-          <p:cNvSpPr txBox="1"/>
-          <p:nvPr/>
-        </p:nvSpPr>
-        <p:spPr>
-          <a:xfrm>
-            <a:off x="7809865" y="2401570"/>
-            <a:ext cx="1096645" cy="229870"/>
-          </a:xfrm>
-          <a:prstGeom prst="rect">
-            <a:avLst/>
-          </a:prstGeom>
-          <a:noFill/>
-        </p:spPr>
-        <p:txBody>
-          <a:bodyPr wrap="square" rtlCol="0">
-            <a:spAutoFit/>
-          </a:bodyPr>
-          <a:p>
-            <a:r>
-              <a:rPr lang="es-HN" altLang="es-MX" sz="900"/>
-              <a:t>[do,while,for]</a:t>
-            </a:r>
-            <a:endParaRPr lang="es-HN" altLang="es-MX" sz="900"/>
-          </a:p>
-        </p:txBody>
-      </p:sp>
-      <p:sp>
-        <p:nvSpPr>
-          <p:cNvPr id="35" name="Cuadro de texto 34"/>
-          <p:cNvSpPr txBox="1"/>
-          <p:nvPr/>
-        </p:nvSpPr>
-        <p:spPr>
-          <a:xfrm>
-            <a:off x="8314055" y="1739265"/>
-            <a:ext cx="1330325" cy="368300"/>
-          </a:xfrm>
-          <a:prstGeom prst="rect">
-            <a:avLst/>
-          </a:prstGeom>
-          <a:noFill/>
-        </p:spPr>
-        <p:txBody>
-          <a:bodyPr wrap="square" rtlCol="0">
-            <a:spAutoFit/>
-          </a:bodyPr>
-          <a:p>
-            <a:r>
-              <a:rPr lang="es-HN" altLang="es-MX" sz="900"/>
-              <a:t>[ cadena,(, codicion,),</a:t>
-            </a:r>
-            <a:r>
-              <a:rPr lang="es-HN" altLang="es-MX" sz="900" b="1"/>
-              <a:t>: </a:t>
-            </a:r>
-            <a:r>
-              <a:rPr lang="es-HN" altLang="es-MX" sz="900"/>
-              <a:t>, </a:t>
-            </a:r>
-            <a:r>
-              <a:rPr lang="es-HN" altLang="es-MX" sz="900" b="1"/>
-              <a:t>; </a:t>
-            </a:r>
-            <a:r>
-              <a:rPr lang="es-HN" altLang="es-MX" sz="900"/>
-              <a:t>]</a:t>
-            </a:r>
-            <a:endParaRPr lang="es-HN" altLang="es-MX" sz="900"/>
-          </a:p>
-        </p:txBody>
-      </p:sp>
-      <p:cxnSp>
-        <p:nvCxnSpPr>
-          <p:cNvPr id="36" name="Conector curvado 35"/>
-          <p:cNvCxnSpPr/>
-          <p:nvPr/>
-        </p:nvCxnSpPr>
-        <p:spPr>
-          <a:xfrm rot="16200000">
-            <a:off x="8877300" y="2205990"/>
-            <a:ext cx="3175" cy="567690"/>
-          </a:xfrm>
-          <a:prstGeom prst="curvedConnector3">
-            <a:avLst>
-              <a:gd name="adj1" fmla="val 11290000"/>
-            </a:avLst>
-          </a:prstGeom>
-          <a:ln>
-            <a:tailEnd type="arrow"/>
-          </a:ln>
-        </p:spPr>
-        <p:style>
-          <a:lnRef idx="1">
-            <a:schemeClr val="accent1"/>
-          </a:lnRef>
-          <a:fillRef idx="0">
-            <a:schemeClr val="accent1"/>
-          </a:fillRef>
-          <a:effectRef idx="0">
-            <a:schemeClr val="accent1"/>
-          </a:effectRef>
-          <a:fontRef idx="minor">
-            <a:schemeClr val="tx1"/>
-          </a:fontRef>
-        </p:style>
-      </p:cxnSp>
-      <p:sp>
-        <p:nvSpPr>
-          <p:cNvPr id="37" name="Cuadro de texto 36"/>
-          <p:cNvSpPr txBox="1"/>
-          <p:nvPr/>
-        </p:nvSpPr>
-        <p:spPr>
-          <a:xfrm>
-            <a:off x="926465" y="5143500"/>
-            <a:ext cx="8963660" cy="583565"/>
-          </a:xfrm>
-          <a:prstGeom prst="rect">
-            <a:avLst/>
-          </a:prstGeom>
-          <a:noFill/>
-        </p:spPr>
-        <p:txBody>
-          <a:bodyPr wrap="none" rtlCol="0">
-            <a:spAutoFit/>
-          </a:bodyPr>
-          <a:p>
-            <a:r>
-              <a:rPr lang="es-HN" altLang="es-MX" sz="1600"/>
-              <a:t>Nota: Con “cadena nos referimos a codigo en general que se va leyendo, palabras no reservadas</a:t>
-            </a:r>
-            <a:endParaRPr lang="es-HN" altLang="es-MX" sz="1600"/>
-          </a:p>
-          <a:p>
-            <a:r>
-              <a:rPr lang="es-HN" altLang="es-MX" sz="1600"/>
-              <a:t>, numeros , espresiones aritmeticas, esto para simplicar el ejmplo”</a:t>
-            </a:r>
-            <a:endParaRPr lang="es-HN" altLang="es-MX" sz="1600"/>
-          </a:p>
-        </p:txBody>
-      </p:sp>
-      <p:cxnSp>
-        <p:nvCxnSpPr>
-          <p:cNvPr id="38" name="Conector curvado 37"/>
-          <p:cNvCxnSpPr>
-            <a:stCxn id="20" idx="4"/>
-            <a:endCxn id="10" idx="4"/>
-          </p:cNvCxnSpPr>
-          <p:nvPr/>
-        </p:nvCxnSpPr>
-        <p:spPr>
-          <a:xfrm rot="5400000" flipH="1">
-            <a:off x="5951855" y="1595120"/>
-            <a:ext cx="66040" cy="2898140"/>
-          </a:xfrm>
-          <a:prstGeom prst="curvedConnector3">
-            <a:avLst>
-              <a:gd name="adj1" fmla="val -1711538"/>
-            </a:avLst>
-          </a:prstGeom>
-          <a:ln>
+            <a:solidFill>
+              <a:srgbClr val="00B0F0"/>
+            </a:solidFill>
             <a:headEnd type="none" w="med" len="med"/>
             <a:tailEnd type="arrow" w="med" len="med"/>
           </a:ln>
         </p:spPr>
         <p:style>
           <a:lnRef idx="2">
-            <a:schemeClr val="accent6"/>
-          </a:lnRef>
-          <a:fillRef idx="0">
-            <a:schemeClr val="accent6"/>
-          </a:fillRef>
-          <a:effectRef idx="1">
-            <a:schemeClr val="accent6"/>
-          </a:effectRef>
-          <a:fontRef idx="minor">
-            <a:schemeClr val="tx1"/>
-          </a:fontRef>
-        </p:style>
-      </p:cxnSp>
-      <p:cxnSp>
-        <p:nvCxnSpPr>
-          <p:cNvPr id="39" name="Conector curvado 38"/>
-          <p:cNvCxnSpPr>
-            <a:stCxn id="32" idx="4"/>
-            <a:endCxn id="10" idx="4"/>
-          </p:cNvCxnSpPr>
-          <p:nvPr/>
-        </p:nvCxnSpPr>
-        <p:spPr>
-          <a:xfrm rot="5400000" flipH="1">
-            <a:off x="6685915" y="861060"/>
-            <a:ext cx="43180" cy="4343400"/>
-          </a:xfrm>
-          <a:prstGeom prst="curvedConnector3">
-            <a:avLst>
-              <a:gd name="adj1" fmla="val -2755882"/>
-            </a:avLst>
-          </a:prstGeom>
-          <a:ln>
-            <a:headEnd type="none" w="med" len="med"/>
-            <a:tailEnd type="arrow" w="med" len="med"/>
-          </a:ln>
-        </p:spPr>
-        <p:style>
-          <a:lnRef idx="2">
-            <a:schemeClr val="accent6"/>
-          </a:lnRef>
-          <a:fillRef idx="0">
-            <a:schemeClr val="accent6"/>
-          </a:fillRef>
-          <a:effectRef idx="1">
-            <a:schemeClr val="accent6"/>
-          </a:effectRef>
-          <a:fontRef idx="minor">
-            <a:schemeClr val="tx1"/>
-          </a:fontRef>
-        </p:style>
-      </p:cxnSp>
-      <p:cxnSp>
-        <p:nvCxnSpPr>
-          <p:cNvPr id="41" name="Conector curvado 40"/>
-          <p:cNvCxnSpPr>
-            <a:stCxn id="32" idx="4"/>
-            <a:endCxn id="2" idx="4"/>
-          </p:cNvCxnSpPr>
-          <p:nvPr/>
-        </p:nvCxnSpPr>
-        <p:spPr>
-          <a:xfrm rot="5400000" flipH="1">
-            <a:off x="7412355" y="1586865"/>
-            <a:ext cx="42545" cy="2891790"/>
-          </a:xfrm>
-          <a:prstGeom prst="curvedConnector3">
-            <a:avLst>
-              <a:gd name="adj1" fmla="val -3754477"/>
-            </a:avLst>
-          </a:prstGeom>
-          <a:ln>
-            <a:headEnd type="none" w="med" len="med"/>
-            <a:tailEnd type="arrow" w="med" len="med"/>
-          </a:ln>
-        </p:spPr>
-        <p:style>
-          <a:lnRef idx="1">
             <a:schemeClr val="dk1"/>
           </a:lnRef>
           <a:fillRef idx="0">
             <a:schemeClr val="dk1"/>
           </a:fillRef>
-          <a:effectRef idx="0">
+          <a:effectRef idx="1">
             <a:schemeClr val="dk1"/>
           </a:effectRef>
           <a:fontRef idx="minor">
@@ -6640,55 +5796,16 @@
           </a:fontRef>
         </p:style>
       </p:cxnSp>
-      <p:cxnSp>
-        <p:nvCxnSpPr>
-          <p:cNvPr id="42" name="Conector curvado 41"/>
-          <p:cNvCxnSpPr>
-            <a:stCxn id="20" idx="4"/>
-            <a:endCxn id="2" idx="4"/>
-          </p:cNvCxnSpPr>
-          <p:nvPr/>
-        </p:nvCxnSpPr>
-        <p:spPr>
-          <a:xfrm rot="5400000" flipH="1">
-            <a:off x="6678295" y="2320925"/>
-            <a:ext cx="65405" cy="1446530"/>
-          </a:xfrm>
-          <a:prstGeom prst="curvedConnector3">
-            <a:avLst>
-              <a:gd name="adj1" fmla="val -2560679"/>
-            </a:avLst>
-          </a:prstGeom>
-          <a:ln>
-            <a:headEnd type="none" w="med" len="med"/>
-            <a:tailEnd type="arrow" w="med" len="med"/>
-          </a:ln>
-        </p:spPr>
-        <p:style>
-          <a:lnRef idx="1">
-            <a:schemeClr val="dk1"/>
-          </a:lnRef>
-          <a:fillRef idx="0">
-            <a:schemeClr val="dk1"/>
-          </a:fillRef>
-          <a:effectRef idx="0">
-            <a:schemeClr val="dk1"/>
-          </a:effectRef>
-          <a:fontRef idx="minor">
-            <a:schemeClr val="tx1"/>
-          </a:fontRef>
-        </p:style>
-      </p:cxnSp>
-      <p:sp>
-        <p:nvSpPr>
-          <p:cNvPr id="43" name="Cuadro de texto 42"/>
+      <p:sp>
+        <p:nvSpPr>
+          <p:cNvPr id="84" name="Cuadro de texto 83"/>
           <p:cNvSpPr txBox="1"/>
           <p:nvPr/>
         </p:nvSpPr>
         <p:spPr>
           <a:xfrm>
-            <a:off x="6856730" y="4773295"/>
-            <a:ext cx="1096645" cy="229870"/>
+            <a:off x="3585210" y="2955925"/>
+            <a:ext cx="887095" cy="213995"/>
           </a:xfrm>
           <a:prstGeom prst="rect">
             <a:avLst/>
@@ -6701,152 +5818,24 @@
           </a:bodyPr>
           <a:p>
             <a:r>
-              <a:rPr lang="es-HN" altLang="es-MX" sz="900"/>
-              <a:t>[var]</a:t>
-            </a:r>
-            <a:endParaRPr lang="es-HN" altLang="es-MX" sz="900"/>
+              <a:rPr lang="es-HN" altLang="es-MX" sz="800">
+                <a:solidFill>
+                  <a:srgbClr val="00B0F0"/>
+                </a:solidFill>
+              </a:rPr>
+              <a:t>[ONION layer]</a:t>
+            </a:r>
+            <a:endParaRPr lang="es-HN" altLang="es-MX" sz="800">
+              <a:solidFill>
+                <a:srgbClr val="00B0F0"/>
+              </a:solidFill>
+            </a:endParaRPr>
           </a:p>
         </p:txBody>
       </p:sp>
       <p:cxnSp>
         <p:nvCxnSpPr>
-          <p:cNvPr id="44" name="Conector curvado 43"/>
-          <p:cNvCxnSpPr>
-            <a:stCxn id="7" idx="4"/>
-            <a:endCxn id="2" idx="4"/>
-          </p:cNvCxnSpPr>
-          <p:nvPr/>
-        </p:nvCxnSpPr>
-        <p:spPr>
-          <a:xfrm rot="5400000" flipH="1" flipV="1">
-            <a:off x="4529455" y="1566545"/>
-            <a:ext cx="13335" cy="2903220"/>
-          </a:xfrm>
-          <a:prstGeom prst="curvedConnector3">
-            <a:avLst>
-              <a:gd name="adj1" fmla="val -10030952"/>
-            </a:avLst>
-          </a:prstGeom>
-          <a:ln>
-            <a:headEnd type="none" w="med" len="med"/>
-            <a:tailEnd type="arrow" w="med" len="med"/>
-          </a:ln>
-        </p:spPr>
-        <p:style>
-          <a:lnRef idx="1">
-            <a:schemeClr val="dk1"/>
-          </a:lnRef>
-          <a:fillRef idx="0">
-            <a:schemeClr val="dk1"/>
-          </a:fillRef>
-          <a:effectRef idx="0">
-            <a:schemeClr val="dk1"/>
-          </a:effectRef>
-          <a:fontRef idx="minor">
-            <a:schemeClr val="tx1"/>
-          </a:fontRef>
-        </p:style>
-      </p:cxnSp>
-      <p:sp>
-        <p:nvSpPr>
-          <p:cNvPr id="45" name="Cuadro de texto 44"/>
-          <p:cNvSpPr txBox="1"/>
-          <p:nvPr/>
-        </p:nvSpPr>
-        <p:spPr>
-          <a:xfrm>
-            <a:off x="4201795" y="4414520"/>
-            <a:ext cx="1096645" cy="229870"/>
-          </a:xfrm>
-          <a:prstGeom prst="rect">
-            <a:avLst/>
-          </a:prstGeom>
-          <a:noFill/>
-        </p:spPr>
-        <p:txBody>
-          <a:bodyPr wrap="square" rtlCol="0">
-            <a:spAutoFit/>
-          </a:bodyPr>
-          <a:p>
-            <a:r>
-              <a:rPr lang="es-HN" altLang="es-MX" sz="900"/>
-              <a:t>[var]</a:t>
-            </a:r>
-            <a:endParaRPr lang="es-HN" altLang="es-MX" sz="900"/>
-          </a:p>
-        </p:txBody>
-      </p:sp>
-      <p:cxnSp>
-        <p:nvCxnSpPr>
-          <p:cNvPr id="46" name="Conector curvado 45"/>
-          <p:cNvCxnSpPr>
-            <a:stCxn id="10" idx="0"/>
-            <a:endCxn id="20" idx="0"/>
-          </p:cNvCxnSpPr>
-          <p:nvPr/>
-        </p:nvCxnSpPr>
-        <p:spPr>
-          <a:xfrm rot="16200000" flipH="1">
-            <a:off x="5951855" y="895985"/>
-            <a:ext cx="66040" cy="2898140"/>
-          </a:xfrm>
-          <a:prstGeom prst="curvedConnector3">
-            <a:avLst>
-              <a:gd name="adj1" fmla="val -2275000"/>
-            </a:avLst>
-          </a:prstGeom>
-          <a:ln>
-            <a:headEnd type="none" w="med" len="med"/>
-            <a:tailEnd type="arrow" w="med" len="med"/>
-          </a:ln>
-        </p:spPr>
-        <p:style>
-          <a:lnRef idx="1">
-            <a:schemeClr val="accent1"/>
-          </a:lnRef>
-          <a:fillRef idx="0">
-            <a:schemeClr val="accent1"/>
-          </a:fillRef>
-          <a:effectRef idx="0">
-            <a:schemeClr val="accent1"/>
-          </a:effectRef>
-          <a:fontRef idx="minor">
-            <a:schemeClr val="tx1"/>
-          </a:fontRef>
-        </p:style>
-      </p:cxnSp>
-      <p:sp>
-        <p:nvSpPr>
-          <p:cNvPr id="48" name="Cuadro de texto 47"/>
-          <p:cNvSpPr txBox="1"/>
-          <p:nvPr/>
-        </p:nvSpPr>
-        <p:spPr>
-          <a:xfrm>
-            <a:off x="5826760" y="497205"/>
-            <a:ext cx="1096645" cy="229870"/>
-          </a:xfrm>
-          <a:prstGeom prst="rect">
-            <a:avLst/>
-          </a:prstGeom>
-          <a:noFill/>
-        </p:spPr>
-        <p:txBody>
-          <a:bodyPr wrap="square" rtlCol="0">
-            <a:spAutoFit/>
-          </a:bodyPr>
-          <a:p>
-            <a:r>
-              <a:rPr lang="es-HN" altLang="es-MX" sz="900"/>
-              <a:t>[if]</a:t>
-            </a:r>
-            <a:endParaRPr lang="es-HN" altLang="es-MX" sz="900"/>
-          </a:p>
-        </p:txBody>
-      </p:sp>
-      <p:cxnSp>
-        <p:nvCxnSpPr>
-          <p:cNvPr id="49" name="Conector curvado 48"/>
+          <p:cNvPr id="85" name="Conector curvado 84"/>
           <p:cNvCxnSpPr>
             <a:stCxn id="32" idx="0"/>
             <a:endCxn id="20" idx="0"/>
@@ -6855,187 +5844,12 @@
         </p:nvCxnSpPr>
         <p:spPr>
           <a:xfrm rot="16200000" flipH="1" flipV="1">
-            <a:off x="8145145" y="1644015"/>
+            <a:off x="7867650" y="456565"/>
             <a:ext cx="22860" cy="1445260"/>
           </a:xfrm>
           <a:prstGeom prst="curvedConnector3">
             <a:avLst>
-              <a:gd name="adj1" fmla="val -6611111"/>
-            </a:avLst>
-          </a:prstGeom>
-          <a:ln>
-            <a:headEnd type="none" w="med" len="med"/>
-            <a:tailEnd type="arrow" w="med" len="med"/>
-          </a:ln>
-        </p:spPr>
-        <p:style>
-          <a:lnRef idx="1">
-            <a:schemeClr val="accent1"/>
-          </a:lnRef>
-          <a:fillRef idx="0">
-            <a:schemeClr val="accent1"/>
-          </a:fillRef>
-          <a:effectRef idx="0">
-            <a:schemeClr val="accent1"/>
-          </a:effectRef>
-          <a:fontRef idx="minor">
-            <a:schemeClr val="tx1"/>
-          </a:fontRef>
-        </p:style>
-      </p:cxnSp>
-      <p:sp>
-        <p:nvSpPr>
-          <p:cNvPr id="50" name="Cuadro de texto 49"/>
-          <p:cNvSpPr txBox="1"/>
-          <p:nvPr/>
-        </p:nvSpPr>
-        <p:spPr>
-          <a:xfrm>
-            <a:off x="7717790" y="727075"/>
-            <a:ext cx="1096645" cy="229870"/>
-          </a:xfrm>
-          <a:prstGeom prst="rect">
-            <a:avLst/>
-          </a:prstGeom>
-          <a:noFill/>
-        </p:spPr>
-        <p:txBody>
-          <a:bodyPr wrap="square" rtlCol="0">
-            <a:spAutoFit/>
-          </a:bodyPr>
-          <a:p>
-            <a:r>
-              <a:rPr lang="es-HN" altLang="es-MX" sz="900"/>
-              <a:t>[if]</a:t>
-            </a:r>
-            <a:endParaRPr lang="es-HN" altLang="es-MX" sz="900"/>
-          </a:p>
-        </p:txBody>
-      </p:sp>
-      <p:cxnSp>
-        <p:nvCxnSpPr>
-          <p:cNvPr id="51" name="Conector curvado 50"/>
-          <p:cNvCxnSpPr>
-            <a:stCxn id="10" idx="0"/>
-            <a:endCxn id="32" idx="0"/>
-          </p:cNvCxnSpPr>
-          <p:nvPr/>
-        </p:nvCxnSpPr>
-        <p:spPr>
-          <a:xfrm rot="16200000" flipH="1">
-            <a:off x="6685915" y="161925"/>
-            <a:ext cx="43180" cy="4343400"/>
-          </a:xfrm>
-          <a:prstGeom prst="curvedConnector3">
-            <a:avLst>
-              <a:gd name="adj1" fmla="val -4863235"/>
-            </a:avLst>
-          </a:prstGeom>
-          <a:ln>
-            <a:headEnd type="none" w="med" len="med"/>
-            <a:tailEnd type="arrow" w="med" len="med"/>
-          </a:ln>
-        </p:spPr>
-        <p:style>
-          <a:lnRef idx="1">
-            <a:schemeClr val="dk1"/>
-          </a:lnRef>
-          <a:fillRef idx="0">
-            <a:schemeClr val="dk1"/>
-          </a:fillRef>
-          <a:effectRef idx="0">
-            <a:schemeClr val="dk1"/>
-          </a:effectRef>
-          <a:fontRef idx="minor">
-            <a:schemeClr val="tx1"/>
-          </a:fontRef>
-        </p:style>
-      </p:cxnSp>
-      <p:sp>
-        <p:nvSpPr>
-          <p:cNvPr id="53" name="Cuadro de texto 52"/>
-          <p:cNvSpPr txBox="1"/>
-          <p:nvPr/>
-        </p:nvSpPr>
-        <p:spPr>
-          <a:xfrm>
-            <a:off x="7296150" y="52705"/>
-            <a:ext cx="1096645" cy="229870"/>
-          </a:xfrm>
-          <a:prstGeom prst="rect">
-            <a:avLst/>
-          </a:prstGeom>
-          <a:noFill/>
-        </p:spPr>
-        <p:txBody>
-          <a:bodyPr wrap="square" rtlCol="0">
-            <a:spAutoFit/>
-          </a:bodyPr>
-          <a:p>
-            <a:r>
-              <a:rPr lang="es-HN" altLang="es-MX" sz="900"/>
-              <a:t>[do,while,for]</a:t>
-            </a:r>
-            <a:endParaRPr lang="es-HN" altLang="es-MX" sz="900"/>
-          </a:p>
-        </p:txBody>
-      </p:sp>
-      <p:cxnSp>
-        <p:nvCxnSpPr>
-          <p:cNvPr id="55" name="Conector curvado 54"/>
-          <p:cNvCxnSpPr>
-            <a:stCxn id="2" idx="0"/>
-            <a:endCxn id="32" idx="0"/>
-          </p:cNvCxnSpPr>
-          <p:nvPr/>
-        </p:nvCxnSpPr>
-        <p:spPr>
-          <a:xfrm rot="16200000" flipH="1">
-            <a:off x="7411720" y="887730"/>
-            <a:ext cx="42545" cy="2891790"/>
-          </a:xfrm>
-          <a:prstGeom prst="curvedConnector3">
-            <a:avLst>
-              <a:gd name="adj1" fmla="val -4791791"/>
-            </a:avLst>
-          </a:prstGeom>
-          <a:ln>
-            <a:headEnd type="none" w="med" len="med"/>
-            <a:tailEnd type="arrow" w="med" len="med"/>
-          </a:ln>
-        </p:spPr>
-        <p:style>
-          <a:lnRef idx="1">
-            <a:schemeClr val="dk1"/>
-          </a:lnRef>
-          <a:fillRef idx="0">
-            <a:schemeClr val="dk1"/>
-          </a:fillRef>
-          <a:effectRef idx="0">
-            <a:schemeClr val="dk1"/>
-          </a:effectRef>
-          <a:fontRef idx="minor">
-            <a:schemeClr val="tx1"/>
-          </a:fontRef>
-        </p:style>
-      </p:cxnSp>
-      <p:cxnSp>
-        <p:nvCxnSpPr>
-          <p:cNvPr id="56" name="Conector curvado 55"/>
-          <p:cNvCxnSpPr>
-            <a:stCxn id="10" idx="0"/>
-            <a:endCxn id="22" idx="0"/>
-          </p:cNvCxnSpPr>
-          <p:nvPr/>
-        </p:nvCxnSpPr>
-        <p:spPr>
-          <a:xfrm rot="16200000" flipH="1">
-            <a:off x="7412990" y="-565150"/>
-            <a:ext cx="43180" cy="5797550"/>
-          </a:xfrm>
-          <a:prstGeom prst="curvedConnector3">
-            <a:avLst>
-              <a:gd name="adj1" fmla="val -4182352"/>
+              <a:gd name="adj1" fmla="val -2247222"/>
             </a:avLst>
           </a:prstGeom>
           <a:gradFill rotWithShape="0">
@@ -7060,61 +5874,22 @@
           </a:ln>
         </p:spPr>
       </p:cxnSp>
-      <p:sp>
-        <p:nvSpPr>
-          <p:cNvPr id="57" name="Cuadro de texto 56"/>
-          <p:cNvSpPr txBox="1"/>
-          <p:nvPr/>
-        </p:nvSpPr>
-        <p:spPr>
-          <a:xfrm>
-            <a:off x="10218420" y="1437005"/>
-            <a:ext cx="1096645" cy="229870"/>
-          </a:xfrm>
-          <a:prstGeom prst="rect">
-            <a:avLst/>
-          </a:prstGeom>
-          <a:noFill/>
-        </p:spPr>
-        <p:txBody>
-          <a:bodyPr wrap="square" rtlCol="0">
-            <a:spAutoFit/>
-          </a:bodyPr>
-          <a:p>
-            <a:r>
-              <a:rPr lang="es-HN" altLang="es-MX" sz="900"/>
-              <a:t>[ </a:t>
-            </a:r>
-            <a:r>
-              <a:rPr lang="es-HN" altLang="es-MX" sz="900" b="1"/>
-              <a:t>}</a:t>
-            </a:r>
-            <a:r>
-              <a:rPr lang="es-HN" altLang="es-MX" sz="900"/>
-              <a:t> ]</a:t>
-            </a:r>
-            <a:endParaRPr lang="es-HN" altLang="es-MX" sz="900"/>
-          </a:p>
-        </p:txBody>
-      </p:sp>
       <p:cxnSp>
         <p:nvCxnSpPr>
-          <p:cNvPr id="58" name="Conector curvado 57"/>
+          <p:cNvPr id="86" name="Conector curvado 85"/>
           <p:cNvCxnSpPr>
-            <a:stCxn id="2" idx="0"/>
-            <a:endCxn id="22" idx="0"/>
+            <a:stCxn id="32" idx="4"/>
+            <a:endCxn id="60" idx="2"/>
           </p:cNvCxnSpPr>
           <p:nvPr/>
         </p:nvCxnSpPr>
         <p:spPr>
-          <a:xfrm rot="16200000" flipH="1">
-            <a:off x="8138795" y="160655"/>
-            <a:ext cx="42545" cy="4345940"/>
-          </a:xfrm>
-          <a:prstGeom prst="curvedConnector3">
-            <a:avLst>
-              <a:gd name="adj1" fmla="val -3918656"/>
-            </a:avLst>
+          <a:xfrm rot="5400000" flipV="1">
+            <a:off x="8754745" y="1713865"/>
+            <a:ext cx="814070" cy="1120140"/>
+          </a:xfrm>
+          <a:prstGeom prst="curvedConnector2">
+            <a:avLst/>
           </a:prstGeom>
           <a:gradFill rotWithShape="0">
             <a:gsLst>
@@ -7140,21 +5915,21 @@
       </p:cxnSp>
       <p:cxnSp>
         <p:nvCxnSpPr>
-          <p:cNvPr id="59" name="Conector curvado 58"/>
+          <p:cNvPr id="87" name="Conector curvado 86"/>
           <p:cNvCxnSpPr>
-            <a:stCxn id="20" idx="0"/>
-            <a:endCxn id="22" idx="0"/>
+            <a:stCxn id="32" idx="4"/>
+            <a:endCxn id="68" idx="1"/>
           </p:cNvCxnSpPr>
           <p:nvPr/>
         </p:nvCxnSpPr>
         <p:spPr>
-          <a:xfrm rot="16200000">
-            <a:off x="8872220" y="916940"/>
-            <a:ext cx="22860" cy="2899410"/>
+          <a:xfrm rot="5400000" flipV="1">
+            <a:off x="8332470" y="2135505"/>
+            <a:ext cx="1758315" cy="1219835"/>
           </a:xfrm>
           <a:prstGeom prst="curvedConnector3">
             <a:avLst>
-              <a:gd name="adj1" fmla="val 6444444"/>
+              <a:gd name="adj1" fmla="val 47093"/>
             </a:avLst>
           </a:prstGeom>
           <a:gradFill rotWithShape="0">
@@ -7179,6 +5954,1254 @@
           </a:ln>
         </p:spPr>
       </p:cxnSp>
+      <p:cxnSp>
+        <p:nvCxnSpPr>
+          <p:cNvPr id="89" name="Conector curvado 88"/>
+          <p:cNvCxnSpPr>
+            <a:stCxn id="32" idx="4"/>
+            <a:endCxn id="74" idx="0"/>
+          </p:cNvCxnSpPr>
+          <p:nvPr/>
+        </p:nvCxnSpPr>
+        <p:spPr>
+          <a:xfrm rot="5400000">
+            <a:off x="7143115" y="2064385"/>
+            <a:ext cx="1656715" cy="1261110"/>
+          </a:xfrm>
+          <a:prstGeom prst="curvedConnector3">
+            <a:avLst>
+              <a:gd name="adj1" fmla="val 50000"/>
+            </a:avLst>
+          </a:prstGeom>
+          <a:gradFill rotWithShape="0">
+            <a:gsLst>
+              <a:gs pos="0">
+                <a:schemeClr val="accent1"/>
+              </a:gs>
+              <a:gs pos="100000">
+                <a:schemeClr val="accent2"/>
+              </a:gs>
+            </a:gsLst>
+            <a:lin ang="5400000" scaled="1"/>
+          </a:gradFill>
+          <a:ln w="9525" cap="flat" cmpd="sng" algn="ctr">
+            <a:solidFill>
+              <a:srgbClr val="00B0F0"/>
+            </a:solidFill>
+            <a:prstDash val="solid"/>
+            <a:round/>
+            <a:headEnd type="none" w="med" len="med"/>
+            <a:tailEnd type="arrow" w="med" len="med"/>
+          </a:ln>
+        </p:spPr>
+      </p:cxnSp>
+      <p:cxnSp>
+        <p:nvCxnSpPr>
+          <p:cNvPr id="91" name="Conector curvado 90"/>
+          <p:cNvCxnSpPr>
+            <a:stCxn id="32" idx="4"/>
+            <a:endCxn id="71" idx="0"/>
+          </p:cNvCxnSpPr>
+          <p:nvPr/>
+        </p:nvCxnSpPr>
+        <p:spPr>
+          <a:xfrm rot="5400000">
+            <a:off x="7773670" y="2694940"/>
+            <a:ext cx="1656080" cy="3175"/>
+          </a:xfrm>
+          <a:prstGeom prst="curvedConnector2">
+            <a:avLst/>
+          </a:prstGeom>
+          <a:gradFill rotWithShape="0">
+            <a:gsLst>
+              <a:gs pos="0">
+                <a:schemeClr val="accent1"/>
+              </a:gs>
+              <a:gs pos="100000">
+                <a:schemeClr val="accent2"/>
+              </a:gs>
+            </a:gsLst>
+            <a:lin ang="5400000" scaled="1"/>
+          </a:gradFill>
+          <a:ln w="9525" cap="flat" cmpd="sng" algn="ctr">
+            <a:solidFill>
+              <a:srgbClr val="00B0F0"/>
+            </a:solidFill>
+            <a:prstDash val="solid"/>
+            <a:round/>
+            <a:headEnd type="none" w="med" len="med"/>
+            <a:tailEnd type="arrow" w="med" len="med"/>
+          </a:ln>
+        </p:spPr>
+      </p:cxnSp>
+      <p:sp>
+        <p:nvSpPr>
+          <p:cNvPr id="92" name="Cuadro de texto 91"/>
+          <p:cNvSpPr txBox="1"/>
+          <p:nvPr/>
+        </p:nvSpPr>
+        <p:spPr>
+          <a:xfrm>
+            <a:off x="8820150" y="2166620"/>
+            <a:ext cx="455930" cy="213995"/>
+          </a:xfrm>
+          <a:prstGeom prst="rect">
+            <a:avLst/>
+          </a:prstGeom>
+          <a:noFill/>
+        </p:spPr>
+        <p:txBody>
+          <a:bodyPr wrap="square" rtlCol="0">
+            <a:spAutoFit/>
+          </a:bodyPr>
+          <a:p>
+            <a:r>
+              <a:rPr lang="es-HN" altLang="es-MX" sz="800">
+                <a:solidFill>
+                  <a:srgbClr val="00B0F0"/>
+                </a:solidFill>
+              </a:rPr>
+              <a:t>[while]</a:t>
+            </a:r>
+            <a:endParaRPr lang="es-HN" altLang="es-MX" sz="800">
+              <a:solidFill>
+                <a:srgbClr val="00B0F0"/>
+              </a:solidFill>
+            </a:endParaRPr>
+          </a:p>
+        </p:txBody>
+      </p:sp>
+      <p:sp>
+        <p:nvSpPr>
+          <p:cNvPr id="93" name="Cuadro de texto 92"/>
+          <p:cNvSpPr txBox="1"/>
+          <p:nvPr/>
+        </p:nvSpPr>
+        <p:spPr>
+          <a:xfrm>
+            <a:off x="9037955" y="2816225"/>
+            <a:ext cx="683895" cy="213995"/>
+          </a:xfrm>
+          <a:prstGeom prst="rect">
+            <a:avLst/>
+          </a:prstGeom>
+          <a:noFill/>
+        </p:spPr>
+        <p:txBody>
+          <a:bodyPr wrap="square" rtlCol="0">
+            <a:spAutoFit/>
+          </a:bodyPr>
+          <a:p>
+            <a:r>
+              <a:rPr lang="es-HN" altLang="es-MX" sz="800">
+                <a:solidFill>
+                  <a:srgbClr val="00B0F0"/>
+                </a:solidFill>
+              </a:rPr>
+              <a:t>[switch]</a:t>
+            </a:r>
+            <a:endParaRPr lang="es-HN" altLang="es-MX" sz="800">
+              <a:solidFill>
+                <a:srgbClr val="00B0F0"/>
+              </a:solidFill>
+            </a:endParaRPr>
+          </a:p>
+        </p:txBody>
+      </p:sp>
+      <p:sp>
+        <p:nvSpPr>
+          <p:cNvPr id="94" name="Cuadro de texto 93"/>
+          <p:cNvSpPr txBox="1"/>
+          <p:nvPr/>
+        </p:nvSpPr>
+        <p:spPr>
+          <a:xfrm>
+            <a:off x="8199120" y="3030220"/>
+            <a:ext cx="455930" cy="213995"/>
+          </a:xfrm>
+          <a:prstGeom prst="rect">
+            <a:avLst/>
+          </a:prstGeom>
+          <a:noFill/>
+        </p:spPr>
+        <p:txBody>
+          <a:bodyPr wrap="square" rtlCol="0">
+            <a:spAutoFit/>
+          </a:bodyPr>
+          <a:p>
+            <a:r>
+              <a:rPr lang="es-HN" altLang="es-MX" sz="800">
+                <a:solidFill>
+                  <a:srgbClr val="00B0F0"/>
+                </a:solidFill>
+              </a:rPr>
+              <a:t>[print]</a:t>
+            </a:r>
+            <a:endParaRPr lang="es-HN" altLang="es-MX" sz="800">
+              <a:solidFill>
+                <a:srgbClr val="00B0F0"/>
+              </a:solidFill>
+            </a:endParaRPr>
+          </a:p>
+        </p:txBody>
+      </p:sp>
+      <p:cxnSp>
+        <p:nvCxnSpPr>
+          <p:cNvPr id="95" name="Conector curvado 94"/>
+          <p:cNvCxnSpPr>
+            <a:stCxn id="74" idx="1"/>
+            <a:endCxn id="2" idx="4"/>
+          </p:cNvCxnSpPr>
+          <p:nvPr/>
+        </p:nvCxnSpPr>
+        <p:spPr>
+          <a:xfrm rot="16200000" flipV="1">
+            <a:off x="5506085" y="2027555"/>
+            <a:ext cx="1801495" cy="1394460"/>
+          </a:xfrm>
+          <a:prstGeom prst="curvedConnector3">
+            <a:avLst>
+              <a:gd name="adj1" fmla="val 52855"/>
+            </a:avLst>
+          </a:prstGeom>
+          <a:gradFill rotWithShape="0">
+            <a:gsLst>
+              <a:gs pos="0">
+                <a:schemeClr val="accent1"/>
+              </a:gs>
+              <a:gs pos="100000">
+                <a:schemeClr val="accent2"/>
+              </a:gs>
+            </a:gsLst>
+            <a:lin ang="5400000" scaled="1"/>
+          </a:gradFill>
+          <a:ln w="9525" cap="flat" cmpd="sng" algn="ctr">
+            <a:solidFill>
+              <a:srgbClr val="00B050"/>
+            </a:solidFill>
+            <a:prstDash val="solid"/>
+            <a:round/>
+            <a:headEnd type="none" w="med" len="med"/>
+            <a:tailEnd type="arrow" w="med" len="med"/>
+          </a:ln>
+        </p:spPr>
+      </p:cxnSp>
+      <p:sp>
+        <p:nvSpPr>
+          <p:cNvPr id="96" name="Cuadro de texto 95"/>
+          <p:cNvSpPr txBox="1"/>
+          <p:nvPr/>
+        </p:nvSpPr>
+        <p:spPr>
+          <a:xfrm>
+            <a:off x="5502275" y="2573655"/>
+            <a:ext cx="559435" cy="213995"/>
+          </a:xfrm>
+          <a:prstGeom prst="rect">
+            <a:avLst/>
+          </a:prstGeom>
+          <a:noFill/>
+        </p:spPr>
+        <p:txBody>
+          <a:bodyPr wrap="square" rtlCol="0">
+            <a:spAutoFit/>
+          </a:bodyPr>
+          <a:p>
+            <a:r>
+              <a:rPr lang="es-HN" altLang="es-MX" sz="800"/>
+              <a:t>[</a:t>
+            </a:r>
+            <a:r>
+              <a:rPr lang="es-HN" altLang="es-MX" sz="800">
+                <a:solidFill>
+                  <a:srgbClr val="00B050"/>
+                </a:solidFill>
+              </a:rPr>
+              <a:t>import</a:t>
+            </a:r>
+            <a:r>
+              <a:rPr lang="es-HN" altLang="es-MX" sz="800"/>
+              <a:t>]</a:t>
+            </a:r>
+            <a:endParaRPr lang="es-HN" altLang="es-MX" sz="800"/>
+          </a:p>
+        </p:txBody>
+      </p:sp>
+      <p:cxnSp>
+        <p:nvCxnSpPr>
+          <p:cNvPr id="97" name="Conector curvado 96"/>
+          <p:cNvCxnSpPr>
+            <a:stCxn id="74" idx="1"/>
+            <a:endCxn id="20" idx="4"/>
+          </p:cNvCxnSpPr>
+          <p:nvPr/>
+        </p:nvCxnSpPr>
+        <p:spPr>
+          <a:xfrm rot="16200000">
+            <a:off x="6262370" y="2731770"/>
+            <a:ext cx="1736090" cy="52070"/>
+          </a:xfrm>
+          <a:prstGeom prst="curvedConnector3">
+            <a:avLst>
+              <a:gd name="adj1" fmla="val 52926"/>
+            </a:avLst>
+          </a:prstGeom>
+          <a:gradFill rotWithShape="0">
+            <a:gsLst>
+              <a:gs pos="0">
+                <a:schemeClr val="accent1"/>
+              </a:gs>
+              <a:gs pos="100000">
+                <a:schemeClr val="accent2"/>
+              </a:gs>
+            </a:gsLst>
+            <a:lin ang="5400000" scaled="1"/>
+          </a:gradFill>
+          <a:ln w="9525" cap="flat" cmpd="sng" algn="ctr">
+            <a:solidFill>
+              <a:srgbClr val="00B050"/>
+            </a:solidFill>
+            <a:prstDash val="solid"/>
+            <a:round/>
+            <a:headEnd type="none" w="med" len="med"/>
+            <a:tailEnd type="arrow" w="med" len="med"/>
+          </a:ln>
+        </p:spPr>
+      </p:cxnSp>
+      <p:sp>
+        <p:nvSpPr>
+          <p:cNvPr id="98" name="Cuadro de texto 97"/>
+          <p:cNvSpPr txBox="1"/>
+          <p:nvPr/>
+        </p:nvSpPr>
+        <p:spPr>
+          <a:xfrm>
+            <a:off x="6675755" y="2117090"/>
+            <a:ext cx="559435" cy="213995"/>
+          </a:xfrm>
+          <a:prstGeom prst="rect">
+            <a:avLst/>
+          </a:prstGeom>
+          <a:noFill/>
+        </p:spPr>
+        <p:txBody>
+          <a:bodyPr wrap="square" rtlCol="0">
+            <a:spAutoFit/>
+          </a:bodyPr>
+          <a:p>
+            <a:r>
+              <a:rPr lang="es-HN" altLang="es-MX" sz="800"/>
+              <a:t>[</a:t>
+            </a:r>
+            <a:r>
+              <a:rPr lang="es-HN" altLang="es-MX" sz="800">
+                <a:solidFill>
+                  <a:srgbClr val="00B050"/>
+                </a:solidFill>
+              </a:rPr>
+              <a:t>var</a:t>
+            </a:r>
+            <a:r>
+              <a:rPr lang="es-HN" altLang="es-MX" sz="800"/>
+              <a:t>]</a:t>
+            </a:r>
+            <a:endParaRPr lang="es-HN" altLang="es-MX" sz="800"/>
+          </a:p>
+        </p:txBody>
+      </p:sp>
+      <p:cxnSp>
+        <p:nvCxnSpPr>
+          <p:cNvPr id="99" name="Conector curvado 98"/>
+          <p:cNvCxnSpPr>
+            <a:stCxn id="2" idx="5"/>
+            <a:endCxn id="74" idx="0"/>
+          </p:cNvCxnSpPr>
+          <p:nvPr/>
+        </p:nvCxnSpPr>
+        <p:spPr>
+          <a:xfrm rot="5400000" flipV="1">
+            <a:off x="5742305" y="1924685"/>
+            <a:ext cx="1801495" cy="1395095"/>
+          </a:xfrm>
+          <a:prstGeom prst="curvedConnector3">
+            <a:avLst>
+              <a:gd name="adj1" fmla="val 52838"/>
+            </a:avLst>
+          </a:prstGeom>
+          <a:gradFill rotWithShape="0">
+            <a:gsLst>
+              <a:gs pos="0">
+                <a:schemeClr val="accent1"/>
+              </a:gs>
+              <a:gs pos="100000">
+                <a:schemeClr val="accent2"/>
+              </a:gs>
+            </a:gsLst>
+            <a:lin ang="5400000" scaled="1"/>
+          </a:gradFill>
+          <a:ln w="9525" cap="flat" cmpd="sng" algn="ctr">
+            <a:solidFill>
+              <a:schemeClr val="accent2"/>
+            </a:solidFill>
+            <a:prstDash val="solid"/>
+            <a:round/>
+            <a:headEnd type="none" w="med" len="med"/>
+            <a:tailEnd type="arrow" w="med" len="med"/>
+          </a:ln>
+        </p:spPr>
+      </p:cxnSp>
+      <p:cxnSp>
+        <p:nvCxnSpPr>
+          <p:cNvPr id="100" name="Conector curvado 99"/>
+          <p:cNvCxnSpPr>
+            <a:stCxn id="20" idx="5"/>
+            <a:endCxn id="74" idx="0"/>
+          </p:cNvCxnSpPr>
+          <p:nvPr/>
+        </p:nvCxnSpPr>
+        <p:spPr>
+          <a:xfrm rot="5400000">
+            <a:off x="6497955" y="2629535"/>
+            <a:ext cx="1736090" cy="51435"/>
+          </a:xfrm>
+          <a:prstGeom prst="curvedConnector3">
+            <a:avLst>
+              <a:gd name="adj1" fmla="val 52944"/>
+            </a:avLst>
+          </a:prstGeom>
+          <a:gradFill rotWithShape="0">
+            <a:gsLst>
+              <a:gs pos="0">
+                <a:schemeClr val="accent1"/>
+              </a:gs>
+              <a:gs pos="100000">
+                <a:schemeClr val="accent2"/>
+              </a:gs>
+            </a:gsLst>
+            <a:lin ang="5400000" scaled="1"/>
+          </a:gradFill>
+          <a:ln w="9525" cap="flat" cmpd="sng" algn="ctr">
+            <a:solidFill>
+              <a:schemeClr val="accent1"/>
+            </a:solidFill>
+            <a:prstDash val="solid"/>
+            <a:round/>
+            <a:headEnd type="none" w="med" len="med"/>
+            <a:tailEnd type="arrow" w="med" len="med"/>
+          </a:ln>
+        </p:spPr>
+      </p:cxnSp>
+      <p:sp>
+        <p:nvSpPr>
+          <p:cNvPr id="101" name="Cuadro de texto 100"/>
+          <p:cNvSpPr txBox="1"/>
+          <p:nvPr/>
+        </p:nvSpPr>
+        <p:spPr>
+          <a:xfrm>
+            <a:off x="5919470" y="1841500"/>
+            <a:ext cx="455930" cy="275590"/>
+          </a:xfrm>
+          <a:prstGeom prst="rect">
+            <a:avLst/>
+          </a:prstGeom>
+          <a:noFill/>
+        </p:spPr>
+        <p:txBody>
+          <a:bodyPr wrap="square" rtlCol="0">
+            <a:spAutoFit/>
+          </a:bodyPr>
+          <a:p>
+            <a:r>
+              <a:rPr lang="es-HN" altLang="es-MX" sz="1200">
+                <a:solidFill>
+                  <a:srgbClr val="FF0000"/>
+                </a:solidFill>
+              </a:rPr>
+              <a:t>[;]</a:t>
+            </a:r>
+            <a:endParaRPr lang="es-HN" altLang="es-MX" sz="1200">
+              <a:solidFill>
+                <a:srgbClr val="FF0000"/>
+              </a:solidFill>
+            </a:endParaRPr>
+          </a:p>
+        </p:txBody>
+      </p:sp>
+      <p:sp>
+        <p:nvSpPr>
+          <p:cNvPr id="102" name="Cuadro de texto 101"/>
+          <p:cNvSpPr txBox="1"/>
+          <p:nvPr/>
+        </p:nvSpPr>
+        <p:spPr>
+          <a:xfrm>
+            <a:off x="7489825" y="2085975"/>
+            <a:ext cx="455930" cy="275590"/>
+          </a:xfrm>
+          <a:prstGeom prst="rect">
+            <a:avLst/>
+          </a:prstGeom>
+          <a:noFill/>
+        </p:spPr>
+        <p:txBody>
+          <a:bodyPr wrap="square" rtlCol="0">
+            <a:spAutoFit/>
+          </a:bodyPr>
+          <a:p>
+            <a:r>
+              <a:rPr lang="es-HN" altLang="es-MX" sz="1200">
+                <a:solidFill>
+                  <a:schemeClr val="accent2"/>
+                </a:solidFill>
+              </a:rPr>
+              <a:t>[;]</a:t>
+            </a:r>
+            <a:endParaRPr lang="es-HN" altLang="es-MX" sz="1200">
+              <a:solidFill>
+                <a:schemeClr val="accent2"/>
+              </a:solidFill>
+            </a:endParaRPr>
+          </a:p>
+        </p:txBody>
+      </p:sp>
+      <p:cxnSp>
+        <p:nvCxnSpPr>
+          <p:cNvPr id="104" name="Conector curvado 103"/>
+          <p:cNvCxnSpPr>
+            <a:stCxn id="22" idx="6"/>
+            <a:endCxn id="68" idx="6"/>
+          </p:cNvCxnSpPr>
+          <p:nvPr/>
+        </p:nvCxnSpPr>
+        <p:spPr>
+          <a:xfrm>
+            <a:off x="10389235" y="1517650"/>
+            <a:ext cx="3175" cy="2355215"/>
+          </a:xfrm>
+          <a:prstGeom prst="curvedConnector3">
+            <a:avLst>
+              <a:gd name="adj1" fmla="val 23400000"/>
+            </a:avLst>
+          </a:prstGeom>
+          <a:gradFill rotWithShape="0">
+            <a:gsLst>
+              <a:gs pos="0">
+                <a:schemeClr val="accent1"/>
+              </a:gs>
+              <a:gs pos="100000">
+                <a:schemeClr val="accent2"/>
+              </a:gs>
+            </a:gsLst>
+            <a:lin ang="5400000" scaled="1"/>
+          </a:gradFill>
+          <a:ln w="9525" cap="flat" cmpd="sng" algn="ctr">
+            <a:solidFill>
+              <a:srgbClr val="FFC000"/>
+            </a:solidFill>
+            <a:prstDash val="solid"/>
+            <a:round/>
+            <a:headEnd type="none" w="med" len="med"/>
+            <a:tailEnd type="arrow" w="med" len="med"/>
+          </a:ln>
+        </p:spPr>
+      </p:cxnSp>
+      <p:cxnSp>
+        <p:nvCxnSpPr>
+          <p:cNvPr id="105" name="Conector curvado 104"/>
+          <p:cNvCxnSpPr>
+            <a:stCxn id="22" idx="3"/>
+          </p:cNvCxnSpPr>
+          <p:nvPr/>
+        </p:nvCxnSpPr>
+        <p:spPr>
+          <a:xfrm rot="5400000">
+            <a:off x="8364220" y="2120265"/>
+            <a:ext cx="1811020" cy="1099185"/>
+          </a:xfrm>
+          <a:prstGeom prst="curvedConnector3">
+            <a:avLst>
+              <a:gd name="adj1" fmla="val 52823"/>
+            </a:avLst>
+          </a:prstGeom>
+          <a:gradFill rotWithShape="0">
+            <a:gsLst>
+              <a:gs pos="0">
+                <a:schemeClr val="accent1"/>
+              </a:gs>
+              <a:gs pos="100000">
+                <a:schemeClr val="accent2"/>
+              </a:gs>
+            </a:gsLst>
+            <a:lin ang="5400000" scaled="1"/>
+          </a:gradFill>
+          <a:ln w="9525" cap="flat" cmpd="sng" algn="ctr">
+            <a:solidFill>
+              <a:srgbClr val="FFC000"/>
+            </a:solidFill>
+            <a:prstDash val="solid"/>
+            <a:round/>
+            <a:headEnd type="none" w="med" len="med"/>
+            <a:tailEnd type="arrow" w="med" len="med"/>
+          </a:ln>
+        </p:spPr>
+      </p:cxnSp>
+      <p:cxnSp>
+        <p:nvCxnSpPr>
+          <p:cNvPr id="106" name="Conector curvado 105"/>
+          <p:cNvCxnSpPr>
+            <a:stCxn id="22" idx="3"/>
+            <a:endCxn id="74" idx="0"/>
+          </p:cNvCxnSpPr>
+          <p:nvPr/>
+        </p:nvCxnSpPr>
+        <p:spPr>
+          <a:xfrm rot="5400000">
+            <a:off x="7700645" y="1404620"/>
+            <a:ext cx="1758950" cy="2479040"/>
+          </a:xfrm>
+          <a:prstGeom prst="curvedConnector3">
+            <a:avLst>
+              <a:gd name="adj1" fmla="val 52924"/>
+            </a:avLst>
+          </a:prstGeom>
+          <a:gradFill rotWithShape="0">
+            <a:gsLst>
+              <a:gs pos="0">
+                <a:schemeClr val="accent1"/>
+              </a:gs>
+              <a:gs pos="100000">
+                <a:schemeClr val="accent2"/>
+              </a:gs>
+            </a:gsLst>
+            <a:lin ang="5400000" scaled="1"/>
+          </a:gradFill>
+          <a:ln w="9525" cap="flat" cmpd="sng" algn="ctr">
+            <a:solidFill>
+              <a:srgbClr val="FFC000"/>
+            </a:solidFill>
+            <a:prstDash val="solid"/>
+            <a:round/>
+            <a:headEnd type="none" w="med" len="med"/>
+            <a:tailEnd type="arrow" w="med" len="med"/>
+          </a:ln>
+        </p:spPr>
+      </p:cxnSp>
+      <p:sp>
+        <p:nvSpPr>
+          <p:cNvPr id="107" name="Cuadro de texto 106"/>
+          <p:cNvSpPr txBox="1"/>
+          <p:nvPr/>
+        </p:nvSpPr>
+        <p:spPr>
+          <a:xfrm>
+            <a:off x="11199495" y="2548255"/>
+            <a:ext cx="683895" cy="213995"/>
+          </a:xfrm>
+          <a:prstGeom prst="rect">
+            <a:avLst/>
+          </a:prstGeom>
+          <a:noFill/>
+        </p:spPr>
+        <p:txBody>
+          <a:bodyPr wrap="square" rtlCol="0">
+            <a:spAutoFit/>
+          </a:bodyPr>
+          <a:p>
+            <a:r>
+              <a:rPr lang="es-HN" altLang="es-MX" sz="800">
+                <a:solidFill>
+                  <a:srgbClr val="FFC000"/>
+                </a:solidFill>
+              </a:rPr>
+              <a:t>[switch]</a:t>
+            </a:r>
+            <a:endParaRPr lang="es-HN" altLang="es-MX" sz="800">
+              <a:solidFill>
+                <a:srgbClr val="FFC000"/>
+              </a:solidFill>
+            </a:endParaRPr>
+          </a:p>
+        </p:txBody>
+      </p:sp>
+      <p:sp>
+        <p:nvSpPr>
+          <p:cNvPr id="108" name="Cuadro de texto 107"/>
+          <p:cNvSpPr txBox="1"/>
+          <p:nvPr/>
+        </p:nvSpPr>
+        <p:spPr>
+          <a:xfrm>
+            <a:off x="8733790" y="3091815"/>
+            <a:ext cx="455930" cy="213995"/>
+          </a:xfrm>
+          <a:prstGeom prst="rect">
+            <a:avLst/>
+          </a:prstGeom>
+          <a:noFill/>
+        </p:spPr>
+        <p:txBody>
+          <a:bodyPr wrap="square" rtlCol="0">
+            <a:spAutoFit/>
+          </a:bodyPr>
+          <a:p>
+            <a:r>
+              <a:rPr lang="es-HN" altLang="es-MX" sz="800">
+                <a:solidFill>
+                  <a:srgbClr val="FFC000"/>
+                </a:solidFill>
+              </a:rPr>
+              <a:t>[print]</a:t>
+            </a:r>
+            <a:endParaRPr lang="es-HN" altLang="es-MX" sz="800">
+              <a:solidFill>
+                <a:srgbClr val="FFC000"/>
+              </a:solidFill>
+            </a:endParaRPr>
+          </a:p>
+        </p:txBody>
+      </p:sp>
+      <p:sp>
+        <p:nvSpPr>
+          <p:cNvPr id="109" name="Cuadro de texto 108"/>
+          <p:cNvSpPr txBox="1"/>
+          <p:nvPr/>
+        </p:nvSpPr>
+        <p:spPr>
+          <a:xfrm>
+            <a:off x="7651115" y="2925445"/>
+            <a:ext cx="455930" cy="275590"/>
+          </a:xfrm>
+          <a:prstGeom prst="rect">
+            <a:avLst/>
+          </a:prstGeom>
+          <a:noFill/>
+        </p:spPr>
+        <p:txBody>
+          <a:bodyPr wrap="square" rtlCol="0">
+            <a:spAutoFit/>
+          </a:bodyPr>
+          <a:p>
+            <a:r>
+              <a:rPr lang="es-HN" altLang="es-MX" sz="1200">
+                <a:solidFill>
+                  <a:srgbClr val="FFC000"/>
+                </a:solidFill>
+              </a:rPr>
+              <a:t>[;]</a:t>
+            </a:r>
+            <a:endParaRPr lang="es-HN" altLang="es-MX" sz="1200">
+              <a:solidFill>
+                <a:srgbClr val="FFC000"/>
+              </a:solidFill>
+            </a:endParaRPr>
+          </a:p>
+        </p:txBody>
+      </p:sp>
+      <p:cxnSp>
+        <p:nvCxnSpPr>
+          <p:cNvPr id="113" name="Conector curvado 112"/>
+          <p:cNvCxnSpPr>
+            <a:stCxn id="68" idx="6"/>
+            <a:endCxn id="60" idx="6"/>
+          </p:cNvCxnSpPr>
+          <p:nvPr/>
+        </p:nvCxnSpPr>
+        <p:spPr>
+          <a:xfrm flipH="1" flipV="1">
+            <a:off x="10389235" y="2680970"/>
+            <a:ext cx="3175" cy="1191895"/>
+          </a:xfrm>
+          <a:prstGeom prst="curvedConnector3">
+            <a:avLst>
+              <a:gd name="adj1" fmla="val -12500000"/>
+            </a:avLst>
+          </a:prstGeom>
+          <a:gradFill rotWithShape="0">
+            <a:gsLst>
+              <a:gs pos="0">
+                <a:schemeClr val="accent1"/>
+              </a:gs>
+              <a:gs pos="100000">
+                <a:schemeClr val="accent2"/>
+              </a:gs>
+            </a:gsLst>
+            <a:lin ang="5400000" scaled="1"/>
+          </a:gradFill>
+          <a:ln w="9525" cap="flat" cmpd="sng" algn="ctr">
+            <a:solidFill>
+              <a:schemeClr val="accent1"/>
+            </a:solidFill>
+            <a:prstDash val="solid"/>
+            <a:round/>
+            <a:headEnd type="none" w="med" len="med"/>
+            <a:tailEnd type="arrow" w="med" len="med"/>
+          </a:ln>
+        </p:spPr>
+      </p:cxnSp>
+      <p:sp>
+        <p:nvSpPr>
+          <p:cNvPr id="114" name="Cuadro de texto 113"/>
+          <p:cNvSpPr txBox="1"/>
+          <p:nvPr/>
+        </p:nvSpPr>
+        <p:spPr>
+          <a:xfrm>
+            <a:off x="10520680" y="2602230"/>
+            <a:ext cx="455930" cy="213995"/>
+          </a:xfrm>
+          <a:prstGeom prst="rect">
+            <a:avLst/>
+          </a:prstGeom>
+          <a:noFill/>
+        </p:spPr>
+        <p:txBody>
+          <a:bodyPr wrap="square" rtlCol="0">
+            <a:spAutoFit/>
+          </a:bodyPr>
+          <a:p>
+            <a:r>
+              <a:rPr lang="es-HN" altLang="es-MX" sz="800">
+                <a:solidFill>
+                  <a:schemeClr val="accent1"/>
+                </a:solidFill>
+              </a:rPr>
+              <a:t>[while]</a:t>
+            </a:r>
+            <a:endParaRPr lang="es-HN" altLang="es-MX" sz="800">
+              <a:solidFill>
+                <a:schemeClr val="accent1"/>
+              </a:solidFill>
+            </a:endParaRPr>
+          </a:p>
+        </p:txBody>
+      </p:sp>
+      <p:cxnSp>
+        <p:nvCxnSpPr>
+          <p:cNvPr id="115" name="Conector curvado 114"/>
+          <p:cNvCxnSpPr>
+            <a:stCxn id="68" idx="0"/>
+            <a:endCxn id="22" idx="2"/>
+          </p:cNvCxnSpPr>
+          <p:nvPr/>
+        </p:nvCxnSpPr>
+        <p:spPr>
+          <a:xfrm rot="16200000" flipV="1">
+            <a:off x="8886825" y="2352675"/>
+            <a:ext cx="2005330" cy="335915"/>
+          </a:xfrm>
+          <a:prstGeom prst="curvedConnector4">
+            <a:avLst>
+              <a:gd name="adj1" fmla="val 25664"/>
+              <a:gd name="adj2" fmla="val 170983"/>
+            </a:avLst>
+          </a:prstGeom>
+          <a:gradFill rotWithShape="0">
+            <a:gsLst>
+              <a:gs pos="0">
+                <a:schemeClr val="accent1"/>
+              </a:gs>
+              <a:gs pos="100000">
+                <a:schemeClr val="accent2"/>
+              </a:gs>
+            </a:gsLst>
+            <a:lin ang="5400000" scaled="1"/>
+          </a:gradFill>
+          <a:ln w="9525" cap="flat" cmpd="sng" algn="ctr">
+            <a:solidFill>
+              <a:schemeClr val="accent1"/>
+            </a:solidFill>
+            <a:prstDash val="solid"/>
+            <a:round/>
+            <a:headEnd type="none" w="med" len="med"/>
+            <a:tailEnd type="arrow" w="med" len="med"/>
+          </a:ln>
+        </p:spPr>
+      </p:cxnSp>
+      <p:sp>
+        <p:nvSpPr>
+          <p:cNvPr id="116" name="Cuadro de texto 115"/>
+          <p:cNvSpPr txBox="1"/>
+          <p:nvPr/>
+        </p:nvSpPr>
+        <p:spPr>
+          <a:xfrm>
+            <a:off x="9228455" y="1764665"/>
+            <a:ext cx="303530" cy="213995"/>
+          </a:xfrm>
+          <a:prstGeom prst="rect">
+            <a:avLst/>
+          </a:prstGeom>
+          <a:noFill/>
+        </p:spPr>
+        <p:txBody>
+          <a:bodyPr wrap="square" rtlCol="0">
+            <a:spAutoFit/>
+          </a:bodyPr>
+          <a:p>
+            <a:r>
+              <a:rPr lang="es-HN" altLang="es-MX" sz="800">
+                <a:solidFill>
+                  <a:schemeClr val="accent1"/>
+                </a:solidFill>
+              </a:rPr>
+              <a:t>[if]</a:t>
+            </a:r>
+            <a:endParaRPr lang="es-HN" altLang="es-MX" sz="800">
+              <a:solidFill>
+                <a:schemeClr val="accent1"/>
+              </a:solidFill>
+            </a:endParaRPr>
+          </a:p>
+        </p:txBody>
+      </p:sp>
+      <p:cxnSp>
+        <p:nvCxnSpPr>
+          <p:cNvPr id="117" name="Conector curvado 116"/>
+          <p:cNvCxnSpPr>
+            <a:stCxn id="60" idx="3"/>
+            <a:endCxn id="71" idx="7"/>
+          </p:cNvCxnSpPr>
+          <p:nvPr/>
+        </p:nvCxnSpPr>
+        <p:spPr>
+          <a:xfrm rot="5400000">
+            <a:off x="8979535" y="2785110"/>
+            <a:ext cx="697230" cy="982345"/>
+          </a:xfrm>
+          <a:prstGeom prst="curvedConnector3">
+            <a:avLst>
+              <a:gd name="adj1" fmla="val 49954"/>
+            </a:avLst>
+          </a:prstGeom>
+          <a:gradFill rotWithShape="0">
+            <a:gsLst>
+              <a:gs pos="0">
+                <a:schemeClr val="accent1"/>
+              </a:gs>
+              <a:gs pos="100000">
+                <a:schemeClr val="accent2"/>
+              </a:gs>
+            </a:gsLst>
+            <a:lin ang="5400000" scaled="1"/>
+          </a:gradFill>
+          <a:ln w="9525" cap="flat" cmpd="sng" algn="ctr">
+            <a:solidFill>
+              <a:srgbClr val="00B050"/>
+            </a:solidFill>
+            <a:prstDash val="solid"/>
+            <a:round/>
+            <a:headEnd type="none" w="med" len="med"/>
+            <a:tailEnd type="arrow" w="med" len="med"/>
+          </a:ln>
+        </p:spPr>
+      </p:cxnSp>
+      <p:sp>
+        <p:nvSpPr>
+          <p:cNvPr id="118" name="Cuadro de texto 117"/>
+          <p:cNvSpPr txBox="1"/>
+          <p:nvPr/>
+        </p:nvSpPr>
+        <p:spPr>
+          <a:xfrm>
+            <a:off x="9113520" y="3091815"/>
+            <a:ext cx="455930" cy="213995"/>
+          </a:xfrm>
+          <a:prstGeom prst="rect">
+            <a:avLst/>
+          </a:prstGeom>
+          <a:noFill/>
+        </p:spPr>
+        <p:txBody>
+          <a:bodyPr wrap="square" rtlCol="0">
+            <a:spAutoFit/>
+          </a:bodyPr>
+          <a:p>
+            <a:r>
+              <a:rPr lang="es-HN" altLang="es-MX" sz="800">
+                <a:solidFill>
+                  <a:srgbClr val="00B050"/>
+                </a:solidFill>
+              </a:rPr>
+              <a:t>[print]</a:t>
+            </a:r>
+            <a:endParaRPr lang="es-HN" altLang="es-MX" sz="800">
+              <a:solidFill>
+                <a:srgbClr val="00B050"/>
+              </a:solidFill>
+            </a:endParaRPr>
+          </a:p>
+        </p:txBody>
+      </p:sp>
+      <p:cxnSp>
+        <p:nvCxnSpPr>
+          <p:cNvPr id="119" name="Conector curvado 118"/>
+          <p:cNvCxnSpPr>
+            <a:stCxn id="60" idx="2"/>
+            <a:endCxn id="74" idx="7"/>
+          </p:cNvCxnSpPr>
+          <p:nvPr/>
+        </p:nvCxnSpPr>
+        <p:spPr>
+          <a:xfrm rot="10800000" flipV="1">
+            <a:off x="7575550" y="2680970"/>
+            <a:ext cx="2145665" cy="944880"/>
+          </a:xfrm>
+          <a:prstGeom prst="curvedConnector2">
+            <a:avLst/>
+          </a:prstGeom>
+          <a:gradFill rotWithShape="0">
+            <a:gsLst>
+              <a:gs pos="0">
+                <a:schemeClr val="accent1"/>
+              </a:gs>
+              <a:gs pos="100000">
+                <a:schemeClr val="accent2"/>
+              </a:gs>
+            </a:gsLst>
+            <a:lin ang="5400000" scaled="1"/>
+          </a:gradFill>
+          <a:ln w="9525" cap="flat" cmpd="sng" algn="ctr">
+            <a:solidFill>
+              <a:srgbClr val="00B050"/>
+            </a:solidFill>
+            <a:prstDash val="solid"/>
+            <a:round/>
+            <a:headEnd type="none" w="med" len="med"/>
+            <a:tailEnd type="arrow" w="med" len="med"/>
+          </a:ln>
+        </p:spPr>
+      </p:cxnSp>
+      <p:sp>
+        <p:nvSpPr>
+          <p:cNvPr id="120" name="Cuadro de texto 119"/>
+          <p:cNvSpPr txBox="1"/>
+          <p:nvPr/>
+        </p:nvSpPr>
+        <p:spPr>
+          <a:xfrm>
+            <a:off x="7743825" y="3169920"/>
+            <a:ext cx="455930" cy="275590"/>
+          </a:xfrm>
+          <a:prstGeom prst="rect">
+            <a:avLst/>
+          </a:prstGeom>
+          <a:noFill/>
+        </p:spPr>
+        <p:txBody>
+          <a:bodyPr wrap="square" rtlCol="0">
+            <a:spAutoFit/>
+          </a:bodyPr>
+          <a:p>
+            <a:r>
+              <a:rPr lang="es-HN" altLang="es-MX" sz="1200">
+                <a:solidFill>
+                  <a:srgbClr val="00B050"/>
+                </a:solidFill>
+              </a:rPr>
+              <a:t>[;]</a:t>
+            </a:r>
+            <a:endParaRPr lang="es-HN" altLang="es-MX" sz="1200">
+              <a:solidFill>
+                <a:srgbClr val="00B050"/>
+              </a:solidFill>
+            </a:endParaRPr>
+          </a:p>
+        </p:txBody>
+      </p:sp>
+      <p:cxnSp>
+        <p:nvCxnSpPr>
+          <p:cNvPr id="121" name="Conector curvado 120"/>
+          <p:cNvCxnSpPr>
+            <a:stCxn id="68" idx="4"/>
+            <a:endCxn id="74" idx="4"/>
+          </p:cNvCxnSpPr>
+          <p:nvPr/>
+        </p:nvCxnSpPr>
+        <p:spPr>
+          <a:xfrm rot="5400000">
+            <a:off x="8698865" y="2863215"/>
+            <a:ext cx="3175" cy="2717165"/>
+          </a:xfrm>
+          <a:prstGeom prst="curvedConnector3">
+            <a:avLst>
+              <a:gd name="adj1" fmla="val 19020000"/>
+            </a:avLst>
+          </a:prstGeom>
+          <a:gradFill rotWithShape="0">
+            <a:gsLst>
+              <a:gs pos="0">
+                <a:schemeClr val="accent1"/>
+              </a:gs>
+              <a:gs pos="100000">
+                <a:schemeClr val="accent2"/>
+              </a:gs>
+            </a:gsLst>
+            <a:lin ang="5400000" scaled="1"/>
+          </a:gradFill>
+          <a:ln w="9525" cap="flat" cmpd="sng" algn="ctr">
+            <a:solidFill>
+              <a:schemeClr val="accent1"/>
+            </a:solidFill>
+            <a:prstDash val="solid"/>
+            <a:round/>
+            <a:headEnd type="none" w="med" len="med"/>
+            <a:tailEnd type="arrow" w="med" len="med"/>
+          </a:ln>
+        </p:spPr>
+      </p:cxnSp>
+      <p:sp>
+        <p:nvSpPr>
+          <p:cNvPr id="122" name="Cuadro de texto 121"/>
+          <p:cNvSpPr txBox="1"/>
+          <p:nvPr/>
+        </p:nvSpPr>
+        <p:spPr>
+          <a:xfrm>
+            <a:off x="8420735" y="4904105"/>
+            <a:ext cx="455930" cy="275590"/>
+          </a:xfrm>
+          <a:prstGeom prst="rect">
+            <a:avLst/>
+          </a:prstGeom>
+          <a:noFill/>
+        </p:spPr>
+        <p:txBody>
+          <a:bodyPr wrap="square" rtlCol="0">
+            <a:spAutoFit/>
+          </a:bodyPr>
+          <a:p>
+            <a:r>
+              <a:rPr lang="es-HN" altLang="es-MX" sz="1200">
+                <a:solidFill>
+                  <a:schemeClr val="accent2"/>
+                </a:solidFill>
+              </a:rPr>
+              <a:t>[;]</a:t>
+            </a:r>
+            <a:endParaRPr lang="es-HN" altLang="es-MX" sz="1200">
+              <a:solidFill>
+                <a:schemeClr val="accent2"/>
+              </a:solidFill>
+            </a:endParaRPr>
+          </a:p>
+        </p:txBody>
+      </p:sp>
+      <p:cxnSp>
+        <p:nvCxnSpPr>
+          <p:cNvPr id="123" name="Conector curvado 122"/>
+          <p:cNvCxnSpPr>
+            <a:stCxn id="60" idx="7"/>
+            <a:endCxn id="22" idx="6"/>
+          </p:cNvCxnSpPr>
+          <p:nvPr/>
+        </p:nvCxnSpPr>
+        <p:spPr>
+          <a:xfrm rot="16200000">
+            <a:off x="9882505" y="1926590"/>
+            <a:ext cx="915670" cy="97790"/>
+          </a:xfrm>
+          <a:prstGeom prst="curvedConnector4">
+            <a:avLst>
+              <a:gd name="adj1" fmla="val 36477"/>
+              <a:gd name="adj2" fmla="val 343506"/>
+            </a:avLst>
+          </a:prstGeom>
+          <a:gradFill rotWithShape="0">
+            <a:gsLst>
+              <a:gs pos="0">
+                <a:schemeClr val="accent1"/>
+              </a:gs>
+              <a:gs pos="100000">
+                <a:schemeClr val="accent2"/>
+              </a:gs>
+            </a:gsLst>
+            <a:lin ang="5400000" scaled="1"/>
+          </a:gradFill>
+          <a:ln w="9525" cap="flat" cmpd="sng" algn="ctr">
+            <a:solidFill>
+              <a:srgbClr val="00B050"/>
+            </a:solidFill>
+            <a:prstDash val="solid"/>
+            <a:round/>
+            <a:headEnd type="none" w="med" len="med"/>
+            <a:tailEnd type="arrow" w="med" len="med"/>
+          </a:ln>
+        </p:spPr>
+      </p:cxnSp>
+      <p:sp>
+        <p:nvSpPr>
+          <p:cNvPr id="124" name="Cuadro de texto 123"/>
+          <p:cNvSpPr txBox="1"/>
+          <p:nvPr/>
+        </p:nvSpPr>
+        <p:spPr>
+          <a:xfrm>
+            <a:off x="10596880" y="2085975"/>
+            <a:ext cx="303530" cy="213995"/>
+          </a:xfrm>
+          <a:prstGeom prst="rect">
+            <a:avLst/>
+          </a:prstGeom>
+          <a:noFill/>
+        </p:spPr>
+        <p:txBody>
+          <a:bodyPr wrap="square" rtlCol="0">
+            <a:spAutoFit/>
+          </a:bodyPr>
+          <a:p>
+            <a:r>
+              <a:rPr lang="es-HN" altLang="es-MX" sz="800">
+                <a:solidFill>
+                  <a:srgbClr val="00B050"/>
+                </a:solidFill>
+              </a:rPr>
+              <a:t>[if]</a:t>
+            </a:r>
+            <a:endParaRPr lang="es-HN" altLang="es-MX" sz="800">
+              <a:solidFill>
+                <a:srgbClr val="00B050"/>
+              </a:solidFill>
+            </a:endParaRPr>
+          </a:p>
+        </p:txBody>
+      </p:sp>
+      <p:sp>
+        <p:nvSpPr>
+          <p:cNvPr id="125" name="Cuadro de texto 124"/>
+          <p:cNvSpPr txBox="1"/>
+          <p:nvPr/>
+        </p:nvSpPr>
+        <p:spPr>
+          <a:xfrm>
+            <a:off x="646430" y="3627755"/>
+            <a:ext cx="2927985" cy="829945"/>
+          </a:xfrm>
+          <a:prstGeom prst="rect">
+            <a:avLst/>
+          </a:prstGeom>
+          <a:noFill/>
+        </p:spPr>
+        <p:txBody>
+          <a:bodyPr wrap="none" rtlCol="0">
+            <a:spAutoFit/>
+          </a:bodyPr>
+          <a:p>
+            <a:r>
+              <a:rPr lang="es-HN" altLang="es-MX" sz="2400"/>
+              <a:t>Maquina de estados</a:t>
+            </a:r>
+            <a:endParaRPr lang="es-HN" altLang="es-MX" sz="2400"/>
+          </a:p>
+          <a:p>
+            <a:r>
+              <a:rPr lang="es-HN" altLang="es-MX" sz="2400"/>
+              <a:t>Generalizada</a:t>
+            </a:r>
+            <a:endParaRPr lang="es-HN" altLang="es-MX" sz="2400"/>
+          </a:p>
+        </p:txBody>
+      </p:sp>
     </p:spTree>
   </p:cSld>
   <p:clrMapOvr>

</xml_diff>

<commit_message>
commit 9 base maquina de estados definiciones
</commit_message>
<xml_diff>
--- a/Maquina_De_Estados/MDE_ONION.pptx
+++ b/Maquina_De_Estados/MDE_ONION.pptx
@@ -5,18 +5,22 @@
     <p:sldMasterId id="2147483648" r:id="rId1"/>
   </p:sldMasterIdLst>
   <p:notesMasterIdLst>
-    <p:notesMasterId r:id="rId5"/>
+    <p:notesMasterId r:id="rId10"/>
   </p:notesMasterIdLst>
   <p:handoutMasterIdLst>
-    <p:handoutMasterId r:id="rId6"/>
+    <p:handoutMasterId r:id="rId11"/>
   </p:handoutMasterIdLst>
   <p:sldIdLst>
-    <p:sldId id="258" r:id="rId2"/>
-    <p:sldId id="259" r:id="rId3"/>
-    <p:sldId id="260" r:id="rId4"/>
+    <p:sldId id="258" r:id="rId3"/>
+    <p:sldId id="259" r:id="rId4"/>
+    <p:sldId id="260" r:id="rId5"/>
+    <p:sldId id="261" r:id="rId6"/>
+    <p:sldId id="262" r:id="rId7"/>
+    <p:sldId id="263" r:id="rId8"/>
+    <p:sldId id="264" r:id="rId9"/>
   </p:sldIdLst>
   <p:sldSz cx="12192000" cy="6858000"/>
-  <p:notesSz cx="7104063" cy="10234613"/>
+  <p:notesSz cx="7103745" cy="10234295"/>
   <p:defaultTextStyle>
     <a:defPPr>
       <a:defRPr lang="zh-CN"/>
@@ -112,22 +116,6 @@
       </a:defRPr>
     </a:lvl9pPr>
   </p:defaultTextStyle>
-  <p:extLst>
-    <p:ext uri="{EFAFB233-063F-42B5-8137-9DF3F51BA10A}">
-      <p15:sldGuideLst xmlns:p15="http://schemas.microsoft.com/office/powerpoint/2012/main">
-        <p15:guide id="1" orient="horz" pos="2082">
-          <p15:clr>
-            <a:srgbClr val="A4A3A4"/>
-          </p15:clr>
-        </p15:guide>
-        <p15:guide id="2" pos="3944">
-          <p15:clr>
-            <a:srgbClr val="A4A3A4"/>
-          </p15:clr>
-        </p15:guide>
-      </p15:sldGuideLst>
-    </p:ext>
-  </p:extLst>
 </p:presentation>
 </file>
 
@@ -213,7 +201,6 @@
           <a:p>
             <a:fld id="{0F9B84EA-7D68-4D60-9CB1-D50884785D1C}" type="datetimeFigureOut">
               <a:rPr lang="en-US" smtClean="0"/>
-              <a:t>3/21/2021</a:t>
             </a:fld>
             <a:endParaRPr lang="en-US"/>
           </a:p>
@@ -279,7 +266,6 @@
           <a:p>
             <a:fld id="{8D4E0FC9-F1F8-4FAE-9988-3BA365CFD46F}" type="slidenum">
               <a:rPr lang="en-US" smtClean="0"/>
-              <a:t>‹Nº›</a:t>
             </a:fld>
             <a:endParaRPr lang="en-US"/>
           </a:p>
@@ -373,7 +359,6 @@
           <a:p>
             <a:fld id="{D6C8D182-E4C8-4120-9249-FC9774456FFA}" type="datetimeFigureOut">
               <a:rPr lang="en-US" smtClean="0"/>
-              <a:t>3/21/2021</a:t>
             </a:fld>
             <a:endParaRPr lang="en-US"/>
           </a:p>
@@ -440,6 +425,7 @@
               <a:rPr lang="en-US"/>
               <a:t>Edit Master text styles</a:t>
             </a:r>
+            <a:endParaRPr lang="en-US"/>
           </a:p>
           <a:p>
             <a:pPr lvl="1"/>
@@ -447,6 +433,7 @@
               <a:rPr lang="en-US"/>
               <a:t>Second level</a:t>
             </a:r>
+            <a:endParaRPr lang="en-US"/>
           </a:p>
           <a:p>
             <a:pPr lvl="2"/>
@@ -454,6 +441,7 @@
               <a:rPr lang="en-US"/>
               <a:t>Third level</a:t>
             </a:r>
+            <a:endParaRPr lang="en-US"/>
           </a:p>
           <a:p>
             <a:pPr lvl="3"/>
@@ -461,6 +449,7 @@
               <a:rPr lang="en-US"/>
               <a:t>Fourth level</a:t>
             </a:r>
+            <a:endParaRPr lang="en-US"/>
           </a:p>
           <a:p>
             <a:pPr lvl="4"/>
@@ -468,6 +457,7 @@
               <a:rPr lang="en-US"/>
               <a:t>Fifth level</a:t>
             </a:r>
+            <a:endParaRPr lang="en-US"/>
           </a:p>
         </p:txBody>
       </p:sp>
@@ -531,7 +521,6 @@
           <a:p>
             <a:fld id="{85D0DACE-38E0-42D2-9336-2B707D34BC6D}" type="slidenum">
               <a:rPr lang="en-US" smtClean="0"/>
-              <a:t>‹Nº›</a:t>
             </a:fld>
             <a:endParaRPr lang="en-US"/>
           </a:p>
@@ -636,7 +625,7 @@
 </file>
 
 <file path=ppt/slideLayouts/slideLayout1.xml><?xml version="1.0" encoding="utf-8"?>
-<p:sldLayout xmlns:a="http://schemas.openxmlformats.org/drawingml/2006/main" xmlns:r="http://schemas.openxmlformats.org/officeDocument/2006/relationships" xmlns:p="http://schemas.openxmlformats.org/presentationml/2006/main" showMasterSp="0" type="title" preserve="1">
+<p:sldLayout xmlns:a="http://schemas.openxmlformats.org/drawingml/2006/main" xmlns:r="http://schemas.openxmlformats.org/officeDocument/2006/relationships" xmlns:p="http://schemas.openxmlformats.org/presentationml/2006/main" type="title" preserve="1" showMasterSp="0">
   <p:cSld name="Title Slide">
     <p:bg>
       <p:bgPr>
@@ -718,6 +707,7 @@
               <a:rPr lang="en-US" altLang="zh-CN" noProof="0" smtClean="0"/>
               <a:t>Click to edit Master title style</a:t>
             </a:r>
+            <a:endParaRPr lang="en-US" altLang="zh-CN" noProof="0" smtClean="0"/>
           </a:p>
         </p:txBody>
       </p:sp>
@@ -752,6 +742,7 @@
               <a:rPr lang="en-US" altLang="zh-CN" noProof="0" smtClean="0"/>
               <a:t>Click to edit Master subtitle style</a:t>
             </a:r>
+            <a:endParaRPr lang="en-US" altLang="zh-CN" noProof="0" smtClean="0"/>
           </a:p>
         </p:txBody>
       </p:sp>
@@ -813,7 +804,6 @@
           <a:p>
             <a:fld id="{760FBDFE-C587-4B4C-A407-44438C67B59E}" type="datetimeFigureOut">
               <a:rPr lang="en-US" smtClean="0"/>
-              <a:t>3/21/2021</a:t>
             </a:fld>
             <a:endParaRPr lang="en-US"/>
           </a:p>
@@ -937,7 +927,6 @@
           <a:p>
             <a:fld id="{49AE70B2-8BF9-45C0-BB95-33D1B9D3A854}" type="slidenum">
               <a:rPr lang="en-US" smtClean="0"/>
-              <a:t>‹Nº›</a:t>
             </a:fld>
             <a:endParaRPr lang="en-US"/>
           </a:p>
@@ -1012,6 +1001,7 @@
               <a:rPr lang="en-US" smtClean="0"/>
               <a:t>Click to edit Master text styles</a:t>
             </a:r>
+            <a:endParaRPr lang="en-US" smtClean="0"/>
           </a:p>
           <a:p>
             <a:pPr lvl="1"/>
@@ -1019,6 +1009,7 @@
               <a:rPr lang="en-US" smtClean="0"/>
               <a:t>Second level</a:t>
             </a:r>
+            <a:endParaRPr lang="en-US" smtClean="0"/>
           </a:p>
           <a:p>
             <a:pPr lvl="2"/>
@@ -1026,6 +1017,7 @@
               <a:rPr lang="en-US" smtClean="0"/>
               <a:t>Third level</a:t>
             </a:r>
+            <a:endParaRPr lang="en-US" smtClean="0"/>
           </a:p>
           <a:p>
             <a:pPr lvl="3"/>
@@ -1033,6 +1025,7 @@
               <a:rPr lang="en-US" smtClean="0"/>
               <a:t>Fourth level</a:t>
             </a:r>
+            <a:endParaRPr lang="en-US" smtClean="0"/>
           </a:p>
           <a:p>
             <a:pPr lvl="4"/>
@@ -1186,7 +1179,6 @@
                 <a:ea typeface="SimSun" panose="02010600030101010101" pitchFamily="2" charset="-122"/>
                 <a:cs typeface="+mn-cs"/>
               </a:rPr>
-              <a:t>‹Nº›</a:t>
             </a:fld>
             <a:endParaRPr kumimoji="0" lang="en-US" altLang="zh-CN" sz="1400" b="0" i="0" u="none" strike="noStrike" kern="1200" cap="none" spc="0" normalizeH="0" baseline="0" noProof="0" smtClean="0">
               <a:ln>
@@ -1284,6 +1276,7 @@
               <a:rPr lang="en-US" smtClean="0"/>
               <a:t>Click to edit Master text styles</a:t>
             </a:r>
+            <a:endParaRPr lang="en-US" smtClean="0"/>
           </a:p>
           <a:p>
             <a:pPr lvl="1"/>
@@ -1291,6 +1284,7 @@
               <a:rPr lang="en-US" smtClean="0"/>
               <a:t>Second level</a:t>
             </a:r>
+            <a:endParaRPr lang="en-US" smtClean="0"/>
           </a:p>
           <a:p>
             <a:pPr lvl="2"/>
@@ -1298,6 +1292,7 @@
               <a:rPr lang="en-US" smtClean="0"/>
               <a:t>Third level</a:t>
             </a:r>
+            <a:endParaRPr lang="en-US" smtClean="0"/>
           </a:p>
           <a:p>
             <a:pPr lvl="3"/>
@@ -1305,6 +1300,7 @@
               <a:rPr lang="en-US" smtClean="0"/>
               <a:t>Fourth level</a:t>
             </a:r>
+            <a:endParaRPr lang="en-US" smtClean="0"/>
           </a:p>
           <a:p>
             <a:pPr lvl="4"/>
@@ -1333,7 +1329,6 @@
           <a:p>
             <a:fld id="{760FBDFE-C587-4B4C-A407-44438C67B59E}" type="datetimeFigureOut">
               <a:rPr lang="en-US" smtClean="0"/>
-              <a:t>3/21/2021</a:t>
             </a:fld>
             <a:endParaRPr lang="en-US"/>
           </a:p>
@@ -1375,7 +1370,6 @@
           <a:p>
             <a:fld id="{49AE70B2-8BF9-45C0-BB95-33D1B9D3A854}" type="slidenum">
               <a:rPr lang="en-US" smtClean="0"/>
-              <a:t>‹Nº›</a:t>
             </a:fld>
             <a:endParaRPr lang="en-US"/>
           </a:p>
@@ -1450,6 +1444,7 @@
               <a:rPr lang="en-US" smtClean="0"/>
               <a:t>Click to edit Master text styles</a:t>
             </a:r>
+            <a:endParaRPr lang="en-US" smtClean="0"/>
           </a:p>
           <a:p>
             <a:pPr lvl="1"/>
@@ -1457,6 +1452,7 @@
               <a:rPr lang="en-US" smtClean="0"/>
               <a:t>Second level</a:t>
             </a:r>
+            <a:endParaRPr lang="en-US" smtClean="0"/>
           </a:p>
           <a:p>
             <a:pPr lvl="2"/>
@@ -1464,6 +1460,7 @@
               <a:rPr lang="en-US" smtClean="0"/>
               <a:t>Third level</a:t>
             </a:r>
+            <a:endParaRPr lang="en-US" smtClean="0"/>
           </a:p>
           <a:p>
             <a:pPr lvl="3"/>
@@ -1471,6 +1468,7 @@
               <a:rPr lang="en-US" smtClean="0"/>
               <a:t>Fourth level</a:t>
             </a:r>
+            <a:endParaRPr lang="en-US" smtClean="0"/>
           </a:p>
           <a:p>
             <a:pPr lvl="4"/>
@@ -1499,7 +1497,6 @@
           <a:p>
             <a:fld id="{760FBDFE-C587-4B4C-A407-44438C67B59E}" type="datetimeFigureOut">
               <a:rPr lang="en-US" smtClean="0"/>
-              <a:t>3/21/2021</a:t>
             </a:fld>
             <a:endParaRPr lang="en-US"/>
           </a:p>
@@ -1541,7 +1538,6 @@
           <a:p>
             <a:fld id="{49AE70B2-8BF9-45C0-BB95-33D1B9D3A854}" type="slidenum">
               <a:rPr lang="en-US" smtClean="0"/>
-              <a:t>‹Nº›</a:t>
             </a:fld>
             <a:endParaRPr lang="en-US"/>
           </a:p>
@@ -1667,6 +1663,7 @@
               <a:rPr lang="en-US" smtClean="0"/>
               <a:t>Click to edit Master text styles</a:t>
             </a:r>
+            <a:endParaRPr lang="en-US" smtClean="0"/>
           </a:p>
         </p:txBody>
       </p:sp>
@@ -1687,7 +1684,6 @@
           <a:p>
             <a:fld id="{760FBDFE-C587-4B4C-A407-44438C67B59E}" type="datetimeFigureOut">
               <a:rPr lang="en-US" smtClean="0"/>
-              <a:t>3/21/2021</a:t>
             </a:fld>
             <a:endParaRPr lang="en-US"/>
           </a:p>
@@ -1729,7 +1725,6 @@
           <a:p>
             <a:fld id="{49AE70B2-8BF9-45C0-BB95-33D1B9D3A854}" type="slidenum">
               <a:rPr lang="en-US" smtClean="0"/>
-              <a:t>‹Nº›</a:t>
             </a:fld>
             <a:endParaRPr lang="en-US"/>
           </a:p>
@@ -1809,6 +1804,7 @@
               <a:rPr lang="en-US" smtClean="0"/>
               <a:t>Click to edit Master text styles</a:t>
             </a:r>
+            <a:endParaRPr lang="en-US" smtClean="0"/>
           </a:p>
           <a:p>
             <a:pPr lvl="1"/>
@@ -1816,6 +1812,7 @@
               <a:rPr lang="en-US" smtClean="0"/>
               <a:t>Second level</a:t>
             </a:r>
+            <a:endParaRPr lang="en-US" smtClean="0"/>
           </a:p>
           <a:p>
             <a:pPr lvl="2"/>
@@ -1823,6 +1820,7 @@
               <a:rPr lang="en-US" smtClean="0"/>
               <a:t>Third level</a:t>
             </a:r>
+            <a:endParaRPr lang="en-US" smtClean="0"/>
           </a:p>
           <a:p>
             <a:pPr lvl="3"/>
@@ -1830,6 +1828,7 @@
               <a:rPr lang="en-US" smtClean="0"/>
               <a:t>Fourth level</a:t>
             </a:r>
+            <a:endParaRPr lang="en-US" smtClean="0"/>
           </a:p>
           <a:p>
             <a:pPr lvl="4"/>
@@ -1866,6 +1865,7 @@
               <a:rPr lang="en-US" smtClean="0"/>
               <a:t>Click to edit Master text styles</a:t>
             </a:r>
+            <a:endParaRPr lang="en-US" smtClean="0"/>
           </a:p>
           <a:p>
             <a:pPr lvl="1"/>
@@ -1873,6 +1873,7 @@
               <a:rPr lang="en-US" smtClean="0"/>
               <a:t>Second level</a:t>
             </a:r>
+            <a:endParaRPr lang="en-US" smtClean="0"/>
           </a:p>
           <a:p>
             <a:pPr lvl="2"/>
@@ -1880,6 +1881,7 @@
               <a:rPr lang="en-US" smtClean="0"/>
               <a:t>Third level</a:t>
             </a:r>
+            <a:endParaRPr lang="en-US" smtClean="0"/>
           </a:p>
           <a:p>
             <a:pPr lvl="3"/>
@@ -1887,6 +1889,7 @@
               <a:rPr lang="en-US" smtClean="0"/>
               <a:t>Fourth level</a:t>
             </a:r>
+            <a:endParaRPr lang="en-US" smtClean="0"/>
           </a:p>
           <a:p>
             <a:pPr lvl="4"/>
@@ -1915,7 +1918,6 @@
           <a:p>
             <a:fld id="{760FBDFE-C587-4B4C-A407-44438C67B59E}" type="datetimeFigureOut">
               <a:rPr lang="en-US" smtClean="0"/>
-              <a:t>3/21/2021</a:t>
             </a:fld>
             <a:endParaRPr lang="en-US"/>
           </a:p>
@@ -1957,7 +1959,6 @@
           <a:p>
             <a:fld id="{49AE70B2-8BF9-45C0-BB95-33D1B9D3A854}" type="slidenum">
               <a:rPr lang="en-US" smtClean="0"/>
-              <a:t>‹Nº›</a:t>
             </a:fld>
             <a:endParaRPr lang="en-US"/>
           </a:p>
@@ -2079,6 +2080,7 @@
               <a:rPr lang="en-US" smtClean="0"/>
               <a:t>Click to edit Master text styles</a:t>
             </a:r>
+            <a:endParaRPr lang="en-US" smtClean="0"/>
           </a:p>
         </p:txBody>
       </p:sp>
@@ -2107,6 +2109,7 @@
               <a:rPr lang="en-US" smtClean="0"/>
               <a:t>Click to edit Master text styles</a:t>
             </a:r>
+            <a:endParaRPr lang="en-US" smtClean="0"/>
           </a:p>
           <a:p>
             <a:pPr lvl="1"/>
@@ -2114,6 +2117,7 @@
               <a:rPr lang="en-US" smtClean="0"/>
               <a:t>Second level</a:t>
             </a:r>
+            <a:endParaRPr lang="en-US" smtClean="0"/>
           </a:p>
           <a:p>
             <a:pPr lvl="2"/>
@@ -2121,6 +2125,7 @@
               <a:rPr lang="en-US" smtClean="0"/>
               <a:t>Third level</a:t>
             </a:r>
+            <a:endParaRPr lang="en-US" smtClean="0"/>
           </a:p>
           <a:p>
             <a:pPr lvl="3"/>
@@ -2128,6 +2133,7 @@
               <a:rPr lang="en-US" smtClean="0"/>
               <a:t>Fourth level</a:t>
             </a:r>
+            <a:endParaRPr lang="en-US" smtClean="0"/>
           </a:p>
           <a:p>
             <a:pPr lvl="4"/>
@@ -2201,6 +2207,7 @@
               <a:rPr lang="en-US" smtClean="0"/>
               <a:t>Click to edit Master text styles</a:t>
             </a:r>
+            <a:endParaRPr lang="en-US" smtClean="0"/>
           </a:p>
         </p:txBody>
       </p:sp>
@@ -2229,6 +2236,7 @@
               <a:rPr lang="en-US" smtClean="0"/>
               <a:t>Click to edit Master text styles</a:t>
             </a:r>
+            <a:endParaRPr lang="en-US" smtClean="0"/>
           </a:p>
           <a:p>
             <a:pPr lvl="1"/>
@@ -2236,6 +2244,7 @@
               <a:rPr lang="en-US" smtClean="0"/>
               <a:t>Second level</a:t>
             </a:r>
+            <a:endParaRPr lang="en-US" smtClean="0"/>
           </a:p>
           <a:p>
             <a:pPr lvl="2"/>
@@ -2243,6 +2252,7 @@
               <a:rPr lang="en-US" smtClean="0"/>
               <a:t>Third level</a:t>
             </a:r>
+            <a:endParaRPr lang="en-US" smtClean="0"/>
           </a:p>
           <a:p>
             <a:pPr lvl="3"/>
@@ -2250,6 +2260,7 @@
               <a:rPr lang="en-US" smtClean="0"/>
               <a:t>Fourth level</a:t>
             </a:r>
+            <a:endParaRPr lang="en-US" smtClean="0"/>
           </a:p>
           <a:p>
             <a:pPr lvl="4"/>
@@ -2278,7 +2289,6 @@
           <a:p>
             <a:fld id="{760FBDFE-C587-4B4C-A407-44438C67B59E}" type="datetimeFigureOut">
               <a:rPr lang="en-US" smtClean="0"/>
-              <a:t>3/21/2021</a:t>
             </a:fld>
             <a:endParaRPr lang="en-US"/>
           </a:p>
@@ -2320,7 +2330,6 @@
           <a:p>
             <a:fld id="{49AE70B2-8BF9-45C0-BB95-33D1B9D3A854}" type="slidenum">
               <a:rPr lang="en-US" smtClean="0"/>
-              <a:t>‹Nº›</a:t>
             </a:fld>
             <a:endParaRPr lang="en-US"/>
           </a:p>
@@ -2392,7 +2401,6 @@
           <a:p>
             <a:fld id="{760FBDFE-C587-4B4C-A407-44438C67B59E}" type="datetimeFigureOut">
               <a:rPr lang="en-US" smtClean="0"/>
-              <a:t>3/21/2021</a:t>
             </a:fld>
             <a:endParaRPr lang="en-US"/>
           </a:p>
@@ -2434,7 +2442,6 @@
           <a:p>
             <a:fld id="{49AE70B2-8BF9-45C0-BB95-33D1B9D3A854}" type="slidenum">
               <a:rPr lang="en-US" smtClean="0"/>
-              <a:t>‹Nº›</a:t>
             </a:fld>
             <a:endParaRPr lang="en-US"/>
           </a:p>
@@ -2483,7 +2490,6 @@
           <a:p>
             <a:fld id="{760FBDFE-C587-4B4C-A407-44438C67B59E}" type="datetimeFigureOut">
               <a:rPr lang="en-US" smtClean="0"/>
-              <a:t>3/21/2021</a:t>
             </a:fld>
             <a:endParaRPr lang="en-US"/>
           </a:p>
@@ -2525,7 +2531,6 @@
           <a:p>
             <a:fld id="{49AE70B2-8BF9-45C0-BB95-33D1B9D3A854}" type="slidenum">
               <a:rPr lang="en-US" smtClean="0"/>
-              <a:t>‹Nº›</a:t>
             </a:fld>
             <a:endParaRPr lang="en-US"/>
           </a:p>
@@ -2642,6 +2647,7 @@
               <a:rPr lang="en-US" smtClean="0"/>
               <a:t>Click to edit Master text styles</a:t>
             </a:r>
+            <a:endParaRPr lang="en-US" smtClean="0"/>
           </a:p>
           <a:p>
             <a:pPr lvl="1"/>
@@ -2649,6 +2655,7 @@
               <a:rPr lang="en-US" smtClean="0"/>
               <a:t>Second level</a:t>
             </a:r>
+            <a:endParaRPr lang="en-US" smtClean="0"/>
           </a:p>
           <a:p>
             <a:pPr lvl="2"/>
@@ -2656,6 +2663,7 @@
               <a:rPr lang="en-US" smtClean="0"/>
               <a:t>Third level</a:t>
             </a:r>
+            <a:endParaRPr lang="en-US" smtClean="0"/>
           </a:p>
           <a:p>
             <a:pPr lvl="3"/>
@@ -2663,6 +2671,7 @@
               <a:rPr lang="en-US" smtClean="0"/>
               <a:t>Fourth level</a:t>
             </a:r>
+            <a:endParaRPr lang="en-US" smtClean="0"/>
           </a:p>
           <a:p>
             <a:pPr lvl="4"/>
@@ -2736,6 +2745,7 @@
               <a:rPr lang="en-US" smtClean="0"/>
               <a:t>Click to edit Master text styles</a:t>
             </a:r>
+            <a:endParaRPr lang="en-US" smtClean="0"/>
           </a:p>
         </p:txBody>
       </p:sp>
@@ -2881,7 +2891,6 @@
                 <a:ea typeface="SimSun" panose="02010600030101010101" pitchFamily="2" charset="-122"/>
                 <a:cs typeface="+mn-cs"/>
               </a:rPr>
-              <a:t>‹Nº›</a:t>
             </a:fld>
             <a:endParaRPr kumimoji="0" lang="en-US" altLang="zh-CN" sz="1400" b="0" i="0" u="none" strike="noStrike" kern="1200" cap="none" spc="0" normalizeH="0" baseline="0" noProof="0" smtClean="0">
               <a:ln>
@@ -3110,6 +3119,7 @@
               <a:rPr lang="en-US" smtClean="0"/>
               <a:t>Click to edit Master text styles</a:t>
             </a:r>
+            <a:endParaRPr lang="en-US" smtClean="0"/>
           </a:p>
         </p:txBody>
       </p:sp>
@@ -3130,7 +3140,6 @@
           <a:p>
             <a:fld id="{9EFD9D74-47D9-4702-A33C-335B63B48DBF}" type="datetimeFigureOut">
               <a:rPr lang="en-US" smtClean="0"/>
-              <a:t>3/21/2021</a:t>
             </a:fld>
             <a:endParaRPr lang="en-US" dirty="0"/>
           </a:p>
@@ -3172,7 +3181,6 @@
           <a:p>
             <a:fld id="{FABC47A4-756D-490B-A52F-7D9E2C9FC05F}" type="slidenum">
               <a:rPr lang="en-US" smtClean="0"/>
-              <a:t>‹Nº›</a:t>
             </a:fld>
             <a:endParaRPr lang="en-US"/>
           </a:p>
@@ -3221,7 +3229,7 @@
           <p:nvPr/>
         </p:nvPicPr>
         <p:blipFill>
-          <a:blip r:embed="rId13"/>
+          <a:blip r:embed="rId12"/>
           <a:stretch>
             <a:fillRect/>
           </a:stretch>
@@ -3272,6 +3280,7 @@
               <a:rPr lang="en-US" altLang="zh-CN" dirty="0"/>
               <a:t>Click to edit Master title style</a:t>
             </a:r>
+            <a:endParaRPr lang="en-US" altLang="zh-CN" dirty="0"/>
           </a:p>
         </p:txBody>
       </p:sp>
@@ -3307,6 +3316,7 @@
               <a:rPr lang="en-US" altLang="zh-CN" dirty="0"/>
               <a:t>Click to edit Master text styles</a:t>
             </a:r>
+            <a:endParaRPr lang="en-US" altLang="zh-CN" dirty="0"/>
           </a:p>
           <a:p>
             <a:pPr lvl="1"/>
@@ -3314,6 +3324,7 @@
               <a:rPr lang="en-US" altLang="zh-CN" dirty="0"/>
               <a:t>Second level</a:t>
             </a:r>
+            <a:endParaRPr lang="en-US" altLang="zh-CN" dirty="0"/>
           </a:p>
           <a:p>
             <a:pPr lvl="2"/>
@@ -3321,6 +3332,7 @@
               <a:rPr lang="en-US" altLang="zh-CN" dirty="0"/>
               <a:t>Third level</a:t>
             </a:r>
+            <a:endParaRPr lang="en-US" altLang="zh-CN" dirty="0"/>
           </a:p>
           <a:p>
             <a:pPr lvl="3"/>
@@ -3328,6 +3340,7 @@
               <a:rPr lang="en-US" altLang="zh-CN" dirty="0"/>
               <a:t>Fourth level</a:t>
             </a:r>
+            <a:endParaRPr lang="en-US" altLang="zh-CN" dirty="0"/>
           </a:p>
           <a:p>
             <a:pPr lvl="4"/>
@@ -3335,6 +3348,7 @@
               <a:rPr lang="en-US" altLang="zh-CN" dirty="0"/>
               <a:t>Fifth level</a:t>
             </a:r>
+            <a:endParaRPr lang="en-US" altLang="zh-CN" dirty="0"/>
           </a:p>
         </p:txBody>
       </p:sp>
@@ -3400,7 +3414,6 @@
           <a:p>
             <a:fld id="{760FBDFE-C587-4B4C-A407-44438C67B59E}" type="datetimeFigureOut">
               <a:rPr lang="en-US" smtClean="0"/>
-              <a:t>3/21/2021</a:t>
             </a:fld>
             <a:endParaRPr lang="en-US" dirty="0"/>
           </a:p>
@@ -3532,7 +3545,6 @@
           <a:p>
             <a:fld id="{49AE70B2-8BF9-45C0-BB95-33D1B9D3A854}" type="slidenum">
               <a:rPr lang="en-US" smtClean="0"/>
-              <a:t>‹Nº›</a:t>
             </a:fld>
             <a:endParaRPr lang="en-US" dirty="0"/>
           </a:p>
@@ -4032,6 +4044,17 @@
               </a:rPr>
               <a:t>q0</a:t>
             </a:r>
+            <a:endParaRPr kumimoji="0" lang="es-HN" altLang="zh-CN" sz="1200" b="0" i="0" u="none" strike="noStrike" cap="none" normalizeH="0" baseline="0" smtClean="0">
+              <a:ln>
+                <a:noFill/>
+              </a:ln>
+              <a:solidFill>
+                <a:schemeClr val="tx1"/>
+              </a:solidFill>
+              <a:effectLst/>
+              <a:latin typeface="Arial" panose="020B0604020202020204" pitchFamily="34" charset="0"/>
+              <a:ea typeface="SimSun" panose="02010600030101010101" pitchFamily="2" charset="-122"/>
+            </a:endParaRPr>
           </a:p>
         </p:txBody>
       </p:sp>
@@ -4131,6 +4154,17 @@
               </a:rPr>
               <a:t>q1</a:t>
             </a:r>
+            <a:endParaRPr kumimoji="0" lang="es-HN" altLang="zh-CN" sz="1200" b="0" i="0" u="none" strike="noStrike" cap="none" normalizeH="0" baseline="0" smtClean="0">
+              <a:ln>
+                <a:noFill/>
+              </a:ln>
+              <a:solidFill>
+                <a:schemeClr val="tx1"/>
+              </a:solidFill>
+              <a:effectLst/>
+              <a:latin typeface="Arial" panose="020B0604020202020204" pitchFamily="34" charset="0"/>
+              <a:ea typeface="SimSun" panose="02010600030101010101" pitchFamily="2" charset="-122"/>
+            </a:endParaRPr>
           </a:p>
         </p:txBody>
       </p:sp>
@@ -4193,6 +4227,7 @@
               <a:rPr lang="es-HN" altLang="es-MX" sz="800"/>
               <a:t>[ONION core]</a:t>
             </a:r>
+            <a:endParaRPr lang="es-HN" altLang="es-MX" sz="800"/>
           </a:p>
         </p:txBody>
       </p:sp>
@@ -4259,6 +4294,17 @@
               </a:rPr>
               <a:t>q2</a:t>
             </a:r>
+            <a:endParaRPr kumimoji="0" lang="es-HN" altLang="zh-CN" sz="1200" b="0" i="0" u="none" strike="noStrike" cap="none" normalizeH="0" baseline="0" smtClean="0">
+              <a:ln>
+                <a:noFill/>
+              </a:ln>
+              <a:solidFill>
+                <a:schemeClr val="tx1"/>
+              </a:solidFill>
+              <a:effectLst/>
+              <a:latin typeface="Arial" panose="020B0604020202020204" pitchFamily="34" charset="0"/>
+              <a:ea typeface="SimSun" panose="02010600030101010101" pitchFamily="2" charset="-122"/>
+            </a:endParaRPr>
           </a:p>
         </p:txBody>
       </p:sp>
@@ -4321,6 +4367,7 @@
               <a:rPr lang="es-HN" altLang="es-MX" sz="800"/>
               <a:t>[import]</a:t>
             </a:r>
+            <a:endParaRPr lang="es-HN" altLang="es-MX" sz="800"/>
           </a:p>
         </p:txBody>
       </p:sp>
@@ -4387,6 +4434,17 @@
               </a:rPr>
               <a:t>q6</a:t>
             </a:r>
+            <a:endParaRPr kumimoji="0" lang="es-HN" altLang="zh-CN" sz="1200" b="0" i="0" u="none" strike="noStrike" cap="none" normalizeH="0" baseline="0" smtClean="0">
+              <a:ln>
+                <a:noFill/>
+              </a:ln>
+              <a:solidFill>
+                <a:schemeClr val="tx1"/>
+              </a:solidFill>
+              <a:effectLst/>
+              <a:latin typeface="Arial" panose="020B0604020202020204" pitchFamily="34" charset="0"/>
+              <a:ea typeface="SimSun" panose="02010600030101010101" pitchFamily="2" charset="-122"/>
+            </a:endParaRPr>
           </a:p>
         </p:txBody>
       </p:sp>
@@ -4486,6 +4544,17 @@
               </a:rPr>
               <a:t>q3</a:t>
             </a:r>
+            <a:endParaRPr kumimoji="0" lang="es-HN" altLang="zh-CN" sz="1200" b="0" i="0" u="none" strike="noStrike" cap="none" normalizeH="0" baseline="0" smtClean="0">
+              <a:ln>
+                <a:noFill/>
+              </a:ln>
+              <a:solidFill>
+                <a:schemeClr val="tx1"/>
+              </a:solidFill>
+              <a:effectLst/>
+              <a:latin typeface="Arial" panose="020B0604020202020204" pitchFamily="34" charset="0"/>
+              <a:ea typeface="SimSun" panose="02010600030101010101" pitchFamily="2" charset="-122"/>
+            </a:endParaRPr>
           </a:p>
         </p:txBody>
       </p:sp>
@@ -4585,6 +4654,17 @@
               </a:rPr>
               <a:t>q4</a:t>
             </a:r>
+            <a:endParaRPr kumimoji="0" lang="es-HN" altLang="zh-CN" sz="1200" b="0" i="0" u="none" strike="noStrike" cap="none" normalizeH="0" baseline="0" smtClean="0">
+              <a:ln>
+                <a:noFill/>
+              </a:ln>
+              <a:solidFill>
+                <a:schemeClr val="tx1"/>
+              </a:solidFill>
+              <a:effectLst/>
+              <a:latin typeface="Arial" panose="020B0604020202020204" pitchFamily="34" charset="0"/>
+              <a:ea typeface="SimSun" panose="02010600030101010101" pitchFamily="2" charset="-122"/>
+            </a:endParaRPr>
           </a:p>
         </p:txBody>
       </p:sp>
@@ -4684,6 +4764,17 @@
               </a:rPr>
               <a:t>q5</a:t>
             </a:r>
+            <a:endParaRPr kumimoji="0" lang="es-HN" altLang="zh-CN" sz="1200" b="0" i="0" u="none" strike="noStrike" cap="none" normalizeH="0" baseline="0" smtClean="0">
+              <a:ln>
+                <a:noFill/>
+              </a:ln>
+              <a:solidFill>
+                <a:schemeClr val="tx1"/>
+              </a:solidFill>
+              <a:effectLst/>
+              <a:latin typeface="Arial" panose="020B0604020202020204" pitchFamily="34" charset="0"/>
+              <a:ea typeface="SimSun" panose="02010600030101010101" pitchFamily="2" charset="-122"/>
+            </a:endParaRPr>
           </a:p>
         </p:txBody>
       </p:sp>
@@ -4746,6 +4837,7 @@
               <a:rPr lang="es-HN" altLang="es-MX" sz="800"/>
               <a:t>[{]</a:t>
             </a:r>
+            <a:endParaRPr lang="es-HN" altLang="es-MX" sz="800"/>
           </a:p>
         </p:txBody>
       </p:sp>
@@ -4775,6 +4867,7 @@
               <a:rPr lang="es-HN" altLang="es-MX" sz="800"/>
               <a:t>[nombre]</a:t>
             </a:r>
+            <a:endParaRPr lang="es-HN" altLang="es-MX" sz="800"/>
           </a:p>
         </p:txBody>
       </p:sp>
@@ -4804,6 +4897,7 @@
               <a:rPr lang="es-HN" altLang="es-MX" sz="800" dirty="0"/>
               <a:t>[var]</a:t>
             </a:r>
+            <a:endParaRPr lang="es-HN" altLang="es-MX" sz="800" dirty="0"/>
           </a:p>
         </p:txBody>
       </p:sp>
@@ -4833,6 +4927,7 @@
               <a:rPr lang="es-HN" altLang="es-MX" sz="800"/>
               <a:t>[func]</a:t>
             </a:r>
+            <a:endParaRPr lang="es-HN" altLang="es-MX" sz="800"/>
           </a:p>
         </p:txBody>
       </p:sp>
@@ -4899,6 +4994,17 @@
               </a:rPr>
               <a:t>q7</a:t>
             </a:r>
+            <a:endParaRPr kumimoji="0" lang="es-HN" altLang="zh-CN" sz="1200" b="0" i="0" u="none" strike="noStrike" cap="none" normalizeH="0" baseline="0" smtClean="0">
+              <a:ln>
+                <a:noFill/>
+              </a:ln>
+              <a:solidFill>
+                <a:schemeClr val="tx1"/>
+              </a:solidFill>
+              <a:effectLst/>
+              <a:latin typeface="Arial" panose="020B0604020202020204" pitchFamily="34" charset="0"/>
+              <a:ea typeface="SimSun" panose="02010600030101010101" pitchFamily="2" charset="-122"/>
+            </a:endParaRPr>
           </a:p>
         </p:txBody>
       </p:sp>
@@ -4965,6 +5071,7 @@
               <a:rPr lang="es-HN" altLang="es-MX" sz="800"/>
               <a:t>[if]</a:t>
             </a:r>
+            <a:endParaRPr lang="es-HN" altLang="es-MX" sz="800"/>
           </a:p>
         </p:txBody>
       </p:sp>
@@ -4994,6 +5101,7 @@
               <a:rPr lang="es-HN" altLang="es-MX" sz="800"/>
               <a:t>[while]</a:t>
             </a:r>
+            <a:endParaRPr lang="es-HN" altLang="es-MX" sz="800"/>
           </a:p>
         </p:txBody>
       </p:sp>
@@ -5060,6 +5168,17 @@
               </a:rPr>
               <a:t>q8</a:t>
             </a:r>
+            <a:endParaRPr kumimoji="0" lang="es-HN" altLang="zh-CN" sz="1200" b="0" i="0" u="none" strike="noStrike" cap="none" normalizeH="0" baseline="0" smtClean="0">
+              <a:ln>
+                <a:noFill/>
+              </a:ln>
+              <a:solidFill>
+                <a:schemeClr val="tx1"/>
+              </a:solidFill>
+              <a:effectLst/>
+              <a:latin typeface="Arial" panose="020B0604020202020204" pitchFamily="34" charset="0"/>
+              <a:ea typeface="SimSun" panose="02010600030101010101" pitchFamily="2" charset="-122"/>
+            </a:endParaRPr>
           </a:p>
         </p:txBody>
       </p:sp>
@@ -5126,6 +5245,7 @@
               <a:rPr lang="es-HN" altLang="es-MX" sz="800"/>
               <a:t>[switch]</a:t>
             </a:r>
+            <a:endParaRPr lang="es-HN" altLang="es-MX" sz="800"/>
           </a:p>
         </p:txBody>
       </p:sp>
@@ -5192,6 +5312,17 @@
               </a:rPr>
               <a:t>q9</a:t>
             </a:r>
+            <a:endParaRPr kumimoji="0" lang="es-HN" altLang="zh-CN" sz="1200" b="0" i="0" u="none" strike="noStrike" cap="none" normalizeH="0" baseline="0" smtClean="0">
+              <a:ln>
+                <a:noFill/>
+              </a:ln>
+              <a:solidFill>
+                <a:schemeClr val="tx1"/>
+              </a:solidFill>
+              <a:effectLst/>
+              <a:latin typeface="Arial" panose="020B0604020202020204" pitchFamily="34" charset="0"/>
+              <a:ea typeface="SimSun" panose="02010600030101010101" pitchFamily="2" charset="-122"/>
+            </a:endParaRPr>
           </a:p>
         </p:txBody>
       </p:sp>
@@ -5221,6 +5352,7 @@
               <a:rPr lang="es-HN" altLang="es-MX" sz="800"/>
               <a:t>[print]</a:t>
             </a:r>
+            <a:endParaRPr lang="es-HN" altLang="es-MX" sz="800"/>
           </a:p>
         </p:txBody>
       </p:sp>
@@ -5324,6 +5456,17 @@
               </a:rPr>
               <a:t>q10</a:t>
             </a:r>
+            <a:endParaRPr kumimoji="0" lang="es-HN" altLang="zh-CN" sz="1200" b="0" i="0" u="none" strike="noStrike" cap="none" normalizeH="0" baseline="0" smtClean="0">
+              <a:ln>
+                <a:noFill/>
+              </a:ln>
+              <a:solidFill>
+                <a:schemeClr val="tx1"/>
+              </a:solidFill>
+              <a:effectLst/>
+              <a:latin typeface="Arial" panose="020B0604020202020204" pitchFamily="34" charset="0"/>
+              <a:ea typeface="SimSun" panose="02010600030101010101" pitchFamily="2" charset="-122"/>
+            </a:endParaRPr>
           </a:p>
         </p:txBody>
       </p:sp>
@@ -5390,6 +5533,7 @@
               <a:rPr lang="es-HN" altLang="es-MX" sz="1200"/>
               <a:t>[;]</a:t>
             </a:r>
+            <a:endParaRPr lang="es-HN" altLang="es-MX" sz="1200"/>
           </a:p>
         </p:txBody>
       </p:sp>
@@ -5464,6 +5608,11 @@
               </a:rPr>
               <a:t>[;]</a:t>
             </a:r>
+            <a:endParaRPr lang="es-HN" altLang="es-MX" sz="1200">
+              <a:solidFill>
+                <a:schemeClr val="accent1"/>
+              </a:solidFill>
+            </a:endParaRPr>
           </a:p>
         </p:txBody>
       </p:sp>
@@ -5530,6 +5679,17 @@
               </a:rPr>
               <a:t>q11</a:t>
             </a:r>
+            <a:endParaRPr kumimoji="0" lang="es-HN" altLang="zh-CN" sz="1200" b="0" i="0" u="none" strike="noStrike" cap="none" normalizeH="0" baseline="0" smtClean="0">
+              <a:ln>
+                <a:noFill/>
+              </a:ln>
+              <a:solidFill>
+                <a:schemeClr val="tx1"/>
+              </a:solidFill>
+              <a:effectLst/>
+              <a:latin typeface="Arial" panose="020B0604020202020204" pitchFamily="34" charset="0"/>
+              <a:ea typeface="SimSun" panose="02010600030101010101" pitchFamily="2" charset="-122"/>
+            </a:endParaRPr>
           </a:p>
         </p:txBody>
       </p:sp>
@@ -5596,6 +5756,7 @@
               <a:rPr lang="es-HN" altLang="es-MX" sz="1200"/>
               <a:t>[{]</a:t>
             </a:r>
+            <a:endParaRPr lang="es-HN" altLang="es-MX" sz="1200"/>
           </a:p>
         </p:txBody>
       </p:sp>
@@ -5662,6 +5823,17 @@
               </a:rPr>
               <a:t>q11</a:t>
             </a:r>
+            <a:endParaRPr kumimoji="0" lang="es-HN" altLang="zh-CN" sz="1200" b="0" i="0" u="none" strike="noStrike" cap="none" normalizeH="0" baseline="0" smtClean="0">
+              <a:ln>
+                <a:noFill/>
+              </a:ln>
+              <a:solidFill>
+                <a:schemeClr val="tx1"/>
+              </a:solidFill>
+              <a:effectLst/>
+              <a:latin typeface="Arial" panose="020B0604020202020204" pitchFamily="34" charset="0"/>
+              <a:ea typeface="SimSun" panose="02010600030101010101" pitchFamily="2" charset="-122"/>
+            </a:endParaRPr>
           </a:p>
         </p:txBody>
       </p:sp>
@@ -5732,6 +5904,11 @@
               </a:rPr>
               <a:t>[ONION layer]</a:t>
             </a:r>
+            <a:endParaRPr lang="es-HN" altLang="es-MX" sz="800">
+              <a:solidFill>
+                <a:srgbClr val="00B0F0"/>
+              </a:solidFill>
+            </a:endParaRPr>
           </a:p>
         </p:txBody>
       </p:sp>
@@ -5966,6 +6143,11 @@
               </a:rPr>
               <a:t>[while]</a:t>
             </a:r>
+            <a:endParaRPr lang="es-HN" altLang="es-MX" sz="800">
+              <a:solidFill>
+                <a:srgbClr val="00B0F0"/>
+              </a:solidFill>
+            </a:endParaRPr>
           </a:p>
         </p:txBody>
       </p:sp>
@@ -5999,6 +6181,11 @@
               </a:rPr>
               <a:t>[switch]</a:t>
             </a:r>
+            <a:endParaRPr lang="es-HN" altLang="es-MX" sz="800">
+              <a:solidFill>
+                <a:srgbClr val="00B0F0"/>
+              </a:solidFill>
+            </a:endParaRPr>
           </a:p>
         </p:txBody>
       </p:sp>
@@ -6032,6 +6219,11 @@
               </a:rPr>
               <a:t>[print]</a:t>
             </a:r>
+            <a:endParaRPr lang="es-HN" altLang="es-MX" sz="800">
+              <a:solidFill>
+                <a:srgbClr val="00B0F0"/>
+              </a:solidFill>
+            </a:endParaRPr>
           </a:p>
         </p:txBody>
       </p:sp>
@@ -6114,6 +6306,7 @@
               <a:rPr lang="es-HN" altLang="es-MX" sz="800"/>
               <a:t>]</a:t>
             </a:r>
+            <a:endParaRPr lang="es-HN" altLang="es-MX" sz="800"/>
           </a:p>
         </p:txBody>
       </p:sp>
@@ -6196,6 +6389,7 @@
               <a:rPr lang="es-HN" altLang="es-MX" sz="800" dirty="0"/>
               <a:t>]</a:t>
             </a:r>
+            <a:endParaRPr lang="es-HN" altLang="es-MX" sz="800" dirty="0"/>
           </a:p>
         </p:txBody>
       </p:sp>
@@ -6311,6 +6505,11 @@
               </a:rPr>
               <a:t>[;]</a:t>
             </a:r>
+            <a:endParaRPr lang="es-HN" altLang="es-MX" sz="1200">
+              <a:solidFill>
+                <a:srgbClr val="FF0000"/>
+              </a:solidFill>
+            </a:endParaRPr>
           </a:p>
         </p:txBody>
       </p:sp>
@@ -6344,6 +6543,11 @@
               </a:rPr>
               <a:t>[;]</a:t>
             </a:r>
+            <a:endParaRPr lang="es-HN" altLang="es-MX" sz="1200">
+              <a:solidFill>
+                <a:schemeClr val="accent2"/>
+              </a:solidFill>
+            </a:endParaRPr>
           </a:p>
         </p:txBody>
       </p:sp>
@@ -6499,6 +6703,11 @@
               </a:rPr>
               <a:t>[switch]</a:t>
             </a:r>
+            <a:endParaRPr lang="es-HN" altLang="es-MX" sz="800">
+              <a:solidFill>
+                <a:srgbClr val="FFC000"/>
+              </a:solidFill>
+            </a:endParaRPr>
           </a:p>
         </p:txBody>
       </p:sp>
@@ -6532,6 +6741,11 @@
               </a:rPr>
               <a:t>[print]</a:t>
             </a:r>
+            <a:endParaRPr lang="es-HN" altLang="es-MX" sz="800">
+              <a:solidFill>
+                <a:srgbClr val="FFC000"/>
+              </a:solidFill>
+            </a:endParaRPr>
           </a:p>
         </p:txBody>
       </p:sp>
@@ -6565,6 +6779,11 @@
               </a:rPr>
               <a:t>[;]</a:t>
             </a:r>
+            <a:endParaRPr lang="es-HN" altLang="es-MX" sz="1200">
+              <a:solidFill>
+                <a:srgbClr val="FFC000"/>
+              </a:solidFill>
+            </a:endParaRPr>
           </a:p>
         </p:txBody>
       </p:sp>
@@ -6639,6 +6858,11 @@
               </a:rPr>
               <a:t>[while]</a:t>
             </a:r>
+            <a:endParaRPr lang="es-HN" altLang="es-MX" sz="800">
+              <a:solidFill>
+                <a:schemeClr val="accent1"/>
+              </a:solidFill>
+            </a:endParaRPr>
           </a:p>
         </p:txBody>
       </p:sp>
@@ -6714,6 +6938,11 @@
               </a:rPr>
               <a:t>[if]</a:t>
             </a:r>
+            <a:endParaRPr lang="es-HN" altLang="es-MX" sz="800">
+              <a:solidFill>
+                <a:schemeClr val="accent1"/>
+              </a:solidFill>
+            </a:endParaRPr>
           </a:p>
         </p:txBody>
       </p:sp>
@@ -6788,6 +7017,11 @@
               </a:rPr>
               <a:t>[print]</a:t>
             </a:r>
+            <a:endParaRPr lang="es-HN" altLang="es-MX" sz="800">
+              <a:solidFill>
+                <a:srgbClr val="00B050"/>
+              </a:solidFill>
+            </a:endParaRPr>
           </a:p>
         </p:txBody>
       </p:sp>
@@ -6860,6 +7094,11 @@
               </a:rPr>
               <a:t>[;]</a:t>
             </a:r>
+            <a:endParaRPr lang="es-HN" altLang="es-MX" sz="1200">
+              <a:solidFill>
+                <a:srgbClr val="00B050"/>
+              </a:solidFill>
+            </a:endParaRPr>
           </a:p>
         </p:txBody>
       </p:sp>
@@ -6934,6 +7173,11 @@
               </a:rPr>
               <a:t>[;]</a:t>
             </a:r>
+            <a:endParaRPr lang="es-HN" altLang="es-MX" sz="1200">
+              <a:solidFill>
+                <a:schemeClr val="accent2"/>
+              </a:solidFill>
+            </a:endParaRPr>
           </a:p>
         </p:txBody>
       </p:sp>
@@ -7009,6 +7253,11 @@
               </a:rPr>
               <a:t>[if]</a:t>
             </a:r>
+            <a:endParaRPr lang="es-HN" altLang="es-MX" sz="800">
+              <a:solidFill>
+                <a:srgbClr val="00B050"/>
+              </a:solidFill>
+            </a:endParaRPr>
           </a:p>
         </p:txBody>
       </p:sp>
@@ -7038,12 +7287,14 @@
               <a:rPr lang="es-HN" altLang="es-MX" sz="2400"/>
               <a:t>Maquina de estados</a:t>
             </a:r>
+            <a:endParaRPr lang="es-HN" altLang="es-MX" sz="2400"/>
           </a:p>
           <a:p>
             <a:r>
               <a:rPr lang="es-HN" altLang="es-MX" sz="2400"/>
               <a:t>Generalizada</a:t>
             </a:r>
+            <a:endParaRPr lang="es-HN" altLang="es-MX" sz="2400"/>
           </a:p>
         </p:txBody>
       </p:sp>
@@ -7706,11 +7957,6 @@
         </p:txBody>
       </p:sp>
     </p:spTree>
-    <p:extLst>
-      <p:ext uri="{BB962C8B-B14F-4D97-AF65-F5344CB8AC3E}">
-        <p14:creationId xmlns:p14="http://schemas.microsoft.com/office/powerpoint/2010/main" val="2538750849"/>
-      </p:ext>
-    </p:extLst>
   </p:cSld>
   <p:clrMapOvr>
     <a:masterClrMapping/>
@@ -7778,6 +8024,7 @@
               <a:rPr lang="es-HN" altLang="es-MX" sz="1400"/>
               <a:t>qo</a:t>
             </a:r>
+            <a:endParaRPr lang="es-HN" altLang="es-MX" sz="1400"/>
           </a:p>
         </p:txBody>
       </p:sp>
@@ -7824,6 +8071,7 @@
               <a:rPr lang="es-HN" altLang="es-MX"/>
               <a:t>q1</a:t>
             </a:r>
+            <a:endParaRPr lang="es-HN" altLang="es-MX"/>
           </a:p>
         </p:txBody>
       </p:sp>
@@ -7870,6 +8118,7 @@
               <a:rPr lang="es-HN" altLang="es-MX"/>
               <a:t>q2</a:t>
             </a:r>
+            <a:endParaRPr lang="es-HN" altLang="es-MX"/>
           </a:p>
         </p:txBody>
       </p:sp>
@@ -7916,6 +8165,7 @@
               <a:rPr lang="es-HN" altLang="es-MX"/>
               <a:t>q3</a:t>
             </a:r>
+            <a:endParaRPr lang="es-HN" altLang="es-MX"/>
           </a:p>
         </p:txBody>
       </p:sp>
@@ -8053,6 +8303,7 @@
               <a:rPr lang="es-HN" altLang="es-MX" sz="2400" dirty="0"/>
               <a:t>[valor]</a:t>
             </a:r>
+            <a:endParaRPr lang="es-HN" altLang="es-MX" sz="2400" dirty="0"/>
           </a:p>
         </p:txBody>
       </p:sp>
@@ -8082,6 +8333,7 @@
               <a:rPr lang="es-HN" altLang="es-MX" sz="2000" dirty="0"/>
               <a:t>[=]</a:t>
             </a:r>
+            <a:endParaRPr lang="es-HN" altLang="es-MX" sz="2000" dirty="0"/>
           </a:p>
         </p:txBody>
       </p:sp>
@@ -8141,6 +8393,7 @@
               <a:rPr lang="es-HN" altLang="es-MX" sz="2400" dirty="0"/>
               <a:t>[id ]</a:t>
             </a:r>
+            <a:endParaRPr lang="es-HN" altLang="es-MX" sz="2400" dirty="0"/>
           </a:p>
         </p:txBody>
       </p:sp>
@@ -8187,6 +8440,7 @@
               <a:rPr lang="es-HN" altLang="es-MX"/>
               <a:t>q3</a:t>
             </a:r>
+            <a:endParaRPr lang="es-HN" altLang="es-MX"/>
           </a:p>
         </p:txBody>
       </p:sp>
@@ -8220,6 +8474,7 @@
               <a:rPr lang="es-HN" altLang="es-MX" sz="2400" dirty="0"/>
               <a:t>]</a:t>
             </a:r>
+            <a:endParaRPr lang="es-HN" altLang="es-MX" sz="2400" dirty="0"/>
           </a:p>
         </p:txBody>
       </p:sp>
@@ -8335,11 +8590,3044 @@
         </p:txBody>
       </p:sp>
     </p:spTree>
-    <p:extLst>
-      <p:ext uri="{BB962C8B-B14F-4D97-AF65-F5344CB8AC3E}">
-        <p14:creationId xmlns:p14="http://schemas.microsoft.com/office/powerpoint/2010/main" val="1578781516"/>
-      </p:ext>
-    </p:extLst>
+  </p:cSld>
+  <p:clrMapOvr>
+    <a:masterClrMapping/>
+  </p:clrMapOvr>
+</p:sld>
+</file>
+
+<file path=ppt/slides/slide4.xml><?xml version="1.0" encoding="utf-8"?>
+<p:sld xmlns:a="http://schemas.openxmlformats.org/drawingml/2006/main" xmlns:r="http://schemas.openxmlformats.org/officeDocument/2006/relationships" xmlns:p="http://schemas.openxmlformats.org/presentationml/2006/main">
+  <p:cSld>
+    <p:spTree>
+      <p:nvGrpSpPr>
+        <p:cNvPr id="1" name=""/>
+        <p:cNvGrpSpPr/>
+        <p:nvPr/>
+      </p:nvGrpSpPr>
+      <p:grpSpPr>
+        <a:xfrm>
+          <a:off x="0" y="0"/>
+          <a:ext cx="0" cy="0"/>
+          <a:chOff x="0" y="0"/>
+          <a:chExt cx="0" cy="0"/>
+        </a:xfrm>
+      </p:grpSpPr>
+      <p:sp>
+        <p:nvSpPr>
+          <p:cNvPr id="3" name="Óvalo 2"/>
+          <p:cNvSpPr/>
+          <p:nvPr/>
+        </p:nvSpPr>
+        <p:spPr>
+          <a:xfrm>
+            <a:off x="2633980" y="2644140"/>
+            <a:ext cx="541655" cy="589915"/>
+          </a:xfrm>
+          <a:prstGeom prst="ellipse">
+            <a:avLst/>
+          </a:prstGeom>
+          <a:ln w="28575">
+            <a:solidFill>
+              <a:schemeClr val="accent1"/>
+            </a:solidFill>
+          </a:ln>
+        </p:spPr>
+        <p:style>
+          <a:lnRef idx="3">
+            <a:schemeClr val="lt1"/>
+          </a:lnRef>
+          <a:fillRef idx="1">
+            <a:schemeClr val="accent6"/>
+          </a:fillRef>
+          <a:effectRef idx="1">
+            <a:schemeClr val="accent6"/>
+          </a:effectRef>
+          <a:fontRef idx="minor">
+            <a:schemeClr val="lt1"/>
+          </a:fontRef>
+        </p:style>
+        <p:txBody>
+          <a:bodyPr rtlCol="0" anchor="ctr"/>
+          <a:p>
+            <a:pPr algn="ctr"/>
+            <a:r>
+              <a:rPr lang="es-HN" altLang="es-MX" sz="1400"/>
+              <a:t>qo</a:t>
+            </a:r>
+            <a:endParaRPr lang="es-HN" altLang="es-MX" sz="1400"/>
+          </a:p>
+        </p:txBody>
+      </p:sp>
+      <p:sp>
+        <p:nvSpPr>
+          <p:cNvPr id="4" name="Óvalo 3"/>
+          <p:cNvSpPr/>
+          <p:nvPr/>
+        </p:nvSpPr>
+        <p:spPr>
+          <a:xfrm>
+            <a:off x="3588385" y="2644140"/>
+            <a:ext cx="541655" cy="589915"/>
+          </a:xfrm>
+          <a:prstGeom prst="ellipse">
+            <a:avLst/>
+          </a:prstGeom>
+          <a:ln w="28575">
+            <a:solidFill>
+              <a:schemeClr val="accent1"/>
+            </a:solidFill>
+          </a:ln>
+        </p:spPr>
+        <p:style>
+          <a:lnRef idx="3">
+            <a:schemeClr val="lt1"/>
+          </a:lnRef>
+          <a:fillRef idx="1">
+            <a:schemeClr val="accent6"/>
+          </a:fillRef>
+          <a:effectRef idx="1">
+            <a:schemeClr val="accent6"/>
+          </a:effectRef>
+          <a:fontRef idx="minor">
+            <a:schemeClr val="lt1"/>
+          </a:fontRef>
+        </p:style>
+        <p:txBody>
+          <a:bodyPr rtlCol="0" anchor="ctr"/>
+          <a:p>
+            <a:pPr algn="ctr"/>
+            <a:r>
+              <a:rPr lang="es-HN" altLang="es-MX"/>
+              <a:t>q1</a:t>
+            </a:r>
+            <a:endParaRPr lang="es-HN" altLang="es-MX"/>
+          </a:p>
+        </p:txBody>
+      </p:sp>
+      <p:sp>
+        <p:nvSpPr>
+          <p:cNvPr id="6" name="Óvalo 5"/>
+          <p:cNvSpPr/>
+          <p:nvPr/>
+        </p:nvSpPr>
+        <p:spPr>
+          <a:xfrm>
+            <a:off x="4482465" y="2644140"/>
+            <a:ext cx="541655" cy="589915"/>
+          </a:xfrm>
+          <a:prstGeom prst="ellipse">
+            <a:avLst/>
+          </a:prstGeom>
+          <a:ln w="28575">
+            <a:solidFill>
+              <a:schemeClr val="accent1"/>
+            </a:solidFill>
+          </a:ln>
+        </p:spPr>
+        <p:style>
+          <a:lnRef idx="3">
+            <a:schemeClr val="lt1"/>
+          </a:lnRef>
+          <a:fillRef idx="1">
+            <a:schemeClr val="accent6"/>
+          </a:fillRef>
+          <a:effectRef idx="1">
+            <a:schemeClr val="accent6"/>
+          </a:effectRef>
+          <a:fontRef idx="minor">
+            <a:schemeClr val="lt1"/>
+          </a:fontRef>
+        </p:style>
+        <p:txBody>
+          <a:bodyPr rtlCol="0" anchor="ctr"/>
+          <a:p>
+            <a:pPr algn="ctr"/>
+            <a:r>
+              <a:rPr lang="es-HN" altLang="es-MX"/>
+              <a:t>q2</a:t>
+            </a:r>
+            <a:endParaRPr lang="es-HN" altLang="es-MX"/>
+          </a:p>
+        </p:txBody>
+      </p:sp>
+      <p:sp>
+        <p:nvSpPr>
+          <p:cNvPr id="7" name="Óvalo 6"/>
+          <p:cNvSpPr/>
+          <p:nvPr/>
+        </p:nvSpPr>
+        <p:spPr>
+          <a:xfrm>
+            <a:off x="5375910" y="2644140"/>
+            <a:ext cx="541655" cy="589915"/>
+          </a:xfrm>
+          <a:prstGeom prst="ellipse">
+            <a:avLst/>
+          </a:prstGeom>
+          <a:ln w="28575">
+            <a:solidFill>
+              <a:schemeClr val="accent1"/>
+            </a:solidFill>
+          </a:ln>
+        </p:spPr>
+        <p:style>
+          <a:lnRef idx="3">
+            <a:schemeClr val="lt1"/>
+          </a:lnRef>
+          <a:fillRef idx="1">
+            <a:schemeClr val="accent6"/>
+          </a:fillRef>
+          <a:effectRef idx="1">
+            <a:schemeClr val="accent6"/>
+          </a:effectRef>
+          <a:fontRef idx="minor">
+            <a:schemeClr val="lt1"/>
+          </a:fontRef>
+        </p:style>
+        <p:txBody>
+          <a:bodyPr rtlCol="0" anchor="ctr"/>
+          <a:p>
+            <a:pPr algn="ctr"/>
+            <a:r>
+              <a:rPr lang="es-HN" altLang="es-MX"/>
+              <a:t>q3</a:t>
+            </a:r>
+            <a:endParaRPr lang="es-HN" altLang="es-MX"/>
+          </a:p>
+        </p:txBody>
+      </p:sp>
+      <p:sp>
+        <p:nvSpPr>
+          <p:cNvPr id="8" name="Óvalo 7"/>
+          <p:cNvSpPr/>
+          <p:nvPr/>
+        </p:nvSpPr>
+        <p:spPr>
+          <a:xfrm>
+            <a:off x="6261100" y="2644140"/>
+            <a:ext cx="541655" cy="589915"/>
+          </a:xfrm>
+          <a:prstGeom prst="ellipse">
+            <a:avLst/>
+          </a:prstGeom>
+          <a:ln w="28575">
+            <a:solidFill>
+              <a:schemeClr val="accent1"/>
+            </a:solidFill>
+          </a:ln>
+        </p:spPr>
+        <p:style>
+          <a:lnRef idx="3">
+            <a:schemeClr val="lt1"/>
+          </a:lnRef>
+          <a:fillRef idx="1">
+            <a:schemeClr val="accent6"/>
+          </a:fillRef>
+          <a:effectRef idx="1">
+            <a:schemeClr val="accent6"/>
+          </a:effectRef>
+          <a:fontRef idx="minor">
+            <a:schemeClr val="lt1"/>
+          </a:fontRef>
+        </p:style>
+        <p:txBody>
+          <a:bodyPr rtlCol="0" anchor="ctr"/>
+          <a:p>
+            <a:pPr algn="ctr"/>
+            <a:r>
+              <a:rPr lang="es-HN" altLang="es-MX"/>
+              <a:t>q4</a:t>
+            </a:r>
+            <a:endParaRPr lang="es-HN" altLang="es-MX"/>
+          </a:p>
+        </p:txBody>
+      </p:sp>
+      <p:cxnSp>
+        <p:nvCxnSpPr>
+          <p:cNvPr id="9" name="Conector recto de flecha 8"/>
+          <p:cNvCxnSpPr>
+            <a:stCxn id="3" idx="6"/>
+            <a:endCxn id="4" idx="2"/>
+          </p:cNvCxnSpPr>
+          <p:nvPr/>
+        </p:nvCxnSpPr>
+        <p:spPr>
+          <a:xfrm>
+            <a:off x="3175635" y="2939415"/>
+            <a:ext cx="412750" cy="0"/>
+          </a:xfrm>
+          <a:prstGeom prst="straightConnector1">
+            <a:avLst/>
+          </a:prstGeom>
+          <a:ln>
+            <a:tailEnd type="arrow"/>
+          </a:ln>
+        </p:spPr>
+        <p:style>
+          <a:lnRef idx="1">
+            <a:schemeClr val="accent1"/>
+          </a:lnRef>
+          <a:fillRef idx="0">
+            <a:schemeClr val="accent1"/>
+          </a:fillRef>
+          <a:effectRef idx="0">
+            <a:schemeClr val="accent1"/>
+          </a:effectRef>
+          <a:fontRef idx="minor">
+            <a:schemeClr val="tx1"/>
+          </a:fontRef>
+        </p:style>
+      </p:cxnSp>
+      <p:cxnSp>
+        <p:nvCxnSpPr>
+          <p:cNvPr id="10" name="Conector recto de flecha 9"/>
+          <p:cNvCxnSpPr>
+            <a:stCxn id="4" idx="6"/>
+            <a:endCxn id="6" idx="2"/>
+          </p:cNvCxnSpPr>
+          <p:nvPr/>
+        </p:nvCxnSpPr>
+        <p:spPr>
+          <a:xfrm>
+            <a:off x="4130040" y="2939415"/>
+            <a:ext cx="352425" cy="0"/>
+          </a:xfrm>
+          <a:prstGeom prst="straightConnector1">
+            <a:avLst/>
+          </a:prstGeom>
+          <a:ln>
+            <a:tailEnd type="arrow"/>
+          </a:ln>
+        </p:spPr>
+        <p:style>
+          <a:lnRef idx="1">
+            <a:schemeClr val="accent1"/>
+          </a:lnRef>
+          <a:fillRef idx="0">
+            <a:schemeClr val="accent1"/>
+          </a:fillRef>
+          <a:effectRef idx="0">
+            <a:schemeClr val="accent1"/>
+          </a:effectRef>
+          <a:fontRef idx="minor">
+            <a:schemeClr val="tx1"/>
+          </a:fontRef>
+        </p:style>
+      </p:cxnSp>
+      <p:cxnSp>
+        <p:nvCxnSpPr>
+          <p:cNvPr id="11" name="Conector recto de flecha 10"/>
+          <p:cNvCxnSpPr>
+            <a:stCxn id="6" idx="6"/>
+            <a:endCxn id="7" idx="2"/>
+          </p:cNvCxnSpPr>
+          <p:nvPr/>
+        </p:nvCxnSpPr>
+        <p:spPr>
+          <a:xfrm>
+            <a:off x="5024120" y="2939415"/>
+            <a:ext cx="351790" cy="0"/>
+          </a:xfrm>
+          <a:prstGeom prst="straightConnector1">
+            <a:avLst/>
+          </a:prstGeom>
+          <a:ln>
+            <a:tailEnd type="arrow"/>
+          </a:ln>
+        </p:spPr>
+        <p:style>
+          <a:lnRef idx="1">
+            <a:schemeClr val="accent1"/>
+          </a:lnRef>
+          <a:fillRef idx="0">
+            <a:schemeClr val="accent1"/>
+          </a:fillRef>
+          <a:effectRef idx="0">
+            <a:schemeClr val="accent1"/>
+          </a:effectRef>
+          <a:fontRef idx="minor">
+            <a:schemeClr val="tx1"/>
+          </a:fontRef>
+        </p:style>
+      </p:cxnSp>
+      <p:cxnSp>
+        <p:nvCxnSpPr>
+          <p:cNvPr id="12" name="Conector recto de flecha 11"/>
+          <p:cNvCxnSpPr>
+            <a:stCxn id="7" idx="6"/>
+            <a:endCxn id="8" idx="2"/>
+          </p:cNvCxnSpPr>
+          <p:nvPr/>
+        </p:nvCxnSpPr>
+        <p:spPr>
+          <a:xfrm>
+            <a:off x="5917565" y="2939415"/>
+            <a:ext cx="343535" cy="0"/>
+          </a:xfrm>
+          <a:prstGeom prst="straightConnector1">
+            <a:avLst/>
+          </a:prstGeom>
+          <a:ln>
+            <a:tailEnd type="arrow"/>
+          </a:ln>
+        </p:spPr>
+        <p:style>
+          <a:lnRef idx="1">
+            <a:schemeClr val="accent1"/>
+          </a:lnRef>
+          <a:fillRef idx="0">
+            <a:schemeClr val="accent1"/>
+          </a:fillRef>
+          <a:effectRef idx="0">
+            <a:schemeClr val="accent1"/>
+          </a:effectRef>
+          <a:fontRef idx="minor">
+            <a:schemeClr val="tx1"/>
+          </a:fontRef>
+        </p:style>
+      </p:cxnSp>
+      <p:sp>
+        <p:nvSpPr>
+          <p:cNvPr id="13" name="Óvalo 12"/>
+          <p:cNvSpPr/>
+          <p:nvPr/>
+        </p:nvSpPr>
+        <p:spPr>
+          <a:xfrm>
+            <a:off x="7156450" y="2644775"/>
+            <a:ext cx="541655" cy="589915"/>
+          </a:xfrm>
+          <a:prstGeom prst="ellipse">
+            <a:avLst/>
+          </a:prstGeom>
+          <a:ln w="28575">
+            <a:solidFill>
+              <a:schemeClr val="accent1"/>
+            </a:solidFill>
+          </a:ln>
+        </p:spPr>
+        <p:style>
+          <a:lnRef idx="3">
+            <a:schemeClr val="lt1"/>
+          </a:lnRef>
+          <a:fillRef idx="1">
+            <a:schemeClr val="accent6"/>
+          </a:fillRef>
+          <a:effectRef idx="1">
+            <a:schemeClr val="accent6"/>
+          </a:effectRef>
+          <a:fontRef idx="minor">
+            <a:schemeClr val="lt1"/>
+          </a:fontRef>
+        </p:style>
+        <p:txBody>
+          <a:bodyPr rtlCol="0" anchor="ctr"/>
+          <a:p>
+            <a:pPr algn="ctr"/>
+            <a:r>
+              <a:rPr lang="es-HN" altLang="es-MX"/>
+              <a:t>q5</a:t>
+            </a:r>
+            <a:endParaRPr lang="es-HN" altLang="es-MX"/>
+          </a:p>
+        </p:txBody>
+      </p:sp>
+      <p:cxnSp>
+        <p:nvCxnSpPr>
+          <p:cNvPr id="14" name="Conector recto de flecha 13"/>
+          <p:cNvCxnSpPr>
+            <a:endCxn id="13" idx="2"/>
+          </p:cNvCxnSpPr>
+          <p:nvPr/>
+        </p:nvCxnSpPr>
+        <p:spPr>
+          <a:xfrm>
+            <a:off x="6812915" y="2940050"/>
+            <a:ext cx="343535" cy="0"/>
+          </a:xfrm>
+          <a:prstGeom prst="straightConnector1">
+            <a:avLst/>
+          </a:prstGeom>
+          <a:ln>
+            <a:tailEnd type="arrow"/>
+          </a:ln>
+        </p:spPr>
+        <p:style>
+          <a:lnRef idx="1">
+            <a:schemeClr val="accent1"/>
+          </a:lnRef>
+          <a:fillRef idx="0">
+            <a:schemeClr val="accent1"/>
+          </a:fillRef>
+          <a:effectRef idx="0">
+            <a:schemeClr val="accent1"/>
+          </a:effectRef>
+          <a:fontRef idx="minor">
+            <a:schemeClr val="tx1"/>
+          </a:fontRef>
+        </p:style>
+      </p:cxnSp>
+      <p:sp>
+        <p:nvSpPr>
+          <p:cNvPr id="15" name="Cuadro de texto 14"/>
+          <p:cNvSpPr txBox="1"/>
+          <p:nvPr/>
+        </p:nvSpPr>
+        <p:spPr>
+          <a:xfrm>
+            <a:off x="3218180" y="2644140"/>
+            <a:ext cx="327025" cy="229870"/>
+          </a:xfrm>
+          <a:prstGeom prst="rect">
+            <a:avLst/>
+          </a:prstGeom>
+          <a:noFill/>
+        </p:spPr>
+        <p:txBody>
+          <a:bodyPr wrap="square" rtlCol="0">
+            <a:spAutoFit/>
+          </a:bodyPr>
+          <a:p>
+            <a:r>
+              <a:rPr lang="es-HN" altLang="es-MX" sz="900"/>
+              <a:t>[if]</a:t>
+            </a:r>
+            <a:endParaRPr lang="es-HN" altLang="es-MX" sz="900"/>
+          </a:p>
+        </p:txBody>
+      </p:sp>
+      <p:sp>
+        <p:nvSpPr>
+          <p:cNvPr id="18" name="Cuadro de texto 17"/>
+          <p:cNvSpPr txBox="1"/>
+          <p:nvPr/>
+        </p:nvSpPr>
+        <p:spPr>
+          <a:xfrm>
+            <a:off x="4342765" y="2364105"/>
+            <a:ext cx="922020" cy="229870"/>
+          </a:xfrm>
+          <a:prstGeom prst="rect">
+            <a:avLst/>
+          </a:prstGeom>
+          <a:noFill/>
+        </p:spPr>
+        <p:txBody>
+          <a:bodyPr wrap="square" rtlCol="0">
+            <a:spAutoFit/>
+          </a:bodyPr>
+          <a:p>
+            <a:r>
+              <a:rPr lang="es-HN" altLang="es-MX" sz="900"/>
+              <a:t>[condicion]</a:t>
+            </a:r>
+            <a:endParaRPr lang="es-HN" altLang="es-MX" sz="900"/>
+          </a:p>
+        </p:txBody>
+      </p:sp>
+      <p:sp>
+        <p:nvSpPr>
+          <p:cNvPr id="19" name="Cuadro de texto 18"/>
+          <p:cNvSpPr txBox="1"/>
+          <p:nvPr/>
+        </p:nvSpPr>
+        <p:spPr>
+          <a:xfrm>
+            <a:off x="4155440" y="3104515"/>
+            <a:ext cx="327025" cy="229870"/>
+          </a:xfrm>
+          <a:prstGeom prst="rect">
+            <a:avLst/>
+          </a:prstGeom>
+          <a:noFill/>
+        </p:spPr>
+        <p:txBody>
+          <a:bodyPr wrap="square" rtlCol="0">
+            <a:spAutoFit/>
+          </a:bodyPr>
+          <a:p>
+            <a:r>
+              <a:rPr lang="es-HN" altLang="es-MX" sz="900"/>
+              <a:t>[(]</a:t>
+            </a:r>
+            <a:endParaRPr lang="es-HN" altLang="es-MX" sz="900"/>
+          </a:p>
+        </p:txBody>
+      </p:sp>
+      <p:sp>
+        <p:nvSpPr>
+          <p:cNvPr id="20" name="Cuadro de texto 19"/>
+          <p:cNvSpPr txBox="1"/>
+          <p:nvPr/>
+        </p:nvSpPr>
+        <p:spPr>
+          <a:xfrm>
+            <a:off x="5024120" y="3104515"/>
+            <a:ext cx="327025" cy="229870"/>
+          </a:xfrm>
+          <a:prstGeom prst="rect">
+            <a:avLst/>
+          </a:prstGeom>
+          <a:noFill/>
+        </p:spPr>
+        <p:txBody>
+          <a:bodyPr wrap="square" rtlCol="0">
+            <a:spAutoFit/>
+          </a:bodyPr>
+          <a:p>
+            <a:r>
+              <a:rPr lang="es-HN" altLang="es-MX" sz="900"/>
+              <a:t>[)]</a:t>
+            </a:r>
+            <a:endParaRPr lang="es-HN" altLang="es-MX" sz="900"/>
+          </a:p>
+        </p:txBody>
+      </p:sp>
+      <p:sp>
+        <p:nvSpPr>
+          <p:cNvPr id="22" name="Cuadro de texto 21"/>
+          <p:cNvSpPr txBox="1"/>
+          <p:nvPr/>
+        </p:nvSpPr>
+        <p:spPr>
+          <a:xfrm>
+            <a:off x="5917565" y="3104515"/>
+            <a:ext cx="327025" cy="229870"/>
+          </a:xfrm>
+          <a:prstGeom prst="rect">
+            <a:avLst/>
+          </a:prstGeom>
+          <a:noFill/>
+        </p:spPr>
+        <p:txBody>
+          <a:bodyPr wrap="square" rtlCol="0">
+            <a:spAutoFit/>
+          </a:bodyPr>
+          <a:p>
+            <a:r>
+              <a:rPr lang="es-HN" altLang="es-MX" sz="900"/>
+              <a:t>[:]</a:t>
+            </a:r>
+            <a:endParaRPr lang="es-HN" altLang="es-MX" sz="900"/>
+          </a:p>
+        </p:txBody>
+      </p:sp>
+      <p:sp>
+        <p:nvSpPr>
+          <p:cNvPr id="2" name="Cuadro de texto 1"/>
+          <p:cNvSpPr txBox="1"/>
+          <p:nvPr/>
+        </p:nvSpPr>
+        <p:spPr>
+          <a:xfrm>
+            <a:off x="6207760" y="2313940"/>
+            <a:ext cx="922020" cy="229870"/>
+          </a:xfrm>
+          <a:prstGeom prst="rect">
+            <a:avLst/>
+          </a:prstGeom>
+          <a:noFill/>
+        </p:spPr>
+        <p:txBody>
+          <a:bodyPr wrap="square" rtlCol="0">
+            <a:spAutoFit/>
+          </a:bodyPr>
+          <a:p>
+            <a:r>
+              <a:rPr lang="es-HN" altLang="es-MX" sz="900"/>
+              <a:t>[intruccion]</a:t>
+            </a:r>
+            <a:endParaRPr lang="es-HN" altLang="es-MX" sz="900"/>
+          </a:p>
+        </p:txBody>
+      </p:sp>
+      <p:sp>
+        <p:nvSpPr>
+          <p:cNvPr id="29" name="Cuadro de texto 28"/>
+          <p:cNvSpPr txBox="1"/>
+          <p:nvPr/>
+        </p:nvSpPr>
+        <p:spPr>
+          <a:xfrm>
+            <a:off x="6682105" y="3235960"/>
+            <a:ext cx="922020" cy="229870"/>
+          </a:xfrm>
+          <a:prstGeom prst="rect">
+            <a:avLst/>
+          </a:prstGeom>
+          <a:noFill/>
+        </p:spPr>
+        <p:txBody>
+          <a:bodyPr wrap="square" rtlCol="0">
+            <a:spAutoFit/>
+          </a:bodyPr>
+          <a:p>
+            <a:r>
+              <a:rPr lang="es-HN" altLang="es-MX" sz="900"/>
+              <a:t>[: else :]</a:t>
+            </a:r>
+            <a:endParaRPr lang="es-HN" altLang="es-MX" sz="900"/>
+          </a:p>
+        </p:txBody>
+      </p:sp>
+      <p:sp>
+        <p:nvSpPr>
+          <p:cNvPr id="21" name="Óvalo 20"/>
+          <p:cNvSpPr/>
+          <p:nvPr/>
+        </p:nvSpPr>
+        <p:spPr>
+          <a:xfrm>
+            <a:off x="8086725" y="2646045"/>
+            <a:ext cx="541655" cy="589915"/>
+          </a:xfrm>
+          <a:prstGeom prst="ellipse">
+            <a:avLst/>
+          </a:prstGeom>
+          <a:ln w="28575">
+            <a:solidFill>
+              <a:schemeClr val="accent1"/>
+            </a:solidFill>
+          </a:ln>
+        </p:spPr>
+        <p:style>
+          <a:lnRef idx="3">
+            <a:schemeClr val="lt1"/>
+          </a:lnRef>
+          <a:fillRef idx="1">
+            <a:schemeClr val="accent6"/>
+          </a:fillRef>
+          <a:effectRef idx="1">
+            <a:schemeClr val="accent6"/>
+          </a:effectRef>
+          <a:fontRef idx="minor">
+            <a:schemeClr val="lt1"/>
+          </a:fontRef>
+        </p:style>
+        <p:txBody>
+          <a:bodyPr rtlCol="0" anchor="ctr"/>
+          <a:p>
+            <a:pPr algn="ctr"/>
+            <a:r>
+              <a:rPr lang="es-HN" altLang="es-MX"/>
+              <a:t>q5</a:t>
+            </a:r>
+            <a:endParaRPr lang="es-HN" altLang="es-MX"/>
+          </a:p>
+        </p:txBody>
+      </p:sp>
+      <p:cxnSp>
+        <p:nvCxnSpPr>
+          <p:cNvPr id="24" name="Conector recto de flecha 23"/>
+          <p:cNvCxnSpPr>
+            <a:endCxn id="21" idx="2"/>
+          </p:cNvCxnSpPr>
+          <p:nvPr/>
+        </p:nvCxnSpPr>
+        <p:spPr>
+          <a:xfrm>
+            <a:off x="7743190" y="2941320"/>
+            <a:ext cx="343535" cy="0"/>
+          </a:xfrm>
+          <a:prstGeom prst="straightConnector1">
+            <a:avLst/>
+          </a:prstGeom>
+          <a:ln>
+            <a:tailEnd type="arrow"/>
+          </a:ln>
+        </p:spPr>
+        <p:style>
+          <a:lnRef idx="1">
+            <a:schemeClr val="accent1"/>
+          </a:lnRef>
+          <a:fillRef idx="0">
+            <a:schemeClr val="accent1"/>
+          </a:fillRef>
+          <a:effectRef idx="0">
+            <a:schemeClr val="accent1"/>
+          </a:effectRef>
+          <a:fontRef idx="minor">
+            <a:schemeClr val="tx1"/>
+          </a:fontRef>
+        </p:style>
+      </p:cxnSp>
+      <p:sp>
+        <p:nvSpPr>
+          <p:cNvPr id="25" name="Cuadro de texto 24"/>
+          <p:cNvSpPr txBox="1"/>
+          <p:nvPr/>
+        </p:nvSpPr>
+        <p:spPr>
+          <a:xfrm>
+            <a:off x="7865110" y="3235325"/>
+            <a:ext cx="327025" cy="229870"/>
+          </a:xfrm>
+          <a:prstGeom prst="rect">
+            <a:avLst/>
+          </a:prstGeom>
+          <a:noFill/>
+        </p:spPr>
+        <p:txBody>
+          <a:bodyPr wrap="square" rtlCol="0">
+            <a:spAutoFit/>
+          </a:bodyPr>
+          <a:p>
+            <a:r>
+              <a:rPr lang="es-HN" altLang="es-MX" sz="900"/>
+              <a:t>[;]</a:t>
+            </a:r>
+            <a:endParaRPr lang="es-HN" altLang="es-MX" sz="900"/>
+          </a:p>
+        </p:txBody>
+      </p:sp>
+      <p:sp>
+        <p:nvSpPr>
+          <p:cNvPr id="27" name="Óvalo 26"/>
+          <p:cNvSpPr/>
+          <p:nvPr/>
+        </p:nvSpPr>
+        <p:spPr>
+          <a:xfrm>
+            <a:off x="8148320" y="2713355"/>
+            <a:ext cx="418465" cy="455930"/>
+          </a:xfrm>
+          <a:prstGeom prst="ellipse">
+            <a:avLst/>
+          </a:prstGeom>
+          <a:ln w="28575">
+            <a:solidFill>
+              <a:schemeClr val="accent1"/>
+            </a:solidFill>
+          </a:ln>
+        </p:spPr>
+        <p:style>
+          <a:lnRef idx="3">
+            <a:schemeClr val="lt1"/>
+          </a:lnRef>
+          <a:fillRef idx="1">
+            <a:schemeClr val="accent6"/>
+          </a:fillRef>
+          <a:effectRef idx="1">
+            <a:schemeClr val="accent6"/>
+          </a:effectRef>
+          <a:fontRef idx="minor">
+            <a:schemeClr val="lt1"/>
+          </a:fontRef>
+        </p:style>
+        <p:txBody>
+          <a:bodyPr rtlCol="0" anchor="ctr"/>
+          <a:p>
+            <a:pPr algn="ctr"/>
+            <a:r>
+              <a:rPr lang="es-HN" altLang="es-MX"/>
+              <a:t>q6</a:t>
+            </a:r>
+            <a:endParaRPr lang="es-HN" altLang="es-MX"/>
+          </a:p>
+        </p:txBody>
+      </p:sp>
+      <p:sp>
+        <p:nvSpPr>
+          <p:cNvPr id="28" name="Cuadro de texto 27"/>
+          <p:cNvSpPr txBox="1"/>
+          <p:nvPr/>
+        </p:nvSpPr>
+        <p:spPr>
+          <a:xfrm>
+            <a:off x="7074535" y="2313940"/>
+            <a:ext cx="922020" cy="229870"/>
+          </a:xfrm>
+          <a:prstGeom prst="rect">
+            <a:avLst/>
+          </a:prstGeom>
+          <a:noFill/>
+        </p:spPr>
+        <p:txBody>
+          <a:bodyPr wrap="square" rtlCol="0">
+            <a:spAutoFit/>
+          </a:bodyPr>
+          <a:p>
+            <a:r>
+              <a:rPr lang="es-HN" altLang="es-MX" sz="900"/>
+              <a:t>[intruccion]</a:t>
+            </a:r>
+            <a:endParaRPr lang="es-HN" altLang="es-MX" sz="900"/>
+          </a:p>
+        </p:txBody>
+      </p:sp>
+      <p:cxnSp>
+        <p:nvCxnSpPr>
+          <p:cNvPr id="30" name="Conector curvado 29"/>
+          <p:cNvCxnSpPr>
+            <a:stCxn id="8" idx="0"/>
+            <a:endCxn id="21" idx="0"/>
+          </p:cNvCxnSpPr>
+          <p:nvPr/>
+        </p:nvCxnSpPr>
+        <p:spPr>
+          <a:xfrm rot="16200000" flipH="1">
+            <a:off x="7444105" y="1732280"/>
+            <a:ext cx="1905" cy="1825625"/>
+          </a:xfrm>
+          <a:prstGeom prst="curvedConnector3">
+            <a:avLst>
+              <a:gd name="adj1" fmla="val -12500000"/>
+            </a:avLst>
+          </a:prstGeom>
+          <a:ln>
+            <a:tailEnd type="arrow"/>
+          </a:ln>
+        </p:spPr>
+        <p:style>
+          <a:lnRef idx="1">
+            <a:schemeClr val="accent1"/>
+          </a:lnRef>
+          <a:fillRef idx="0">
+            <a:schemeClr val="accent1"/>
+          </a:fillRef>
+          <a:effectRef idx="0">
+            <a:schemeClr val="accent1"/>
+          </a:effectRef>
+          <a:fontRef idx="minor">
+            <a:schemeClr val="tx1"/>
+          </a:fontRef>
+        </p:style>
+      </p:cxnSp>
+      <p:sp>
+        <p:nvSpPr>
+          <p:cNvPr id="31" name="Cuadro de texto 30"/>
+          <p:cNvSpPr txBox="1"/>
+          <p:nvPr/>
+        </p:nvSpPr>
+        <p:spPr>
+          <a:xfrm>
+            <a:off x="7281545" y="1978025"/>
+            <a:ext cx="327025" cy="229870"/>
+          </a:xfrm>
+          <a:prstGeom prst="rect">
+            <a:avLst/>
+          </a:prstGeom>
+          <a:noFill/>
+        </p:spPr>
+        <p:txBody>
+          <a:bodyPr wrap="square" rtlCol="0">
+            <a:spAutoFit/>
+          </a:bodyPr>
+          <a:p>
+            <a:r>
+              <a:rPr lang="es-HN" altLang="es-MX" sz="900"/>
+              <a:t>[;]</a:t>
+            </a:r>
+            <a:endParaRPr lang="es-HN" altLang="es-MX" sz="900"/>
+          </a:p>
+        </p:txBody>
+      </p:sp>
+      <p:sp>
+        <p:nvSpPr>
+          <p:cNvPr id="17" name="Título 16"/>
+          <p:cNvSpPr>
+            <a:spLocks noGrp="1"/>
+          </p:cNvSpPr>
+          <p:nvPr>
+            <p:ph type="title"/>
+          </p:nvPr>
+        </p:nvSpPr>
+        <p:spPr>
+          <a:xfrm>
+            <a:off x="5114290" y="1158875"/>
+            <a:ext cx="10972800" cy="582613"/>
+          </a:xfrm>
+        </p:spPr>
+        <p:txBody>
+          <a:bodyPr/>
+          <a:p>
+            <a:r>
+              <a:rPr lang="es-HN" altLang="es-MX"/>
+              <a:t>IF</a:t>
+            </a:r>
+            <a:endParaRPr lang="es-HN" altLang="es-MX"/>
+          </a:p>
+        </p:txBody>
+      </p:sp>
+    </p:spTree>
+  </p:cSld>
+  <p:clrMapOvr>
+    <a:masterClrMapping/>
+  </p:clrMapOvr>
+</p:sld>
+</file>
+
+<file path=ppt/slides/slide5.xml><?xml version="1.0" encoding="utf-8"?>
+<p:sld xmlns:a="http://schemas.openxmlformats.org/drawingml/2006/main" xmlns:r="http://schemas.openxmlformats.org/officeDocument/2006/relationships" xmlns:p="http://schemas.openxmlformats.org/presentationml/2006/main">
+  <p:cSld>
+    <p:spTree>
+      <p:nvGrpSpPr>
+        <p:cNvPr id="1" name=""/>
+        <p:cNvGrpSpPr/>
+        <p:nvPr/>
+      </p:nvGrpSpPr>
+      <p:grpSpPr>
+        <a:xfrm>
+          <a:off x="0" y="0"/>
+          <a:ext cx="0" cy="0"/>
+          <a:chOff x="0" y="0"/>
+          <a:chExt cx="0" cy="0"/>
+        </a:xfrm>
+      </p:grpSpPr>
+      <p:sp>
+        <p:nvSpPr>
+          <p:cNvPr id="3" name="Óvalo 2"/>
+          <p:cNvSpPr/>
+          <p:nvPr/>
+        </p:nvSpPr>
+        <p:spPr>
+          <a:xfrm>
+            <a:off x="2933700" y="2577465"/>
+            <a:ext cx="541655" cy="589915"/>
+          </a:xfrm>
+          <a:prstGeom prst="ellipse">
+            <a:avLst/>
+          </a:prstGeom>
+          <a:ln w="28575">
+            <a:solidFill>
+              <a:schemeClr val="accent1"/>
+            </a:solidFill>
+          </a:ln>
+        </p:spPr>
+        <p:style>
+          <a:lnRef idx="3">
+            <a:schemeClr val="lt1"/>
+          </a:lnRef>
+          <a:fillRef idx="1">
+            <a:schemeClr val="accent6"/>
+          </a:fillRef>
+          <a:effectRef idx="1">
+            <a:schemeClr val="accent6"/>
+          </a:effectRef>
+          <a:fontRef idx="minor">
+            <a:schemeClr val="lt1"/>
+          </a:fontRef>
+        </p:style>
+        <p:txBody>
+          <a:bodyPr rtlCol="0" anchor="ctr"/>
+          <a:p>
+            <a:pPr algn="ctr"/>
+            <a:r>
+              <a:rPr lang="es-HN" altLang="es-MX" sz="1400"/>
+              <a:t>qo</a:t>
+            </a:r>
+            <a:endParaRPr lang="es-HN" altLang="es-MX" sz="1400"/>
+          </a:p>
+        </p:txBody>
+      </p:sp>
+      <p:sp>
+        <p:nvSpPr>
+          <p:cNvPr id="4" name="Óvalo 3"/>
+          <p:cNvSpPr/>
+          <p:nvPr/>
+        </p:nvSpPr>
+        <p:spPr>
+          <a:xfrm>
+            <a:off x="3888105" y="2577465"/>
+            <a:ext cx="541655" cy="589915"/>
+          </a:xfrm>
+          <a:prstGeom prst="ellipse">
+            <a:avLst/>
+          </a:prstGeom>
+          <a:ln w="28575">
+            <a:solidFill>
+              <a:schemeClr val="accent1"/>
+            </a:solidFill>
+          </a:ln>
+        </p:spPr>
+        <p:style>
+          <a:lnRef idx="3">
+            <a:schemeClr val="lt1"/>
+          </a:lnRef>
+          <a:fillRef idx="1">
+            <a:schemeClr val="accent6"/>
+          </a:fillRef>
+          <a:effectRef idx="1">
+            <a:schemeClr val="accent6"/>
+          </a:effectRef>
+          <a:fontRef idx="minor">
+            <a:schemeClr val="lt1"/>
+          </a:fontRef>
+        </p:style>
+        <p:txBody>
+          <a:bodyPr rtlCol="0" anchor="ctr"/>
+          <a:p>
+            <a:pPr algn="ctr"/>
+            <a:r>
+              <a:rPr lang="es-HN" altLang="es-MX"/>
+              <a:t>q1</a:t>
+            </a:r>
+            <a:endParaRPr lang="es-HN" altLang="es-MX"/>
+          </a:p>
+        </p:txBody>
+      </p:sp>
+      <p:sp>
+        <p:nvSpPr>
+          <p:cNvPr id="6" name="Óvalo 5"/>
+          <p:cNvSpPr/>
+          <p:nvPr/>
+        </p:nvSpPr>
+        <p:spPr>
+          <a:xfrm>
+            <a:off x="4782185" y="2577465"/>
+            <a:ext cx="541655" cy="589915"/>
+          </a:xfrm>
+          <a:prstGeom prst="ellipse">
+            <a:avLst/>
+          </a:prstGeom>
+          <a:ln w="28575">
+            <a:solidFill>
+              <a:schemeClr val="accent1"/>
+            </a:solidFill>
+          </a:ln>
+        </p:spPr>
+        <p:style>
+          <a:lnRef idx="3">
+            <a:schemeClr val="lt1"/>
+          </a:lnRef>
+          <a:fillRef idx="1">
+            <a:schemeClr val="accent6"/>
+          </a:fillRef>
+          <a:effectRef idx="1">
+            <a:schemeClr val="accent6"/>
+          </a:effectRef>
+          <a:fontRef idx="minor">
+            <a:schemeClr val="lt1"/>
+          </a:fontRef>
+        </p:style>
+        <p:txBody>
+          <a:bodyPr rtlCol="0" anchor="ctr"/>
+          <a:p>
+            <a:pPr algn="ctr"/>
+            <a:r>
+              <a:rPr lang="es-HN" altLang="es-MX"/>
+              <a:t>q2</a:t>
+            </a:r>
+            <a:endParaRPr lang="es-HN" altLang="es-MX"/>
+          </a:p>
+        </p:txBody>
+      </p:sp>
+      <p:sp>
+        <p:nvSpPr>
+          <p:cNvPr id="7" name="Óvalo 6"/>
+          <p:cNvSpPr/>
+          <p:nvPr/>
+        </p:nvSpPr>
+        <p:spPr>
+          <a:xfrm>
+            <a:off x="5675630" y="2577465"/>
+            <a:ext cx="541655" cy="589915"/>
+          </a:xfrm>
+          <a:prstGeom prst="ellipse">
+            <a:avLst/>
+          </a:prstGeom>
+          <a:ln w="28575">
+            <a:solidFill>
+              <a:schemeClr val="accent1"/>
+            </a:solidFill>
+          </a:ln>
+        </p:spPr>
+        <p:style>
+          <a:lnRef idx="3">
+            <a:schemeClr val="lt1"/>
+          </a:lnRef>
+          <a:fillRef idx="1">
+            <a:schemeClr val="accent6"/>
+          </a:fillRef>
+          <a:effectRef idx="1">
+            <a:schemeClr val="accent6"/>
+          </a:effectRef>
+          <a:fontRef idx="minor">
+            <a:schemeClr val="lt1"/>
+          </a:fontRef>
+        </p:style>
+        <p:txBody>
+          <a:bodyPr rtlCol="0" anchor="ctr"/>
+          <a:p>
+            <a:pPr algn="ctr"/>
+            <a:r>
+              <a:rPr lang="es-HN" altLang="es-MX"/>
+              <a:t>q3</a:t>
+            </a:r>
+            <a:endParaRPr lang="es-HN" altLang="es-MX"/>
+          </a:p>
+        </p:txBody>
+      </p:sp>
+      <p:sp>
+        <p:nvSpPr>
+          <p:cNvPr id="8" name="Óvalo 7"/>
+          <p:cNvSpPr/>
+          <p:nvPr/>
+        </p:nvSpPr>
+        <p:spPr>
+          <a:xfrm>
+            <a:off x="6560820" y="2577465"/>
+            <a:ext cx="541655" cy="589915"/>
+          </a:xfrm>
+          <a:prstGeom prst="ellipse">
+            <a:avLst/>
+          </a:prstGeom>
+          <a:ln w="28575">
+            <a:solidFill>
+              <a:schemeClr val="accent1"/>
+            </a:solidFill>
+          </a:ln>
+        </p:spPr>
+        <p:style>
+          <a:lnRef idx="3">
+            <a:schemeClr val="lt1"/>
+          </a:lnRef>
+          <a:fillRef idx="1">
+            <a:schemeClr val="accent6"/>
+          </a:fillRef>
+          <a:effectRef idx="1">
+            <a:schemeClr val="accent6"/>
+          </a:effectRef>
+          <a:fontRef idx="minor">
+            <a:schemeClr val="lt1"/>
+          </a:fontRef>
+        </p:style>
+        <p:txBody>
+          <a:bodyPr rtlCol="0" anchor="ctr"/>
+          <a:p>
+            <a:pPr algn="ctr"/>
+            <a:r>
+              <a:rPr lang="es-HN" altLang="es-MX"/>
+              <a:t>q4</a:t>
+            </a:r>
+            <a:endParaRPr lang="es-HN" altLang="es-MX"/>
+          </a:p>
+        </p:txBody>
+      </p:sp>
+      <p:cxnSp>
+        <p:nvCxnSpPr>
+          <p:cNvPr id="9" name="Conector recto de flecha 8"/>
+          <p:cNvCxnSpPr>
+            <a:stCxn id="3" idx="6"/>
+            <a:endCxn id="4" idx="2"/>
+          </p:cNvCxnSpPr>
+          <p:nvPr/>
+        </p:nvCxnSpPr>
+        <p:spPr>
+          <a:xfrm>
+            <a:off x="3475355" y="2872740"/>
+            <a:ext cx="412750" cy="0"/>
+          </a:xfrm>
+          <a:prstGeom prst="straightConnector1">
+            <a:avLst/>
+          </a:prstGeom>
+          <a:ln>
+            <a:tailEnd type="arrow"/>
+          </a:ln>
+        </p:spPr>
+        <p:style>
+          <a:lnRef idx="1">
+            <a:schemeClr val="accent1"/>
+          </a:lnRef>
+          <a:fillRef idx="0">
+            <a:schemeClr val="accent1"/>
+          </a:fillRef>
+          <a:effectRef idx="0">
+            <a:schemeClr val="accent1"/>
+          </a:effectRef>
+          <a:fontRef idx="minor">
+            <a:schemeClr val="tx1"/>
+          </a:fontRef>
+        </p:style>
+      </p:cxnSp>
+      <p:cxnSp>
+        <p:nvCxnSpPr>
+          <p:cNvPr id="10" name="Conector recto de flecha 9"/>
+          <p:cNvCxnSpPr>
+            <a:stCxn id="4" idx="6"/>
+            <a:endCxn id="6" idx="2"/>
+          </p:cNvCxnSpPr>
+          <p:nvPr/>
+        </p:nvCxnSpPr>
+        <p:spPr>
+          <a:xfrm>
+            <a:off x="4429760" y="2872740"/>
+            <a:ext cx="352425" cy="0"/>
+          </a:xfrm>
+          <a:prstGeom prst="straightConnector1">
+            <a:avLst/>
+          </a:prstGeom>
+          <a:ln>
+            <a:tailEnd type="arrow"/>
+          </a:ln>
+        </p:spPr>
+        <p:style>
+          <a:lnRef idx="1">
+            <a:schemeClr val="accent1"/>
+          </a:lnRef>
+          <a:fillRef idx="0">
+            <a:schemeClr val="accent1"/>
+          </a:fillRef>
+          <a:effectRef idx="0">
+            <a:schemeClr val="accent1"/>
+          </a:effectRef>
+          <a:fontRef idx="minor">
+            <a:schemeClr val="tx1"/>
+          </a:fontRef>
+        </p:style>
+      </p:cxnSp>
+      <p:cxnSp>
+        <p:nvCxnSpPr>
+          <p:cNvPr id="11" name="Conector recto de flecha 10"/>
+          <p:cNvCxnSpPr>
+            <a:stCxn id="6" idx="6"/>
+            <a:endCxn id="7" idx="2"/>
+          </p:cNvCxnSpPr>
+          <p:nvPr/>
+        </p:nvCxnSpPr>
+        <p:spPr>
+          <a:xfrm>
+            <a:off x="5323840" y="2872740"/>
+            <a:ext cx="351790" cy="0"/>
+          </a:xfrm>
+          <a:prstGeom prst="straightConnector1">
+            <a:avLst/>
+          </a:prstGeom>
+          <a:ln>
+            <a:tailEnd type="arrow"/>
+          </a:ln>
+        </p:spPr>
+        <p:style>
+          <a:lnRef idx="1">
+            <a:schemeClr val="accent1"/>
+          </a:lnRef>
+          <a:fillRef idx="0">
+            <a:schemeClr val="accent1"/>
+          </a:fillRef>
+          <a:effectRef idx="0">
+            <a:schemeClr val="accent1"/>
+          </a:effectRef>
+          <a:fontRef idx="minor">
+            <a:schemeClr val="tx1"/>
+          </a:fontRef>
+        </p:style>
+      </p:cxnSp>
+      <p:cxnSp>
+        <p:nvCxnSpPr>
+          <p:cNvPr id="12" name="Conector recto de flecha 11"/>
+          <p:cNvCxnSpPr>
+            <a:stCxn id="7" idx="6"/>
+            <a:endCxn id="8" idx="2"/>
+          </p:cNvCxnSpPr>
+          <p:nvPr/>
+        </p:nvCxnSpPr>
+        <p:spPr>
+          <a:xfrm>
+            <a:off x="6217285" y="2872740"/>
+            <a:ext cx="343535" cy="0"/>
+          </a:xfrm>
+          <a:prstGeom prst="straightConnector1">
+            <a:avLst/>
+          </a:prstGeom>
+          <a:ln>
+            <a:tailEnd type="arrow"/>
+          </a:ln>
+        </p:spPr>
+        <p:style>
+          <a:lnRef idx="1">
+            <a:schemeClr val="accent1"/>
+          </a:lnRef>
+          <a:fillRef idx="0">
+            <a:schemeClr val="accent1"/>
+          </a:fillRef>
+          <a:effectRef idx="0">
+            <a:schemeClr val="accent1"/>
+          </a:effectRef>
+          <a:fontRef idx="minor">
+            <a:schemeClr val="tx1"/>
+          </a:fontRef>
+        </p:style>
+      </p:cxnSp>
+      <p:sp>
+        <p:nvSpPr>
+          <p:cNvPr id="13" name="Óvalo 12"/>
+          <p:cNvSpPr/>
+          <p:nvPr/>
+        </p:nvSpPr>
+        <p:spPr>
+          <a:xfrm>
+            <a:off x="7456170" y="2578100"/>
+            <a:ext cx="541655" cy="589915"/>
+          </a:xfrm>
+          <a:prstGeom prst="ellipse">
+            <a:avLst/>
+          </a:prstGeom>
+          <a:ln w="28575">
+            <a:solidFill>
+              <a:schemeClr val="accent1"/>
+            </a:solidFill>
+          </a:ln>
+        </p:spPr>
+        <p:style>
+          <a:lnRef idx="3">
+            <a:schemeClr val="lt1"/>
+          </a:lnRef>
+          <a:fillRef idx="1">
+            <a:schemeClr val="accent6"/>
+          </a:fillRef>
+          <a:effectRef idx="1">
+            <a:schemeClr val="accent6"/>
+          </a:effectRef>
+          <a:fontRef idx="minor">
+            <a:schemeClr val="lt1"/>
+          </a:fontRef>
+        </p:style>
+        <p:txBody>
+          <a:bodyPr rtlCol="0" anchor="ctr"/>
+          <a:p>
+            <a:pPr algn="ctr"/>
+            <a:r>
+              <a:rPr lang="es-HN" altLang="es-MX"/>
+              <a:t>q5</a:t>
+            </a:r>
+            <a:endParaRPr lang="es-HN" altLang="es-MX"/>
+          </a:p>
+        </p:txBody>
+      </p:sp>
+      <p:cxnSp>
+        <p:nvCxnSpPr>
+          <p:cNvPr id="14" name="Conector recto de flecha 13"/>
+          <p:cNvCxnSpPr>
+            <a:endCxn id="13" idx="2"/>
+          </p:cNvCxnSpPr>
+          <p:nvPr/>
+        </p:nvCxnSpPr>
+        <p:spPr>
+          <a:xfrm>
+            <a:off x="7112635" y="2873375"/>
+            <a:ext cx="343535" cy="0"/>
+          </a:xfrm>
+          <a:prstGeom prst="straightConnector1">
+            <a:avLst/>
+          </a:prstGeom>
+          <a:ln>
+            <a:tailEnd type="arrow"/>
+          </a:ln>
+        </p:spPr>
+        <p:style>
+          <a:lnRef idx="1">
+            <a:schemeClr val="accent1"/>
+          </a:lnRef>
+          <a:fillRef idx="0">
+            <a:schemeClr val="accent1"/>
+          </a:fillRef>
+          <a:effectRef idx="0">
+            <a:schemeClr val="accent1"/>
+          </a:effectRef>
+          <a:fontRef idx="minor">
+            <a:schemeClr val="tx1"/>
+          </a:fontRef>
+        </p:style>
+      </p:cxnSp>
+      <p:sp>
+        <p:nvSpPr>
+          <p:cNvPr id="15" name="Cuadro de texto 14"/>
+          <p:cNvSpPr txBox="1"/>
+          <p:nvPr/>
+        </p:nvSpPr>
+        <p:spPr>
+          <a:xfrm>
+            <a:off x="3384550" y="2577465"/>
+            <a:ext cx="594995" cy="229870"/>
+          </a:xfrm>
+          <a:prstGeom prst="rect">
+            <a:avLst/>
+          </a:prstGeom>
+          <a:noFill/>
+        </p:spPr>
+        <p:txBody>
+          <a:bodyPr wrap="square" rtlCol="0">
+            <a:spAutoFit/>
+          </a:bodyPr>
+          <a:p>
+            <a:r>
+              <a:rPr lang="es-HN" altLang="es-MX" sz="900"/>
+              <a:t>[func]</a:t>
+            </a:r>
+            <a:endParaRPr lang="es-HN" altLang="es-MX" sz="900"/>
+          </a:p>
+        </p:txBody>
+      </p:sp>
+      <p:sp>
+        <p:nvSpPr>
+          <p:cNvPr id="18" name="Cuadro de texto 17"/>
+          <p:cNvSpPr txBox="1"/>
+          <p:nvPr/>
+        </p:nvSpPr>
+        <p:spPr>
+          <a:xfrm>
+            <a:off x="4642485" y="2297430"/>
+            <a:ext cx="922020" cy="229870"/>
+          </a:xfrm>
+          <a:prstGeom prst="rect">
+            <a:avLst/>
+          </a:prstGeom>
+          <a:noFill/>
+        </p:spPr>
+        <p:txBody>
+          <a:bodyPr wrap="square" rtlCol="0">
+            <a:spAutoFit/>
+          </a:bodyPr>
+          <a:p>
+            <a:r>
+              <a:rPr lang="es-HN" altLang="es-MX" sz="900"/>
+              <a:t>[parametros]</a:t>
+            </a:r>
+            <a:endParaRPr lang="es-HN" altLang="es-MX" sz="900"/>
+          </a:p>
+        </p:txBody>
+      </p:sp>
+      <p:sp>
+        <p:nvSpPr>
+          <p:cNvPr id="19" name="Cuadro de texto 18"/>
+          <p:cNvSpPr txBox="1"/>
+          <p:nvPr/>
+        </p:nvSpPr>
+        <p:spPr>
+          <a:xfrm>
+            <a:off x="4455160" y="3037840"/>
+            <a:ext cx="327025" cy="229870"/>
+          </a:xfrm>
+          <a:prstGeom prst="rect">
+            <a:avLst/>
+          </a:prstGeom>
+          <a:noFill/>
+        </p:spPr>
+        <p:txBody>
+          <a:bodyPr wrap="square" rtlCol="0">
+            <a:spAutoFit/>
+          </a:bodyPr>
+          <a:p>
+            <a:r>
+              <a:rPr lang="es-HN" altLang="es-MX" sz="900"/>
+              <a:t>[(]</a:t>
+            </a:r>
+            <a:endParaRPr lang="es-HN" altLang="es-MX" sz="900"/>
+          </a:p>
+        </p:txBody>
+      </p:sp>
+      <p:sp>
+        <p:nvSpPr>
+          <p:cNvPr id="20" name="Cuadro de texto 19"/>
+          <p:cNvSpPr txBox="1"/>
+          <p:nvPr/>
+        </p:nvSpPr>
+        <p:spPr>
+          <a:xfrm>
+            <a:off x="5323840" y="3037840"/>
+            <a:ext cx="327025" cy="229870"/>
+          </a:xfrm>
+          <a:prstGeom prst="rect">
+            <a:avLst/>
+          </a:prstGeom>
+          <a:noFill/>
+        </p:spPr>
+        <p:txBody>
+          <a:bodyPr wrap="square" rtlCol="0">
+            <a:spAutoFit/>
+          </a:bodyPr>
+          <a:p>
+            <a:r>
+              <a:rPr lang="es-HN" altLang="es-MX" sz="900"/>
+              <a:t>[)]</a:t>
+            </a:r>
+            <a:endParaRPr lang="es-HN" altLang="es-MX" sz="900"/>
+          </a:p>
+        </p:txBody>
+      </p:sp>
+      <p:sp>
+        <p:nvSpPr>
+          <p:cNvPr id="22" name="Cuadro de texto 21"/>
+          <p:cNvSpPr txBox="1"/>
+          <p:nvPr/>
+        </p:nvSpPr>
+        <p:spPr>
+          <a:xfrm>
+            <a:off x="6217285" y="3037840"/>
+            <a:ext cx="327025" cy="229870"/>
+          </a:xfrm>
+          <a:prstGeom prst="rect">
+            <a:avLst/>
+          </a:prstGeom>
+          <a:noFill/>
+        </p:spPr>
+        <p:txBody>
+          <a:bodyPr wrap="square" rtlCol="0">
+            <a:spAutoFit/>
+          </a:bodyPr>
+          <a:p>
+            <a:r>
+              <a:rPr lang="es-HN" altLang="es-MX" sz="900"/>
+              <a:t>[:]</a:t>
+            </a:r>
+            <a:endParaRPr lang="es-HN" altLang="es-MX" sz="900"/>
+          </a:p>
+        </p:txBody>
+      </p:sp>
+      <p:sp>
+        <p:nvSpPr>
+          <p:cNvPr id="23" name="Cuadro de texto 22"/>
+          <p:cNvSpPr txBox="1"/>
+          <p:nvPr/>
+        </p:nvSpPr>
+        <p:spPr>
+          <a:xfrm>
+            <a:off x="7102475" y="3101340"/>
+            <a:ext cx="327025" cy="229870"/>
+          </a:xfrm>
+          <a:prstGeom prst="rect">
+            <a:avLst/>
+          </a:prstGeom>
+          <a:noFill/>
+        </p:spPr>
+        <p:txBody>
+          <a:bodyPr wrap="square" rtlCol="0">
+            <a:spAutoFit/>
+          </a:bodyPr>
+          <a:p>
+            <a:r>
+              <a:rPr lang="es-HN" altLang="es-MX" sz="900"/>
+              <a:t>[;]</a:t>
+            </a:r>
+            <a:endParaRPr lang="es-HN" altLang="es-MX" sz="900"/>
+          </a:p>
+        </p:txBody>
+      </p:sp>
+      <p:sp>
+        <p:nvSpPr>
+          <p:cNvPr id="26" name="Óvalo 25"/>
+          <p:cNvSpPr/>
+          <p:nvPr/>
+        </p:nvSpPr>
+        <p:spPr>
+          <a:xfrm>
+            <a:off x="7517765" y="2645410"/>
+            <a:ext cx="418465" cy="455930"/>
+          </a:xfrm>
+          <a:prstGeom prst="ellipse">
+            <a:avLst/>
+          </a:prstGeom>
+          <a:ln w="28575">
+            <a:solidFill>
+              <a:schemeClr val="accent1"/>
+            </a:solidFill>
+          </a:ln>
+        </p:spPr>
+        <p:style>
+          <a:lnRef idx="3">
+            <a:schemeClr val="lt1"/>
+          </a:lnRef>
+          <a:fillRef idx="1">
+            <a:schemeClr val="accent6"/>
+          </a:fillRef>
+          <a:effectRef idx="1">
+            <a:schemeClr val="accent6"/>
+          </a:effectRef>
+          <a:fontRef idx="minor">
+            <a:schemeClr val="lt1"/>
+          </a:fontRef>
+        </p:style>
+        <p:txBody>
+          <a:bodyPr rtlCol="0" anchor="ctr"/>
+          <a:p>
+            <a:pPr algn="ctr"/>
+            <a:r>
+              <a:rPr lang="es-HN" altLang="es-MX"/>
+              <a:t>q5</a:t>
+            </a:r>
+            <a:endParaRPr lang="es-HN" altLang="es-MX"/>
+          </a:p>
+        </p:txBody>
+      </p:sp>
+      <p:sp>
+        <p:nvSpPr>
+          <p:cNvPr id="2" name="Cuadro de texto 1"/>
+          <p:cNvSpPr txBox="1"/>
+          <p:nvPr/>
+        </p:nvSpPr>
+        <p:spPr>
+          <a:xfrm>
+            <a:off x="6507480" y="2247265"/>
+            <a:ext cx="922020" cy="229870"/>
+          </a:xfrm>
+          <a:prstGeom prst="rect">
+            <a:avLst/>
+          </a:prstGeom>
+          <a:noFill/>
+        </p:spPr>
+        <p:txBody>
+          <a:bodyPr wrap="square" rtlCol="0">
+            <a:spAutoFit/>
+          </a:bodyPr>
+          <a:p>
+            <a:r>
+              <a:rPr lang="es-HN" altLang="es-MX" sz="900"/>
+              <a:t>[intruccion]</a:t>
+            </a:r>
+            <a:endParaRPr lang="es-HN" altLang="es-MX" sz="900"/>
+          </a:p>
+        </p:txBody>
+      </p:sp>
+      <p:sp>
+        <p:nvSpPr>
+          <p:cNvPr id="5" name="Cuadro de texto 4"/>
+          <p:cNvSpPr txBox="1"/>
+          <p:nvPr/>
+        </p:nvSpPr>
+        <p:spPr>
+          <a:xfrm>
+            <a:off x="3979545" y="2247265"/>
+            <a:ext cx="327025" cy="229870"/>
+          </a:xfrm>
+          <a:prstGeom prst="rect">
+            <a:avLst/>
+          </a:prstGeom>
+          <a:noFill/>
+        </p:spPr>
+        <p:txBody>
+          <a:bodyPr wrap="square" rtlCol="0">
+            <a:spAutoFit/>
+          </a:bodyPr>
+          <a:p>
+            <a:r>
+              <a:rPr lang="es-HN" altLang="es-MX" sz="900"/>
+              <a:t>[id]</a:t>
+            </a:r>
+            <a:endParaRPr lang="es-HN" altLang="es-MX" sz="900"/>
+          </a:p>
+        </p:txBody>
+      </p:sp>
+      <p:sp>
+        <p:nvSpPr>
+          <p:cNvPr id="24" name="Título 23"/>
+          <p:cNvSpPr>
+            <a:spLocks noGrp="1"/>
+          </p:cNvSpPr>
+          <p:nvPr>
+            <p:ph type="title"/>
+          </p:nvPr>
+        </p:nvSpPr>
+        <p:spPr>
+          <a:xfrm>
+            <a:off x="5114290" y="1158875"/>
+            <a:ext cx="10972800" cy="582613"/>
+          </a:xfrm>
+        </p:spPr>
+        <p:txBody>
+          <a:bodyPr/>
+          <a:p>
+            <a:r>
+              <a:rPr lang="es-HN" altLang="es-MX"/>
+              <a:t>FUNC</a:t>
+            </a:r>
+            <a:endParaRPr lang="es-HN" altLang="es-MX"/>
+          </a:p>
+        </p:txBody>
+      </p:sp>
+    </p:spTree>
+  </p:cSld>
+  <p:clrMapOvr>
+    <a:masterClrMapping/>
+  </p:clrMapOvr>
+</p:sld>
+</file>
+
+<file path=ppt/slides/slide6.xml><?xml version="1.0" encoding="utf-8"?>
+<p:sld xmlns:a="http://schemas.openxmlformats.org/drawingml/2006/main" xmlns:r="http://schemas.openxmlformats.org/officeDocument/2006/relationships" xmlns:p="http://schemas.openxmlformats.org/presentationml/2006/main">
+  <p:cSld>
+    <p:spTree>
+      <p:nvGrpSpPr>
+        <p:cNvPr id="1" name=""/>
+        <p:cNvGrpSpPr/>
+        <p:nvPr/>
+      </p:nvGrpSpPr>
+      <p:grpSpPr>
+        <a:xfrm>
+          <a:off x="0" y="0"/>
+          <a:ext cx="0" cy="0"/>
+          <a:chOff x="0" y="0"/>
+          <a:chExt cx="0" cy="0"/>
+        </a:xfrm>
+      </p:grpSpPr>
+      <p:sp>
+        <p:nvSpPr>
+          <p:cNvPr id="3" name="Óvalo 2"/>
+          <p:cNvSpPr/>
+          <p:nvPr/>
+        </p:nvSpPr>
+        <p:spPr>
+          <a:xfrm>
+            <a:off x="4017645" y="2465070"/>
+            <a:ext cx="541655" cy="589915"/>
+          </a:xfrm>
+          <a:prstGeom prst="ellipse">
+            <a:avLst/>
+          </a:prstGeom>
+          <a:ln w="28575">
+            <a:solidFill>
+              <a:schemeClr val="accent1"/>
+            </a:solidFill>
+          </a:ln>
+        </p:spPr>
+        <p:style>
+          <a:lnRef idx="3">
+            <a:schemeClr val="lt1"/>
+          </a:lnRef>
+          <a:fillRef idx="1">
+            <a:schemeClr val="accent6"/>
+          </a:fillRef>
+          <a:effectRef idx="1">
+            <a:schemeClr val="accent6"/>
+          </a:effectRef>
+          <a:fontRef idx="minor">
+            <a:schemeClr val="lt1"/>
+          </a:fontRef>
+        </p:style>
+        <p:txBody>
+          <a:bodyPr rtlCol="0" anchor="ctr"/>
+          <a:p>
+            <a:pPr algn="ctr"/>
+            <a:r>
+              <a:rPr lang="es-HN" altLang="es-MX"/>
+              <a:t>qo</a:t>
+            </a:r>
+            <a:endParaRPr lang="es-HN" altLang="es-MX"/>
+          </a:p>
+        </p:txBody>
+      </p:sp>
+      <p:sp>
+        <p:nvSpPr>
+          <p:cNvPr id="4" name="Óvalo 3"/>
+          <p:cNvSpPr/>
+          <p:nvPr/>
+        </p:nvSpPr>
+        <p:spPr>
+          <a:xfrm>
+            <a:off x="4972050" y="2465070"/>
+            <a:ext cx="541655" cy="589915"/>
+          </a:xfrm>
+          <a:prstGeom prst="ellipse">
+            <a:avLst/>
+          </a:prstGeom>
+          <a:ln w="28575">
+            <a:solidFill>
+              <a:schemeClr val="accent1"/>
+            </a:solidFill>
+          </a:ln>
+        </p:spPr>
+        <p:style>
+          <a:lnRef idx="3">
+            <a:schemeClr val="lt1"/>
+          </a:lnRef>
+          <a:fillRef idx="1">
+            <a:schemeClr val="accent6"/>
+          </a:fillRef>
+          <a:effectRef idx="1">
+            <a:schemeClr val="accent6"/>
+          </a:effectRef>
+          <a:fontRef idx="minor">
+            <a:schemeClr val="lt1"/>
+          </a:fontRef>
+        </p:style>
+        <p:txBody>
+          <a:bodyPr rtlCol="0" anchor="ctr"/>
+          <a:p>
+            <a:pPr algn="ctr"/>
+            <a:r>
+              <a:rPr lang="es-HN" altLang="es-MX" sz="2400"/>
+              <a:t>q1</a:t>
+            </a:r>
+            <a:endParaRPr lang="es-HN" altLang="es-MX" sz="2400"/>
+          </a:p>
+        </p:txBody>
+      </p:sp>
+      <p:sp>
+        <p:nvSpPr>
+          <p:cNvPr id="6" name="Óvalo 5"/>
+          <p:cNvSpPr/>
+          <p:nvPr/>
+        </p:nvSpPr>
+        <p:spPr>
+          <a:xfrm>
+            <a:off x="5866130" y="2465070"/>
+            <a:ext cx="541655" cy="589915"/>
+          </a:xfrm>
+          <a:prstGeom prst="ellipse">
+            <a:avLst/>
+          </a:prstGeom>
+          <a:ln w="28575">
+            <a:solidFill>
+              <a:schemeClr val="accent1"/>
+            </a:solidFill>
+          </a:ln>
+        </p:spPr>
+        <p:style>
+          <a:lnRef idx="3">
+            <a:schemeClr val="lt1"/>
+          </a:lnRef>
+          <a:fillRef idx="1">
+            <a:schemeClr val="accent6"/>
+          </a:fillRef>
+          <a:effectRef idx="1">
+            <a:schemeClr val="accent6"/>
+          </a:effectRef>
+          <a:fontRef idx="minor">
+            <a:schemeClr val="lt1"/>
+          </a:fontRef>
+        </p:style>
+        <p:txBody>
+          <a:bodyPr rtlCol="0" anchor="ctr"/>
+          <a:p>
+            <a:pPr algn="ctr"/>
+            <a:r>
+              <a:rPr lang="es-HN" altLang="es-MX" sz="2400"/>
+              <a:t>q2</a:t>
+            </a:r>
+            <a:endParaRPr lang="es-HN" altLang="es-MX" sz="2400"/>
+          </a:p>
+        </p:txBody>
+      </p:sp>
+      <p:sp>
+        <p:nvSpPr>
+          <p:cNvPr id="7" name="Óvalo 6"/>
+          <p:cNvSpPr/>
+          <p:nvPr/>
+        </p:nvSpPr>
+        <p:spPr>
+          <a:xfrm>
+            <a:off x="6759575" y="2465070"/>
+            <a:ext cx="541655" cy="589915"/>
+          </a:xfrm>
+          <a:prstGeom prst="ellipse">
+            <a:avLst/>
+          </a:prstGeom>
+          <a:ln w="28575">
+            <a:solidFill>
+              <a:schemeClr val="accent1"/>
+            </a:solidFill>
+          </a:ln>
+        </p:spPr>
+        <p:style>
+          <a:lnRef idx="3">
+            <a:schemeClr val="lt1"/>
+          </a:lnRef>
+          <a:fillRef idx="1">
+            <a:schemeClr val="accent6"/>
+          </a:fillRef>
+          <a:effectRef idx="1">
+            <a:schemeClr val="accent6"/>
+          </a:effectRef>
+          <a:fontRef idx="minor">
+            <a:schemeClr val="lt1"/>
+          </a:fontRef>
+        </p:style>
+        <p:txBody>
+          <a:bodyPr rtlCol="0" anchor="ctr"/>
+          <a:p>
+            <a:pPr algn="ctr"/>
+            <a:r>
+              <a:rPr lang="es-HN" altLang="es-MX" sz="2400"/>
+              <a:t>q3</a:t>
+            </a:r>
+            <a:endParaRPr lang="es-HN" altLang="es-MX" sz="2400"/>
+          </a:p>
+        </p:txBody>
+      </p:sp>
+      <p:cxnSp>
+        <p:nvCxnSpPr>
+          <p:cNvPr id="9" name="Conector recto de flecha 8"/>
+          <p:cNvCxnSpPr>
+            <a:stCxn id="3" idx="6"/>
+            <a:endCxn id="4" idx="2"/>
+          </p:cNvCxnSpPr>
+          <p:nvPr/>
+        </p:nvCxnSpPr>
+        <p:spPr>
+          <a:xfrm>
+            <a:off x="4559300" y="2760345"/>
+            <a:ext cx="412750" cy="0"/>
+          </a:xfrm>
+          <a:prstGeom prst="straightConnector1">
+            <a:avLst/>
+          </a:prstGeom>
+          <a:ln>
+            <a:tailEnd type="arrow"/>
+          </a:ln>
+        </p:spPr>
+        <p:style>
+          <a:lnRef idx="1">
+            <a:schemeClr val="accent1"/>
+          </a:lnRef>
+          <a:fillRef idx="0">
+            <a:schemeClr val="accent1"/>
+          </a:fillRef>
+          <a:effectRef idx="0">
+            <a:schemeClr val="accent1"/>
+          </a:effectRef>
+          <a:fontRef idx="minor">
+            <a:schemeClr val="tx1"/>
+          </a:fontRef>
+        </p:style>
+      </p:cxnSp>
+      <p:cxnSp>
+        <p:nvCxnSpPr>
+          <p:cNvPr id="10" name="Conector recto de flecha 9"/>
+          <p:cNvCxnSpPr>
+            <a:stCxn id="4" idx="6"/>
+            <a:endCxn id="6" idx="2"/>
+          </p:cNvCxnSpPr>
+          <p:nvPr/>
+        </p:nvCxnSpPr>
+        <p:spPr>
+          <a:xfrm>
+            <a:off x="5513705" y="2760345"/>
+            <a:ext cx="352425" cy="0"/>
+          </a:xfrm>
+          <a:prstGeom prst="straightConnector1">
+            <a:avLst/>
+          </a:prstGeom>
+          <a:ln>
+            <a:tailEnd type="arrow"/>
+          </a:ln>
+        </p:spPr>
+        <p:style>
+          <a:lnRef idx="1">
+            <a:schemeClr val="accent1"/>
+          </a:lnRef>
+          <a:fillRef idx="0">
+            <a:schemeClr val="accent1"/>
+          </a:fillRef>
+          <a:effectRef idx="0">
+            <a:schemeClr val="accent1"/>
+          </a:effectRef>
+          <a:fontRef idx="minor">
+            <a:schemeClr val="tx1"/>
+          </a:fontRef>
+        </p:style>
+      </p:cxnSp>
+      <p:cxnSp>
+        <p:nvCxnSpPr>
+          <p:cNvPr id="11" name="Conector recto de flecha 10"/>
+          <p:cNvCxnSpPr>
+            <a:stCxn id="6" idx="6"/>
+            <a:endCxn id="7" idx="2"/>
+          </p:cNvCxnSpPr>
+          <p:nvPr/>
+        </p:nvCxnSpPr>
+        <p:spPr>
+          <a:xfrm>
+            <a:off x="6407785" y="2760345"/>
+            <a:ext cx="351790" cy="0"/>
+          </a:xfrm>
+          <a:prstGeom prst="straightConnector1">
+            <a:avLst/>
+          </a:prstGeom>
+          <a:ln>
+            <a:tailEnd type="arrow"/>
+          </a:ln>
+        </p:spPr>
+        <p:style>
+          <a:lnRef idx="1">
+            <a:schemeClr val="accent1"/>
+          </a:lnRef>
+          <a:fillRef idx="0">
+            <a:schemeClr val="accent1"/>
+          </a:fillRef>
+          <a:effectRef idx="0">
+            <a:schemeClr val="accent1"/>
+          </a:effectRef>
+          <a:fontRef idx="minor">
+            <a:schemeClr val="tx1"/>
+          </a:fontRef>
+        </p:style>
+      </p:cxnSp>
+      <p:sp>
+        <p:nvSpPr>
+          <p:cNvPr id="15" name="Cuadro de texto 14"/>
+          <p:cNvSpPr txBox="1"/>
+          <p:nvPr/>
+        </p:nvSpPr>
+        <p:spPr>
+          <a:xfrm>
+            <a:off x="4395470" y="2286635"/>
+            <a:ext cx="786765" cy="275590"/>
+          </a:xfrm>
+          <a:prstGeom prst="rect">
+            <a:avLst/>
+          </a:prstGeom>
+          <a:noFill/>
+        </p:spPr>
+        <p:txBody>
+          <a:bodyPr wrap="square" rtlCol="0">
+            <a:spAutoFit/>
+          </a:bodyPr>
+          <a:p>
+            <a:r>
+              <a:rPr lang="es-HN" altLang="es-MX" sz="1200"/>
+              <a:t>[import]</a:t>
+            </a:r>
+            <a:endParaRPr lang="es-HN" altLang="es-MX" sz="1200"/>
+          </a:p>
+        </p:txBody>
+      </p:sp>
+      <p:sp>
+        <p:nvSpPr>
+          <p:cNvPr id="18" name="Cuadro de texto 17"/>
+          <p:cNvSpPr txBox="1"/>
+          <p:nvPr/>
+        </p:nvSpPr>
+        <p:spPr>
+          <a:xfrm>
+            <a:off x="5925820" y="2189480"/>
+            <a:ext cx="922020" cy="275590"/>
+          </a:xfrm>
+          <a:prstGeom prst="rect">
+            <a:avLst/>
+          </a:prstGeom>
+          <a:noFill/>
+        </p:spPr>
+        <p:txBody>
+          <a:bodyPr wrap="square" rtlCol="0">
+            <a:spAutoFit/>
+          </a:bodyPr>
+          <a:p>
+            <a:r>
+              <a:rPr lang="es-HN" altLang="es-MX" sz="1200"/>
+              <a:t>[id]</a:t>
+            </a:r>
+            <a:endParaRPr lang="es-HN" altLang="es-MX" sz="1200"/>
+          </a:p>
+        </p:txBody>
+      </p:sp>
+      <p:sp>
+        <p:nvSpPr>
+          <p:cNvPr id="19" name="Cuadro de texto 18"/>
+          <p:cNvSpPr txBox="1"/>
+          <p:nvPr/>
+        </p:nvSpPr>
+        <p:spPr>
+          <a:xfrm>
+            <a:off x="5510530" y="3054985"/>
+            <a:ext cx="327025" cy="275590"/>
+          </a:xfrm>
+          <a:prstGeom prst="rect">
+            <a:avLst/>
+          </a:prstGeom>
+          <a:noFill/>
+        </p:spPr>
+        <p:txBody>
+          <a:bodyPr wrap="square" rtlCol="0">
+            <a:spAutoFit/>
+          </a:bodyPr>
+          <a:p>
+            <a:r>
+              <a:rPr lang="es-HN" altLang="es-MX" sz="1200"/>
+              <a:t>[.]</a:t>
+            </a:r>
+            <a:endParaRPr lang="es-HN" altLang="es-MX" sz="1200"/>
+          </a:p>
+        </p:txBody>
+      </p:sp>
+      <p:sp>
+        <p:nvSpPr>
+          <p:cNvPr id="20" name="Cuadro de texto 19"/>
+          <p:cNvSpPr txBox="1"/>
+          <p:nvPr/>
+        </p:nvSpPr>
+        <p:spPr>
+          <a:xfrm>
+            <a:off x="6432550" y="3054985"/>
+            <a:ext cx="327025" cy="275590"/>
+          </a:xfrm>
+          <a:prstGeom prst="rect">
+            <a:avLst/>
+          </a:prstGeom>
+          <a:noFill/>
+        </p:spPr>
+        <p:txBody>
+          <a:bodyPr wrap="square" rtlCol="0">
+            <a:spAutoFit/>
+          </a:bodyPr>
+          <a:p>
+            <a:r>
+              <a:rPr lang="es-HN" altLang="es-MX" sz="1200"/>
+              <a:t>[;]</a:t>
+            </a:r>
+            <a:endParaRPr lang="es-HN" altLang="es-MX" sz="1200"/>
+          </a:p>
+        </p:txBody>
+      </p:sp>
+      <p:sp>
+        <p:nvSpPr>
+          <p:cNvPr id="5" name="Cuadro de texto 4"/>
+          <p:cNvSpPr txBox="1"/>
+          <p:nvPr/>
+        </p:nvSpPr>
+        <p:spPr>
+          <a:xfrm>
+            <a:off x="4972050" y="2189480"/>
+            <a:ext cx="922020" cy="275590"/>
+          </a:xfrm>
+          <a:prstGeom prst="rect">
+            <a:avLst/>
+          </a:prstGeom>
+          <a:noFill/>
+        </p:spPr>
+        <p:txBody>
+          <a:bodyPr wrap="square" rtlCol="0">
+            <a:spAutoFit/>
+          </a:bodyPr>
+          <a:p>
+            <a:r>
+              <a:rPr lang="es-HN" altLang="es-MX" sz="1200"/>
+              <a:t>[layer]</a:t>
+            </a:r>
+            <a:endParaRPr lang="es-HN" altLang="es-MX" sz="1200"/>
+          </a:p>
+        </p:txBody>
+      </p:sp>
+      <p:sp>
+        <p:nvSpPr>
+          <p:cNvPr id="16" name="Óvalo 15"/>
+          <p:cNvSpPr/>
+          <p:nvPr/>
+        </p:nvSpPr>
+        <p:spPr>
+          <a:xfrm>
+            <a:off x="6847840" y="2562225"/>
+            <a:ext cx="364490" cy="397510"/>
+          </a:xfrm>
+          <a:prstGeom prst="ellipse">
+            <a:avLst/>
+          </a:prstGeom>
+          <a:ln w="28575">
+            <a:solidFill>
+              <a:schemeClr val="accent1"/>
+            </a:solidFill>
+          </a:ln>
+        </p:spPr>
+        <p:style>
+          <a:lnRef idx="3">
+            <a:schemeClr val="lt1"/>
+          </a:lnRef>
+          <a:fillRef idx="1">
+            <a:schemeClr val="accent6"/>
+          </a:fillRef>
+          <a:effectRef idx="1">
+            <a:schemeClr val="accent6"/>
+          </a:effectRef>
+          <a:fontRef idx="minor">
+            <a:schemeClr val="lt1"/>
+          </a:fontRef>
+        </p:style>
+        <p:txBody>
+          <a:bodyPr rtlCol="0" anchor="ctr"/>
+          <a:p>
+            <a:pPr algn="ctr"/>
+            <a:r>
+              <a:rPr lang="es-HN" altLang="es-MX" sz="2400"/>
+              <a:t>q3</a:t>
+            </a:r>
+            <a:endParaRPr lang="es-HN" altLang="es-MX" sz="2400"/>
+          </a:p>
+        </p:txBody>
+      </p:sp>
+      <p:sp>
+        <p:nvSpPr>
+          <p:cNvPr id="8" name="Título 7"/>
+          <p:cNvSpPr>
+            <a:spLocks noGrp="1"/>
+          </p:cNvSpPr>
+          <p:nvPr>
+            <p:ph type="title"/>
+          </p:nvPr>
+        </p:nvSpPr>
+        <p:spPr>
+          <a:xfrm>
+            <a:off x="4395470" y="1024255"/>
+            <a:ext cx="10972800" cy="582613"/>
+          </a:xfrm>
+        </p:spPr>
+        <p:txBody>
+          <a:bodyPr/>
+          <a:p>
+            <a:r>
+              <a:rPr lang="es-HN" altLang="es-MX"/>
+              <a:t>IMPORT</a:t>
+            </a:r>
+            <a:endParaRPr lang="es-HN" altLang="es-MX"/>
+          </a:p>
+        </p:txBody>
+      </p:sp>
+    </p:spTree>
+  </p:cSld>
+  <p:clrMapOvr>
+    <a:masterClrMapping/>
+  </p:clrMapOvr>
+</p:sld>
+</file>
+
+<file path=ppt/slides/slide7.xml><?xml version="1.0" encoding="utf-8"?>
+<p:sld xmlns:a="http://schemas.openxmlformats.org/drawingml/2006/main" xmlns:r="http://schemas.openxmlformats.org/officeDocument/2006/relationships" xmlns:p="http://schemas.openxmlformats.org/presentationml/2006/main">
+  <p:cSld>
+    <p:spTree>
+      <p:nvGrpSpPr>
+        <p:cNvPr id="1" name=""/>
+        <p:cNvGrpSpPr/>
+        <p:nvPr/>
+      </p:nvGrpSpPr>
+      <p:grpSpPr>
+        <a:xfrm>
+          <a:off x="0" y="0"/>
+          <a:ext cx="0" cy="0"/>
+          <a:chOff x="0" y="0"/>
+          <a:chExt cx="0" cy="0"/>
+        </a:xfrm>
+      </p:grpSpPr>
+      <p:sp>
+        <p:nvSpPr>
+          <p:cNvPr id="5" name="Título 4"/>
+          <p:cNvSpPr>
+            <a:spLocks noGrp="1"/>
+          </p:cNvSpPr>
+          <p:nvPr>
+            <p:ph type="title"/>
+          </p:nvPr>
+        </p:nvSpPr>
+        <p:spPr>
+          <a:xfrm>
+            <a:off x="4395470" y="1024255"/>
+            <a:ext cx="10972800" cy="582613"/>
+          </a:xfrm>
+        </p:spPr>
+        <p:txBody>
+          <a:bodyPr/>
+          <a:p>
+            <a:r>
+              <a:rPr lang="es-HN" altLang="es-MX"/>
+              <a:t>WHILE</a:t>
+            </a:r>
+            <a:endParaRPr lang="es-HN" altLang="es-MX"/>
+          </a:p>
+        </p:txBody>
+      </p:sp>
+      <p:sp>
+        <p:nvSpPr>
+          <p:cNvPr id="3" name="Óvalo 2"/>
+          <p:cNvSpPr/>
+          <p:nvPr/>
+        </p:nvSpPr>
+        <p:spPr>
+          <a:xfrm>
+            <a:off x="3183890" y="2935605"/>
+            <a:ext cx="541655" cy="589915"/>
+          </a:xfrm>
+          <a:prstGeom prst="ellipse">
+            <a:avLst/>
+          </a:prstGeom>
+          <a:ln w="28575">
+            <a:solidFill>
+              <a:schemeClr val="accent1"/>
+            </a:solidFill>
+          </a:ln>
+        </p:spPr>
+        <p:style>
+          <a:lnRef idx="3">
+            <a:schemeClr val="lt1"/>
+          </a:lnRef>
+          <a:fillRef idx="1">
+            <a:schemeClr val="accent6"/>
+          </a:fillRef>
+          <a:effectRef idx="1">
+            <a:schemeClr val="accent6"/>
+          </a:effectRef>
+          <a:fontRef idx="minor">
+            <a:schemeClr val="lt1"/>
+          </a:fontRef>
+        </p:style>
+        <p:txBody>
+          <a:bodyPr rtlCol="0" anchor="ctr"/>
+          <a:p>
+            <a:pPr algn="ctr"/>
+            <a:r>
+              <a:rPr lang="es-HN" altLang="es-MX" sz="1400"/>
+              <a:t>qo</a:t>
+            </a:r>
+            <a:endParaRPr lang="es-HN" altLang="es-MX" sz="1400"/>
+          </a:p>
+        </p:txBody>
+      </p:sp>
+      <p:sp>
+        <p:nvSpPr>
+          <p:cNvPr id="4" name="Óvalo 3"/>
+          <p:cNvSpPr/>
+          <p:nvPr/>
+        </p:nvSpPr>
+        <p:spPr>
+          <a:xfrm>
+            <a:off x="4138295" y="2935605"/>
+            <a:ext cx="541655" cy="589915"/>
+          </a:xfrm>
+          <a:prstGeom prst="ellipse">
+            <a:avLst/>
+          </a:prstGeom>
+          <a:ln w="28575">
+            <a:solidFill>
+              <a:schemeClr val="accent1"/>
+            </a:solidFill>
+          </a:ln>
+        </p:spPr>
+        <p:style>
+          <a:lnRef idx="3">
+            <a:schemeClr val="lt1"/>
+          </a:lnRef>
+          <a:fillRef idx="1">
+            <a:schemeClr val="accent6"/>
+          </a:fillRef>
+          <a:effectRef idx="1">
+            <a:schemeClr val="accent6"/>
+          </a:effectRef>
+          <a:fontRef idx="minor">
+            <a:schemeClr val="lt1"/>
+          </a:fontRef>
+        </p:style>
+        <p:txBody>
+          <a:bodyPr rtlCol="0" anchor="ctr"/>
+          <a:p>
+            <a:pPr algn="ctr"/>
+            <a:r>
+              <a:rPr lang="es-HN" altLang="es-MX"/>
+              <a:t>q1</a:t>
+            </a:r>
+            <a:endParaRPr lang="es-HN" altLang="es-MX"/>
+          </a:p>
+        </p:txBody>
+      </p:sp>
+      <p:sp>
+        <p:nvSpPr>
+          <p:cNvPr id="6" name="Óvalo 5"/>
+          <p:cNvSpPr/>
+          <p:nvPr/>
+        </p:nvSpPr>
+        <p:spPr>
+          <a:xfrm>
+            <a:off x="5032375" y="2935605"/>
+            <a:ext cx="541655" cy="589915"/>
+          </a:xfrm>
+          <a:prstGeom prst="ellipse">
+            <a:avLst/>
+          </a:prstGeom>
+          <a:ln w="28575">
+            <a:solidFill>
+              <a:schemeClr val="accent1"/>
+            </a:solidFill>
+          </a:ln>
+        </p:spPr>
+        <p:style>
+          <a:lnRef idx="3">
+            <a:schemeClr val="lt1"/>
+          </a:lnRef>
+          <a:fillRef idx="1">
+            <a:schemeClr val="accent6"/>
+          </a:fillRef>
+          <a:effectRef idx="1">
+            <a:schemeClr val="accent6"/>
+          </a:effectRef>
+          <a:fontRef idx="minor">
+            <a:schemeClr val="lt1"/>
+          </a:fontRef>
+        </p:style>
+        <p:txBody>
+          <a:bodyPr rtlCol="0" anchor="ctr"/>
+          <a:p>
+            <a:pPr algn="ctr"/>
+            <a:r>
+              <a:rPr lang="es-HN" altLang="es-MX"/>
+              <a:t>q2</a:t>
+            </a:r>
+            <a:endParaRPr lang="es-HN" altLang="es-MX"/>
+          </a:p>
+        </p:txBody>
+      </p:sp>
+      <p:sp>
+        <p:nvSpPr>
+          <p:cNvPr id="7" name="Óvalo 6"/>
+          <p:cNvSpPr/>
+          <p:nvPr/>
+        </p:nvSpPr>
+        <p:spPr>
+          <a:xfrm>
+            <a:off x="5925820" y="2935605"/>
+            <a:ext cx="541655" cy="589915"/>
+          </a:xfrm>
+          <a:prstGeom prst="ellipse">
+            <a:avLst/>
+          </a:prstGeom>
+          <a:ln w="28575">
+            <a:solidFill>
+              <a:schemeClr val="accent1"/>
+            </a:solidFill>
+          </a:ln>
+        </p:spPr>
+        <p:style>
+          <a:lnRef idx="3">
+            <a:schemeClr val="lt1"/>
+          </a:lnRef>
+          <a:fillRef idx="1">
+            <a:schemeClr val="accent6"/>
+          </a:fillRef>
+          <a:effectRef idx="1">
+            <a:schemeClr val="accent6"/>
+          </a:effectRef>
+          <a:fontRef idx="minor">
+            <a:schemeClr val="lt1"/>
+          </a:fontRef>
+        </p:style>
+        <p:txBody>
+          <a:bodyPr rtlCol="0" anchor="ctr"/>
+          <a:p>
+            <a:pPr algn="ctr"/>
+            <a:r>
+              <a:rPr lang="es-HN" altLang="es-MX"/>
+              <a:t>q3</a:t>
+            </a:r>
+            <a:endParaRPr lang="es-HN" altLang="es-MX"/>
+          </a:p>
+        </p:txBody>
+      </p:sp>
+      <p:sp>
+        <p:nvSpPr>
+          <p:cNvPr id="8" name="Óvalo 7"/>
+          <p:cNvSpPr/>
+          <p:nvPr/>
+        </p:nvSpPr>
+        <p:spPr>
+          <a:xfrm>
+            <a:off x="6811010" y="2935605"/>
+            <a:ext cx="541655" cy="589915"/>
+          </a:xfrm>
+          <a:prstGeom prst="ellipse">
+            <a:avLst/>
+          </a:prstGeom>
+          <a:ln w="28575">
+            <a:solidFill>
+              <a:schemeClr val="accent1"/>
+            </a:solidFill>
+          </a:ln>
+        </p:spPr>
+        <p:style>
+          <a:lnRef idx="3">
+            <a:schemeClr val="lt1"/>
+          </a:lnRef>
+          <a:fillRef idx="1">
+            <a:schemeClr val="accent6"/>
+          </a:fillRef>
+          <a:effectRef idx="1">
+            <a:schemeClr val="accent6"/>
+          </a:effectRef>
+          <a:fontRef idx="minor">
+            <a:schemeClr val="lt1"/>
+          </a:fontRef>
+        </p:style>
+        <p:txBody>
+          <a:bodyPr rtlCol="0" anchor="ctr"/>
+          <a:p>
+            <a:pPr algn="ctr"/>
+            <a:r>
+              <a:rPr lang="es-HN" altLang="es-MX"/>
+              <a:t>q4</a:t>
+            </a:r>
+            <a:endParaRPr lang="es-HN" altLang="es-MX"/>
+          </a:p>
+        </p:txBody>
+      </p:sp>
+      <p:cxnSp>
+        <p:nvCxnSpPr>
+          <p:cNvPr id="9" name="Conector recto de flecha 8"/>
+          <p:cNvCxnSpPr>
+            <a:stCxn id="3" idx="6"/>
+            <a:endCxn id="4" idx="2"/>
+          </p:cNvCxnSpPr>
+          <p:nvPr/>
+        </p:nvCxnSpPr>
+        <p:spPr>
+          <a:xfrm>
+            <a:off x="3725545" y="3230880"/>
+            <a:ext cx="412750" cy="0"/>
+          </a:xfrm>
+          <a:prstGeom prst="straightConnector1">
+            <a:avLst/>
+          </a:prstGeom>
+          <a:ln>
+            <a:tailEnd type="arrow"/>
+          </a:ln>
+        </p:spPr>
+        <p:style>
+          <a:lnRef idx="1">
+            <a:schemeClr val="accent1"/>
+          </a:lnRef>
+          <a:fillRef idx="0">
+            <a:schemeClr val="accent1"/>
+          </a:fillRef>
+          <a:effectRef idx="0">
+            <a:schemeClr val="accent1"/>
+          </a:effectRef>
+          <a:fontRef idx="minor">
+            <a:schemeClr val="tx1"/>
+          </a:fontRef>
+        </p:style>
+      </p:cxnSp>
+      <p:cxnSp>
+        <p:nvCxnSpPr>
+          <p:cNvPr id="10" name="Conector recto de flecha 9"/>
+          <p:cNvCxnSpPr>
+            <a:stCxn id="4" idx="6"/>
+            <a:endCxn id="6" idx="2"/>
+          </p:cNvCxnSpPr>
+          <p:nvPr/>
+        </p:nvCxnSpPr>
+        <p:spPr>
+          <a:xfrm>
+            <a:off x="4679950" y="3230880"/>
+            <a:ext cx="352425" cy="0"/>
+          </a:xfrm>
+          <a:prstGeom prst="straightConnector1">
+            <a:avLst/>
+          </a:prstGeom>
+          <a:ln>
+            <a:tailEnd type="arrow"/>
+          </a:ln>
+        </p:spPr>
+        <p:style>
+          <a:lnRef idx="1">
+            <a:schemeClr val="accent1"/>
+          </a:lnRef>
+          <a:fillRef idx="0">
+            <a:schemeClr val="accent1"/>
+          </a:fillRef>
+          <a:effectRef idx="0">
+            <a:schemeClr val="accent1"/>
+          </a:effectRef>
+          <a:fontRef idx="minor">
+            <a:schemeClr val="tx1"/>
+          </a:fontRef>
+        </p:style>
+      </p:cxnSp>
+      <p:cxnSp>
+        <p:nvCxnSpPr>
+          <p:cNvPr id="11" name="Conector recto de flecha 10"/>
+          <p:cNvCxnSpPr>
+            <a:stCxn id="6" idx="6"/>
+            <a:endCxn id="7" idx="2"/>
+          </p:cNvCxnSpPr>
+          <p:nvPr/>
+        </p:nvCxnSpPr>
+        <p:spPr>
+          <a:xfrm>
+            <a:off x="5574030" y="3230880"/>
+            <a:ext cx="351790" cy="0"/>
+          </a:xfrm>
+          <a:prstGeom prst="straightConnector1">
+            <a:avLst/>
+          </a:prstGeom>
+          <a:ln>
+            <a:tailEnd type="arrow"/>
+          </a:ln>
+        </p:spPr>
+        <p:style>
+          <a:lnRef idx="1">
+            <a:schemeClr val="accent1"/>
+          </a:lnRef>
+          <a:fillRef idx="0">
+            <a:schemeClr val="accent1"/>
+          </a:fillRef>
+          <a:effectRef idx="0">
+            <a:schemeClr val="accent1"/>
+          </a:effectRef>
+          <a:fontRef idx="minor">
+            <a:schemeClr val="tx1"/>
+          </a:fontRef>
+        </p:style>
+      </p:cxnSp>
+      <p:cxnSp>
+        <p:nvCxnSpPr>
+          <p:cNvPr id="12" name="Conector recto de flecha 11"/>
+          <p:cNvCxnSpPr>
+            <a:stCxn id="7" idx="6"/>
+            <a:endCxn id="8" idx="2"/>
+          </p:cNvCxnSpPr>
+          <p:nvPr/>
+        </p:nvCxnSpPr>
+        <p:spPr>
+          <a:xfrm>
+            <a:off x="6467475" y="3230880"/>
+            <a:ext cx="343535" cy="0"/>
+          </a:xfrm>
+          <a:prstGeom prst="straightConnector1">
+            <a:avLst/>
+          </a:prstGeom>
+          <a:ln>
+            <a:tailEnd type="arrow"/>
+          </a:ln>
+        </p:spPr>
+        <p:style>
+          <a:lnRef idx="1">
+            <a:schemeClr val="accent1"/>
+          </a:lnRef>
+          <a:fillRef idx="0">
+            <a:schemeClr val="accent1"/>
+          </a:fillRef>
+          <a:effectRef idx="0">
+            <a:schemeClr val="accent1"/>
+          </a:effectRef>
+          <a:fontRef idx="minor">
+            <a:schemeClr val="tx1"/>
+          </a:fontRef>
+        </p:style>
+      </p:cxnSp>
+      <p:sp>
+        <p:nvSpPr>
+          <p:cNvPr id="13" name="Óvalo 12"/>
+          <p:cNvSpPr/>
+          <p:nvPr/>
+        </p:nvSpPr>
+        <p:spPr>
+          <a:xfrm>
+            <a:off x="7706360" y="2936240"/>
+            <a:ext cx="541655" cy="589915"/>
+          </a:xfrm>
+          <a:prstGeom prst="ellipse">
+            <a:avLst/>
+          </a:prstGeom>
+          <a:ln w="28575">
+            <a:solidFill>
+              <a:schemeClr val="accent1"/>
+            </a:solidFill>
+          </a:ln>
+        </p:spPr>
+        <p:style>
+          <a:lnRef idx="3">
+            <a:schemeClr val="lt1"/>
+          </a:lnRef>
+          <a:fillRef idx="1">
+            <a:schemeClr val="accent6"/>
+          </a:fillRef>
+          <a:effectRef idx="1">
+            <a:schemeClr val="accent6"/>
+          </a:effectRef>
+          <a:fontRef idx="minor">
+            <a:schemeClr val="lt1"/>
+          </a:fontRef>
+        </p:style>
+        <p:txBody>
+          <a:bodyPr rtlCol="0" anchor="ctr"/>
+          <a:p>
+            <a:pPr algn="ctr"/>
+            <a:r>
+              <a:rPr lang="es-HN" altLang="es-MX"/>
+              <a:t>q5</a:t>
+            </a:r>
+            <a:endParaRPr lang="es-HN" altLang="es-MX"/>
+          </a:p>
+        </p:txBody>
+      </p:sp>
+      <p:cxnSp>
+        <p:nvCxnSpPr>
+          <p:cNvPr id="14" name="Conector recto de flecha 13"/>
+          <p:cNvCxnSpPr>
+            <a:endCxn id="13" idx="2"/>
+          </p:cNvCxnSpPr>
+          <p:nvPr/>
+        </p:nvCxnSpPr>
+        <p:spPr>
+          <a:xfrm>
+            <a:off x="7362825" y="3231515"/>
+            <a:ext cx="343535" cy="0"/>
+          </a:xfrm>
+          <a:prstGeom prst="straightConnector1">
+            <a:avLst/>
+          </a:prstGeom>
+          <a:ln>
+            <a:tailEnd type="arrow"/>
+          </a:ln>
+        </p:spPr>
+        <p:style>
+          <a:lnRef idx="1">
+            <a:schemeClr val="accent1"/>
+          </a:lnRef>
+          <a:fillRef idx="0">
+            <a:schemeClr val="accent1"/>
+          </a:fillRef>
+          <a:effectRef idx="0">
+            <a:schemeClr val="accent1"/>
+          </a:effectRef>
+          <a:fontRef idx="minor">
+            <a:schemeClr val="tx1"/>
+          </a:fontRef>
+        </p:style>
+      </p:cxnSp>
+      <p:sp>
+        <p:nvSpPr>
+          <p:cNvPr id="15" name="Cuadro de texto 14"/>
+          <p:cNvSpPr txBox="1"/>
+          <p:nvPr/>
+        </p:nvSpPr>
+        <p:spPr>
+          <a:xfrm>
+            <a:off x="3634740" y="2935605"/>
+            <a:ext cx="594995" cy="229870"/>
+          </a:xfrm>
+          <a:prstGeom prst="rect">
+            <a:avLst/>
+          </a:prstGeom>
+          <a:noFill/>
+        </p:spPr>
+        <p:txBody>
+          <a:bodyPr wrap="square" rtlCol="0">
+            <a:spAutoFit/>
+          </a:bodyPr>
+          <a:p>
+            <a:r>
+              <a:rPr lang="es-HN" altLang="es-MX" sz="900"/>
+              <a:t>[while]</a:t>
+            </a:r>
+            <a:endParaRPr lang="es-HN" altLang="es-MX" sz="900"/>
+          </a:p>
+        </p:txBody>
+      </p:sp>
+      <p:sp>
+        <p:nvSpPr>
+          <p:cNvPr id="18" name="Cuadro de texto 17"/>
+          <p:cNvSpPr txBox="1"/>
+          <p:nvPr/>
+        </p:nvSpPr>
+        <p:spPr>
+          <a:xfrm>
+            <a:off x="4892675" y="2655570"/>
+            <a:ext cx="922020" cy="229870"/>
+          </a:xfrm>
+          <a:prstGeom prst="rect">
+            <a:avLst/>
+          </a:prstGeom>
+          <a:noFill/>
+        </p:spPr>
+        <p:txBody>
+          <a:bodyPr wrap="square" rtlCol="0">
+            <a:spAutoFit/>
+          </a:bodyPr>
+          <a:p>
+            <a:r>
+              <a:rPr lang="es-HN" altLang="es-MX" sz="900"/>
+              <a:t>[condicion]</a:t>
+            </a:r>
+            <a:endParaRPr lang="es-HN" altLang="es-MX" sz="900"/>
+          </a:p>
+        </p:txBody>
+      </p:sp>
+      <p:sp>
+        <p:nvSpPr>
+          <p:cNvPr id="19" name="Cuadro de texto 18"/>
+          <p:cNvSpPr txBox="1"/>
+          <p:nvPr/>
+        </p:nvSpPr>
+        <p:spPr>
+          <a:xfrm>
+            <a:off x="4705350" y="3395980"/>
+            <a:ext cx="327025" cy="229870"/>
+          </a:xfrm>
+          <a:prstGeom prst="rect">
+            <a:avLst/>
+          </a:prstGeom>
+          <a:noFill/>
+        </p:spPr>
+        <p:txBody>
+          <a:bodyPr wrap="square" rtlCol="0">
+            <a:spAutoFit/>
+          </a:bodyPr>
+          <a:p>
+            <a:r>
+              <a:rPr lang="es-HN" altLang="es-MX" sz="900"/>
+              <a:t>[(]</a:t>
+            </a:r>
+            <a:endParaRPr lang="es-HN" altLang="es-MX" sz="900"/>
+          </a:p>
+        </p:txBody>
+      </p:sp>
+      <p:sp>
+        <p:nvSpPr>
+          <p:cNvPr id="20" name="Cuadro de texto 19"/>
+          <p:cNvSpPr txBox="1"/>
+          <p:nvPr/>
+        </p:nvSpPr>
+        <p:spPr>
+          <a:xfrm>
+            <a:off x="5574030" y="3395980"/>
+            <a:ext cx="327025" cy="229870"/>
+          </a:xfrm>
+          <a:prstGeom prst="rect">
+            <a:avLst/>
+          </a:prstGeom>
+          <a:noFill/>
+        </p:spPr>
+        <p:txBody>
+          <a:bodyPr wrap="square" rtlCol="0">
+            <a:spAutoFit/>
+          </a:bodyPr>
+          <a:p>
+            <a:r>
+              <a:rPr lang="es-HN" altLang="es-MX" sz="900"/>
+              <a:t>[)]</a:t>
+            </a:r>
+            <a:endParaRPr lang="es-HN" altLang="es-MX" sz="900"/>
+          </a:p>
+        </p:txBody>
+      </p:sp>
+      <p:sp>
+        <p:nvSpPr>
+          <p:cNvPr id="22" name="Cuadro de texto 21"/>
+          <p:cNvSpPr txBox="1"/>
+          <p:nvPr/>
+        </p:nvSpPr>
+        <p:spPr>
+          <a:xfrm>
+            <a:off x="6467475" y="3395980"/>
+            <a:ext cx="327025" cy="229870"/>
+          </a:xfrm>
+          <a:prstGeom prst="rect">
+            <a:avLst/>
+          </a:prstGeom>
+          <a:noFill/>
+        </p:spPr>
+        <p:txBody>
+          <a:bodyPr wrap="square" rtlCol="0">
+            <a:spAutoFit/>
+          </a:bodyPr>
+          <a:p>
+            <a:r>
+              <a:rPr lang="es-HN" altLang="es-MX" sz="900"/>
+              <a:t>[:]</a:t>
+            </a:r>
+            <a:endParaRPr lang="es-HN" altLang="es-MX" sz="900"/>
+          </a:p>
+        </p:txBody>
+      </p:sp>
+      <p:sp>
+        <p:nvSpPr>
+          <p:cNvPr id="23" name="Cuadro de texto 22"/>
+          <p:cNvSpPr txBox="1"/>
+          <p:nvPr/>
+        </p:nvSpPr>
+        <p:spPr>
+          <a:xfrm>
+            <a:off x="7352665" y="3459480"/>
+            <a:ext cx="327025" cy="229870"/>
+          </a:xfrm>
+          <a:prstGeom prst="rect">
+            <a:avLst/>
+          </a:prstGeom>
+          <a:noFill/>
+        </p:spPr>
+        <p:txBody>
+          <a:bodyPr wrap="square" rtlCol="0">
+            <a:spAutoFit/>
+          </a:bodyPr>
+          <a:p>
+            <a:r>
+              <a:rPr lang="es-HN" altLang="es-MX" sz="900"/>
+              <a:t>[;]</a:t>
+            </a:r>
+            <a:endParaRPr lang="es-HN" altLang="es-MX" sz="900"/>
+          </a:p>
+        </p:txBody>
+      </p:sp>
+      <p:sp>
+        <p:nvSpPr>
+          <p:cNvPr id="26" name="Óvalo 25"/>
+          <p:cNvSpPr/>
+          <p:nvPr/>
+        </p:nvSpPr>
+        <p:spPr>
+          <a:xfrm>
+            <a:off x="7767955" y="3003550"/>
+            <a:ext cx="418465" cy="455930"/>
+          </a:xfrm>
+          <a:prstGeom prst="ellipse">
+            <a:avLst/>
+          </a:prstGeom>
+          <a:ln w="28575">
+            <a:solidFill>
+              <a:schemeClr val="accent1"/>
+            </a:solidFill>
+          </a:ln>
+        </p:spPr>
+        <p:style>
+          <a:lnRef idx="3">
+            <a:schemeClr val="lt1"/>
+          </a:lnRef>
+          <a:fillRef idx="1">
+            <a:schemeClr val="accent6"/>
+          </a:fillRef>
+          <a:effectRef idx="1">
+            <a:schemeClr val="accent6"/>
+          </a:effectRef>
+          <a:fontRef idx="minor">
+            <a:schemeClr val="lt1"/>
+          </a:fontRef>
+        </p:style>
+        <p:txBody>
+          <a:bodyPr rtlCol="0" anchor="ctr"/>
+          <a:p>
+            <a:pPr algn="ctr"/>
+            <a:r>
+              <a:rPr lang="es-HN" altLang="es-MX"/>
+              <a:t>q5</a:t>
+            </a:r>
+            <a:endParaRPr lang="es-HN" altLang="es-MX"/>
+          </a:p>
+        </p:txBody>
+      </p:sp>
+      <p:sp>
+        <p:nvSpPr>
+          <p:cNvPr id="2" name="Cuadro de texto 1"/>
+          <p:cNvSpPr txBox="1"/>
+          <p:nvPr/>
+        </p:nvSpPr>
+        <p:spPr>
+          <a:xfrm>
+            <a:off x="6757670" y="2605405"/>
+            <a:ext cx="922020" cy="229870"/>
+          </a:xfrm>
+          <a:prstGeom prst="rect">
+            <a:avLst/>
+          </a:prstGeom>
+          <a:noFill/>
+        </p:spPr>
+        <p:txBody>
+          <a:bodyPr wrap="square" rtlCol="0">
+            <a:spAutoFit/>
+          </a:bodyPr>
+          <a:p>
+            <a:r>
+              <a:rPr lang="es-HN" altLang="es-MX" sz="900"/>
+              <a:t>[intrucciones]</a:t>
+            </a:r>
+            <a:endParaRPr lang="es-HN" altLang="es-MX" sz="900"/>
+          </a:p>
+        </p:txBody>
+      </p:sp>
+    </p:spTree>
   </p:cSld>
   <p:clrMapOvr>
     <a:masterClrMapping/>
@@ -9464,8 +12752,6 @@
       </a:bgFillStyleLst>
     </a:fmtScheme>
   </a:themeElements>
-  <a:objectDefaults/>
-  <a:extraClrSchemeLst/>
   <a:extLst>
     <a:ext uri="{05A4C25C-085E-4340-85A3-A5531E510DB2}">
       <thm15:themeFamily xmlns:thm15="http://schemas.microsoft.com/office/thememl/2012/main" name="Office Theme" id="{62F939B6-93AF-4DB8-9C6B-D6C7DFDC589F}" vid="{4A3C46E8-61CC-4603-A589-7422A47A8E4A}"/>
@@ -9725,8 +13011,6 @@
       </a:bgFillStyleLst>
     </a:fmtScheme>
   </a:themeElements>
-  <a:objectDefaults/>
-  <a:extraClrSchemeLst/>
   <a:extLst>
     <a:ext uri="{05A4C25C-085E-4340-85A3-A5531E510DB2}">
       <thm15:themeFamily xmlns:thm15="http://schemas.microsoft.com/office/thememl/2012/main" name="Office Theme" id="{62F939B6-93AF-4DB8-9C6B-D6C7DFDC589F}" vid="{4A3C46E8-61CC-4603-A589-7422A47A8E4A}"/>

</xml_diff>